<commit_message>
Add new logo svg
</commit_message>
<xml_diff>
--- a/p3_code/res/logo.pptx
+++ b/p3_code/res/logo.pptx
@@ -7,6 +7,7 @@
   <p:sldIdLst>
     <p:sldId id="256" r:id="rId2"/>
     <p:sldId id="257" r:id="rId3"/>
+    <p:sldId id="258" r:id="rId4"/>
   </p:sldIdLst>
   <p:sldSz cx="12192000" cy="6858000"/>
   <p:notesSz cx="6858000" cy="9144000"/>
@@ -105,10 +106,762 @@
       </a:defRPr>
     </a:lvl9pPr>
   </p:defaultTextStyle>
+  <p:extLst>
+    <p:ext uri="{EFAFB233-063F-42B5-8137-9DF3F51BA10A}">
+      <p15:sldGuideLst xmlns:p15="http://schemas.microsoft.com/office/powerpoint/2012/main"/>
+    </p:ext>
+  </p:extLst>
 </p:presentation>
 </file>
 
 <file path=ppt/diagrams/colors1.xml><?xml version="1.0" encoding="utf-8"?>
+<dgm:colorsDef xmlns:dgm="http://schemas.openxmlformats.org/drawingml/2006/diagram" xmlns:a="http://schemas.openxmlformats.org/drawingml/2006/main" uniqueId="urn:microsoft.com/office/officeart/2005/8/colors/accent1_2">
+  <dgm:title val=""/>
+  <dgm:desc val=""/>
+  <dgm:catLst>
+    <dgm:cat type="accent1" pri="11200"/>
+  </dgm:catLst>
+  <dgm:styleLbl name="node0">
+    <dgm:fillClrLst meth="repeat">
+      <a:schemeClr val="accent1"/>
+    </dgm:fillClrLst>
+    <dgm:linClrLst meth="repeat">
+      <a:schemeClr val="lt1"/>
+    </dgm:linClrLst>
+    <dgm:effectClrLst/>
+    <dgm:txLinClrLst/>
+    <dgm:txFillClrLst/>
+    <dgm:txEffectClrLst/>
+  </dgm:styleLbl>
+  <dgm:styleLbl name="alignNode1">
+    <dgm:fillClrLst meth="repeat">
+      <a:schemeClr val="accent1"/>
+    </dgm:fillClrLst>
+    <dgm:linClrLst meth="repeat">
+      <a:schemeClr val="accent1"/>
+    </dgm:linClrLst>
+    <dgm:effectClrLst/>
+    <dgm:txLinClrLst/>
+    <dgm:txFillClrLst/>
+    <dgm:txEffectClrLst/>
+  </dgm:styleLbl>
+  <dgm:styleLbl name="node1">
+    <dgm:fillClrLst meth="repeat">
+      <a:schemeClr val="accent1"/>
+    </dgm:fillClrLst>
+    <dgm:linClrLst meth="repeat">
+      <a:schemeClr val="lt1"/>
+    </dgm:linClrLst>
+    <dgm:effectClrLst/>
+    <dgm:txLinClrLst/>
+    <dgm:txFillClrLst/>
+    <dgm:txEffectClrLst/>
+  </dgm:styleLbl>
+  <dgm:styleLbl name="lnNode1">
+    <dgm:fillClrLst meth="repeat">
+      <a:schemeClr val="accent1"/>
+    </dgm:fillClrLst>
+    <dgm:linClrLst meth="repeat">
+      <a:schemeClr val="lt1"/>
+    </dgm:linClrLst>
+    <dgm:effectClrLst/>
+    <dgm:txLinClrLst/>
+    <dgm:txFillClrLst/>
+    <dgm:txEffectClrLst/>
+  </dgm:styleLbl>
+  <dgm:styleLbl name="vennNode1">
+    <dgm:fillClrLst meth="repeat">
+      <a:schemeClr val="accent1">
+        <a:alpha val="50000"/>
+      </a:schemeClr>
+    </dgm:fillClrLst>
+    <dgm:linClrLst meth="repeat">
+      <a:schemeClr val="lt1"/>
+    </dgm:linClrLst>
+    <dgm:effectClrLst/>
+    <dgm:txLinClrLst/>
+    <dgm:txFillClrLst/>
+    <dgm:txEffectClrLst/>
+  </dgm:styleLbl>
+  <dgm:styleLbl name="node2">
+    <dgm:fillClrLst meth="repeat">
+      <a:schemeClr val="accent1"/>
+    </dgm:fillClrLst>
+    <dgm:linClrLst meth="repeat">
+      <a:schemeClr val="lt1"/>
+    </dgm:linClrLst>
+    <dgm:effectClrLst/>
+    <dgm:txLinClrLst/>
+    <dgm:txFillClrLst/>
+    <dgm:txEffectClrLst/>
+  </dgm:styleLbl>
+  <dgm:styleLbl name="node3">
+    <dgm:fillClrLst meth="repeat">
+      <a:schemeClr val="accent1"/>
+    </dgm:fillClrLst>
+    <dgm:linClrLst meth="repeat">
+      <a:schemeClr val="lt1"/>
+    </dgm:linClrLst>
+    <dgm:effectClrLst/>
+    <dgm:txLinClrLst/>
+    <dgm:txFillClrLst/>
+    <dgm:txEffectClrLst/>
+  </dgm:styleLbl>
+  <dgm:styleLbl name="node4">
+    <dgm:fillClrLst meth="repeat">
+      <a:schemeClr val="accent1"/>
+    </dgm:fillClrLst>
+    <dgm:linClrLst meth="repeat">
+      <a:schemeClr val="lt1"/>
+    </dgm:linClrLst>
+    <dgm:effectClrLst/>
+    <dgm:txLinClrLst/>
+    <dgm:txFillClrLst/>
+    <dgm:txEffectClrLst/>
+  </dgm:styleLbl>
+  <dgm:styleLbl name="fgImgPlace1">
+    <dgm:fillClrLst meth="repeat">
+      <a:schemeClr val="accent1">
+        <a:tint val="50000"/>
+      </a:schemeClr>
+    </dgm:fillClrLst>
+    <dgm:linClrLst meth="repeat">
+      <a:schemeClr val="lt1"/>
+    </dgm:linClrLst>
+    <dgm:effectClrLst/>
+    <dgm:txLinClrLst/>
+    <dgm:txFillClrLst meth="repeat">
+      <a:schemeClr val="lt1"/>
+    </dgm:txFillClrLst>
+    <dgm:txEffectClrLst/>
+  </dgm:styleLbl>
+  <dgm:styleLbl name="alignImgPlace1">
+    <dgm:fillClrLst meth="repeat">
+      <a:schemeClr val="accent1">
+        <a:tint val="50000"/>
+      </a:schemeClr>
+    </dgm:fillClrLst>
+    <dgm:linClrLst meth="repeat">
+      <a:schemeClr val="lt1"/>
+    </dgm:linClrLst>
+    <dgm:effectClrLst/>
+    <dgm:txLinClrLst/>
+    <dgm:txFillClrLst meth="repeat">
+      <a:schemeClr val="lt1"/>
+    </dgm:txFillClrLst>
+    <dgm:txEffectClrLst/>
+  </dgm:styleLbl>
+  <dgm:styleLbl name="bgImgPlace1">
+    <dgm:fillClrLst meth="repeat">
+      <a:schemeClr val="accent1">
+        <a:tint val="50000"/>
+      </a:schemeClr>
+    </dgm:fillClrLst>
+    <dgm:linClrLst meth="repeat">
+      <a:schemeClr val="lt1"/>
+    </dgm:linClrLst>
+    <dgm:effectClrLst/>
+    <dgm:txLinClrLst/>
+    <dgm:txFillClrLst meth="repeat">
+      <a:schemeClr val="lt1"/>
+    </dgm:txFillClrLst>
+    <dgm:txEffectClrLst/>
+  </dgm:styleLbl>
+  <dgm:styleLbl name="sibTrans2D1">
+    <dgm:fillClrLst meth="repeat">
+      <a:schemeClr val="accent1">
+        <a:tint val="60000"/>
+      </a:schemeClr>
+    </dgm:fillClrLst>
+    <dgm:linClrLst meth="repeat">
+      <a:schemeClr val="accent1">
+        <a:tint val="60000"/>
+      </a:schemeClr>
+    </dgm:linClrLst>
+    <dgm:effectClrLst/>
+    <dgm:txLinClrLst/>
+    <dgm:txFillClrLst/>
+    <dgm:txEffectClrLst/>
+  </dgm:styleLbl>
+  <dgm:styleLbl name="fgSibTrans2D1">
+    <dgm:fillClrLst meth="repeat">
+      <a:schemeClr val="accent1">
+        <a:tint val="60000"/>
+      </a:schemeClr>
+    </dgm:fillClrLst>
+    <dgm:linClrLst meth="repeat">
+      <a:schemeClr val="accent1">
+        <a:tint val="60000"/>
+      </a:schemeClr>
+    </dgm:linClrLst>
+    <dgm:effectClrLst/>
+    <dgm:txLinClrLst/>
+    <dgm:txFillClrLst/>
+    <dgm:txEffectClrLst/>
+  </dgm:styleLbl>
+  <dgm:styleLbl name="bgSibTrans2D1">
+    <dgm:fillClrLst meth="repeat">
+      <a:schemeClr val="accent1">
+        <a:tint val="60000"/>
+      </a:schemeClr>
+    </dgm:fillClrLst>
+    <dgm:linClrLst meth="repeat">
+      <a:schemeClr val="accent1">
+        <a:tint val="60000"/>
+      </a:schemeClr>
+    </dgm:linClrLst>
+    <dgm:effectClrLst/>
+    <dgm:txLinClrLst/>
+    <dgm:txFillClrLst/>
+    <dgm:txEffectClrLst/>
+  </dgm:styleLbl>
+  <dgm:styleLbl name="sibTrans1D1">
+    <dgm:fillClrLst meth="repeat">
+      <a:schemeClr val="accent1"/>
+    </dgm:fillClrLst>
+    <dgm:linClrLst meth="repeat">
+      <a:schemeClr val="accent1"/>
+    </dgm:linClrLst>
+    <dgm:effectClrLst/>
+    <dgm:txLinClrLst/>
+    <dgm:txFillClrLst meth="repeat">
+      <a:schemeClr val="tx1"/>
+    </dgm:txFillClrLst>
+    <dgm:txEffectClrLst/>
+  </dgm:styleLbl>
+  <dgm:styleLbl name="callout">
+    <dgm:fillClrLst meth="repeat">
+      <a:schemeClr val="accent1"/>
+    </dgm:fillClrLst>
+    <dgm:linClrLst meth="repeat">
+      <a:schemeClr val="accent1">
+        <a:tint val="50000"/>
+      </a:schemeClr>
+    </dgm:linClrLst>
+    <dgm:effectClrLst/>
+    <dgm:txLinClrLst/>
+    <dgm:txFillClrLst meth="repeat">
+      <a:schemeClr val="tx1"/>
+    </dgm:txFillClrLst>
+    <dgm:txEffectClrLst/>
+  </dgm:styleLbl>
+  <dgm:styleLbl name="asst0">
+    <dgm:fillClrLst meth="repeat">
+      <a:schemeClr val="accent1"/>
+    </dgm:fillClrLst>
+    <dgm:linClrLst meth="repeat">
+      <a:schemeClr val="lt1"/>
+    </dgm:linClrLst>
+    <dgm:effectClrLst/>
+    <dgm:txLinClrLst/>
+    <dgm:txFillClrLst/>
+    <dgm:txEffectClrLst/>
+  </dgm:styleLbl>
+  <dgm:styleLbl name="asst1">
+    <dgm:fillClrLst meth="repeat">
+      <a:schemeClr val="accent1"/>
+    </dgm:fillClrLst>
+    <dgm:linClrLst meth="repeat">
+      <a:schemeClr val="lt1"/>
+    </dgm:linClrLst>
+    <dgm:effectClrLst/>
+    <dgm:txLinClrLst/>
+    <dgm:txFillClrLst/>
+    <dgm:txEffectClrLst/>
+  </dgm:styleLbl>
+  <dgm:styleLbl name="asst2">
+    <dgm:fillClrLst meth="repeat">
+      <a:schemeClr val="accent1"/>
+    </dgm:fillClrLst>
+    <dgm:linClrLst meth="repeat">
+      <a:schemeClr val="lt1"/>
+    </dgm:linClrLst>
+    <dgm:effectClrLst/>
+    <dgm:txLinClrLst/>
+    <dgm:txFillClrLst/>
+    <dgm:txEffectClrLst/>
+  </dgm:styleLbl>
+  <dgm:styleLbl name="asst3">
+    <dgm:fillClrLst meth="repeat">
+      <a:schemeClr val="accent1"/>
+    </dgm:fillClrLst>
+    <dgm:linClrLst meth="repeat">
+      <a:schemeClr val="lt1"/>
+    </dgm:linClrLst>
+    <dgm:effectClrLst/>
+    <dgm:txLinClrLst/>
+    <dgm:txFillClrLst/>
+    <dgm:txEffectClrLst/>
+  </dgm:styleLbl>
+  <dgm:styleLbl name="asst4">
+    <dgm:fillClrLst meth="repeat">
+      <a:schemeClr val="accent1"/>
+    </dgm:fillClrLst>
+    <dgm:linClrLst meth="repeat">
+      <a:schemeClr val="lt1"/>
+    </dgm:linClrLst>
+    <dgm:effectClrLst/>
+    <dgm:txLinClrLst/>
+    <dgm:txFillClrLst/>
+    <dgm:txEffectClrLst/>
+  </dgm:styleLbl>
+  <dgm:styleLbl name="parChTrans2D1">
+    <dgm:fillClrLst meth="repeat">
+      <a:schemeClr val="accent1">
+        <a:tint val="60000"/>
+      </a:schemeClr>
+    </dgm:fillClrLst>
+    <dgm:linClrLst meth="repeat">
+      <a:schemeClr val="accent1">
+        <a:tint val="60000"/>
+      </a:schemeClr>
+    </dgm:linClrLst>
+    <dgm:effectClrLst/>
+    <dgm:txLinClrLst/>
+    <dgm:txFillClrLst meth="repeat">
+      <a:schemeClr val="lt1"/>
+    </dgm:txFillClrLst>
+    <dgm:txEffectClrLst/>
+  </dgm:styleLbl>
+  <dgm:styleLbl name="parChTrans2D2">
+    <dgm:fillClrLst meth="repeat">
+      <a:schemeClr val="accent1"/>
+    </dgm:fillClrLst>
+    <dgm:linClrLst meth="repeat">
+      <a:schemeClr val="accent1"/>
+    </dgm:linClrLst>
+    <dgm:effectClrLst/>
+    <dgm:txLinClrLst/>
+    <dgm:txFillClrLst meth="repeat">
+      <a:schemeClr val="lt1"/>
+    </dgm:txFillClrLst>
+    <dgm:txEffectClrLst/>
+  </dgm:styleLbl>
+  <dgm:styleLbl name="parChTrans2D3">
+    <dgm:fillClrLst meth="repeat">
+      <a:schemeClr val="accent1"/>
+    </dgm:fillClrLst>
+    <dgm:linClrLst meth="repeat">
+      <a:schemeClr val="accent1"/>
+    </dgm:linClrLst>
+    <dgm:effectClrLst/>
+    <dgm:txLinClrLst/>
+    <dgm:txFillClrLst meth="repeat">
+      <a:schemeClr val="lt1"/>
+    </dgm:txFillClrLst>
+    <dgm:txEffectClrLst/>
+  </dgm:styleLbl>
+  <dgm:styleLbl name="parChTrans2D4">
+    <dgm:fillClrLst meth="repeat">
+      <a:schemeClr val="accent1"/>
+    </dgm:fillClrLst>
+    <dgm:linClrLst meth="repeat">
+      <a:schemeClr val="accent1"/>
+    </dgm:linClrLst>
+    <dgm:effectClrLst/>
+    <dgm:txLinClrLst/>
+    <dgm:txFillClrLst meth="repeat">
+      <a:schemeClr val="lt1"/>
+    </dgm:txFillClrLst>
+    <dgm:txEffectClrLst/>
+  </dgm:styleLbl>
+  <dgm:styleLbl name="parChTrans1D1">
+    <dgm:fillClrLst meth="repeat">
+      <a:schemeClr val="accent1"/>
+    </dgm:fillClrLst>
+    <dgm:linClrLst meth="repeat">
+      <a:schemeClr val="accent1">
+        <a:shade val="60000"/>
+      </a:schemeClr>
+    </dgm:linClrLst>
+    <dgm:effectClrLst/>
+    <dgm:txLinClrLst/>
+    <dgm:txFillClrLst meth="repeat">
+      <a:schemeClr val="tx1"/>
+    </dgm:txFillClrLst>
+    <dgm:txEffectClrLst/>
+  </dgm:styleLbl>
+  <dgm:styleLbl name="parChTrans1D2">
+    <dgm:fillClrLst meth="repeat">
+      <a:schemeClr val="accent1"/>
+    </dgm:fillClrLst>
+    <dgm:linClrLst meth="repeat">
+      <a:schemeClr val="accent1">
+        <a:shade val="60000"/>
+      </a:schemeClr>
+    </dgm:linClrLst>
+    <dgm:effectClrLst/>
+    <dgm:txLinClrLst/>
+    <dgm:txFillClrLst meth="repeat">
+      <a:schemeClr val="tx1"/>
+    </dgm:txFillClrLst>
+    <dgm:txEffectClrLst/>
+  </dgm:styleLbl>
+  <dgm:styleLbl name="parChTrans1D3">
+    <dgm:fillClrLst meth="repeat">
+      <a:schemeClr val="accent1"/>
+    </dgm:fillClrLst>
+    <dgm:linClrLst meth="repeat">
+      <a:schemeClr val="accent1">
+        <a:shade val="80000"/>
+      </a:schemeClr>
+    </dgm:linClrLst>
+    <dgm:effectClrLst/>
+    <dgm:txLinClrLst/>
+    <dgm:txFillClrLst meth="repeat">
+      <a:schemeClr val="tx1"/>
+    </dgm:txFillClrLst>
+    <dgm:txEffectClrLst/>
+  </dgm:styleLbl>
+  <dgm:styleLbl name="parChTrans1D4">
+    <dgm:fillClrLst meth="repeat">
+      <a:schemeClr val="accent1"/>
+    </dgm:fillClrLst>
+    <dgm:linClrLst meth="repeat">
+      <a:schemeClr val="accent1">
+        <a:shade val="80000"/>
+      </a:schemeClr>
+    </dgm:linClrLst>
+    <dgm:effectClrLst/>
+    <dgm:txLinClrLst/>
+    <dgm:txFillClrLst meth="repeat">
+      <a:schemeClr val="tx1"/>
+    </dgm:txFillClrLst>
+    <dgm:txEffectClrLst/>
+  </dgm:styleLbl>
+  <dgm:styleLbl name="fgAcc1">
+    <dgm:fillClrLst meth="repeat">
+      <a:schemeClr val="lt1">
+        <a:alpha val="90000"/>
+      </a:schemeClr>
+    </dgm:fillClrLst>
+    <dgm:linClrLst meth="repeat">
+      <a:schemeClr val="accent1"/>
+    </dgm:linClrLst>
+    <dgm:effectClrLst/>
+    <dgm:txLinClrLst/>
+    <dgm:txFillClrLst meth="repeat">
+      <a:schemeClr val="dk1"/>
+    </dgm:txFillClrLst>
+    <dgm:txEffectClrLst/>
+  </dgm:styleLbl>
+  <dgm:styleLbl name="conFgAcc1">
+    <dgm:fillClrLst meth="repeat">
+      <a:schemeClr val="lt1">
+        <a:alpha val="90000"/>
+      </a:schemeClr>
+    </dgm:fillClrLst>
+    <dgm:linClrLst meth="repeat">
+      <a:schemeClr val="accent1"/>
+    </dgm:linClrLst>
+    <dgm:effectClrLst/>
+    <dgm:txLinClrLst/>
+    <dgm:txFillClrLst meth="repeat">
+      <a:schemeClr val="dk1"/>
+    </dgm:txFillClrLst>
+    <dgm:txEffectClrLst/>
+  </dgm:styleLbl>
+  <dgm:styleLbl name="alignAcc1">
+    <dgm:fillClrLst meth="repeat">
+      <a:schemeClr val="lt1">
+        <a:alpha val="90000"/>
+      </a:schemeClr>
+    </dgm:fillClrLst>
+    <dgm:linClrLst meth="repeat">
+      <a:schemeClr val="accent1"/>
+    </dgm:linClrLst>
+    <dgm:effectClrLst/>
+    <dgm:txLinClrLst/>
+    <dgm:txFillClrLst meth="repeat">
+      <a:schemeClr val="dk1"/>
+    </dgm:txFillClrLst>
+    <dgm:txEffectClrLst/>
+  </dgm:styleLbl>
+  <dgm:styleLbl name="trAlignAcc1">
+    <dgm:fillClrLst meth="repeat">
+      <a:schemeClr val="lt1">
+        <a:alpha val="40000"/>
+      </a:schemeClr>
+    </dgm:fillClrLst>
+    <dgm:linClrLst meth="repeat">
+      <a:schemeClr val="accent1"/>
+    </dgm:linClrLst>
+    <dgm:effectClrLst/>
+    <dgm:txLinClrLst/>
+    <dgm:txFillClrLst meth="repeat">
+      <a:schemeClr val="dk1"/>
+    </dgm:txFillClrLst>
+    <dgm:txEffectClrLst/>
+  </dgm:styleLbl>
+  <dgm:styleLbl name="bgAcc1">
+    <dgm:fillClrLst meth="repeat">
+      <a:schemeClr val="lt1">
+        <a:alpha val="90000"/>
+      </a:schemeClr>
+    </dgm:fillClrLst>
+    <dgm:linClrLst meth="repeat">
+      <a:schemeClr val="accent1"/>
+    </dgm:linClrLst>
+    <dgm:effectClrLst/>
+    <dgm:txLinClrLst/>
+    <dgm:txFillClrLst meth="repeat">
+      <a:schemeClr val="dk1"/>
+    </dgm:txFillClrLst>
+    <dgm:txEffectClrLst/>
+  </dgm:styleLbl>
+  <dgm:styleLbl name="solidFgAcc1">
+    <dgm:fillClrLst meth="repeat">
+      <a:schemeClr val="lt1"/>
+    </dgm:fillClrLst>
+    <dgm:linClrLst meth="repeat">
+      <a:schemeClr val="accent1"/>
+    </dgm:linClrLst>
+    <dgm:effectClrLst/>
+    <dgm:txLinClrLst/>
+    <dgm:txFillClrLst meth="repeat">
+      <a:schemeClr val="dk1"/>
+    </dgm:txFillClrLst>
+    <dgm:txEffectClrLst/>
+  </dgm:styleLbl>
+  <dgm:styleLbl name="solidAlignAcc1">
+    <dgm:fillClrLst meth="repeat">
+      <a:schemeClr val="lt1"/>
+    </dgm:fillClrLst>
+    <dgm:linClrLst meth="repeat">
+      <a:schemeClr val="accent1"/>
+    </dgm:linClrLst>
+    <dgm:effectClrLst/>
+    <dgm:txLinClrLst/>
+    <dgm:txFillClrLst meth="repeat">
+      <a:schemeClr val="dk1"/>
+    </dgm:txFillClrLst>
+    <dgm:txEffectClrLst/>
+  </dgm:styleLbl>
+  <dgm:styleLbl name="solidBgAcc1">
+    <dgm:fillClrLst meth="repeat">
+      <a:schemeClr val="lt1"/>
+    </dgm:fillClrLst>
+    <dgm:linClrLst meth="repeat">
+      <a:schemeClr val="accent1"/>
+    </dgm:linClrLst>
+    <dgm:effectClrLst/>
+    <dgm:txLinClrLst/>
+    <dgm:txFillClrLst meth="repeat">
+      <a:schemeClr val="dk1"/>
+    </dgm:txFillClrLst>
+    <dgm:txEffectClrLst/>
+  </dgm:styleLbl>
+  <dgm:styleLbl name="fgAccFollowNode1">
+    <dgm:fillClrLst meth="repeat">
+      <a:schemeClr val="accent1">
+        <a:alpha val="90000"/>
+        <a:tint val="40000"/>
+      </a:schemeClr>
+    </dgm:fillClrLst>
+    <dgm:linClrLst meth="repeat">
+      <a:schemeClr val="accent1">
+        <a:alpha val="90000"/>
+        <a:tint val="40000"/>
+      </a:schemeClr>
+    </dgm:linClrLst>
+    <dgm:effectClrLst/>
+    <dgm:txLinClrLst/>
+    <dgm:txFillClrLst meth="repeat">
+      <a:schemeClr val="dk1"/>
+    </dgm:txFillClrLst>
+    <dgm:txEffectClrLst/>
+  </dgm:styleLbl>
+  <dgm:styleLbl name="alignAccFollowNode1">
+    <dgm:fillClrLst meth="repeat">
+      <a:schemeClr val="accent1">
+        <a:alpha val="90000"/>
+        <a:tint val="40000"/>
+      </a:schemeClr>
+    </dgm:fillClrLst>
+    <dgm:linClrLst meth="repeat">
+      <a:schemeClr val="accent1">
+        <a:alpha val="90000"/>
+        <a:tint val="40000"/>
+      </a:schemeClr>
+    </dgm:linClrLst>
+    <dgm:effectClrLst/>
+    <dgm:txLinClrLst/>
+    <dgm:txFillClrLst meth="repeat">
+      <a:schemeClr val="dk1"/>
+    </dgm:txFillClrLst>
+    <dgm:txEffectClrLst/>
+  </dgm:styleLbl>
+  <dgm:styleLbl name="bgAccFollowNode1">
+    <dgm:fillClrLst meth="repeat">
+      <a:schemeClr val="accent1">
+        <a:alpha val="90000"/>
+        <a:tint val="40000"/>
+      </a:schemeClr>
+    </dgm:fillClrLst>
+    <dgm:linClrLst meth="repeat">
+      <a:schemeClr val="accent1">
+        <a:alpha val="90000"/>
+        <a:tint val="40000"/>
+      </a:schemeClr>
+    </dgm:linClrLst>
+    <dgm:effectClrLst/>
+    <dgm:txLinClrLst/>
+    <dgm:txFillClrLst meth="repeat">
+      <a:schemeClr val="dk1"/>
+    </dgm:txFillClrLst>
+    <dgm:txEffectClrLst/>
+  </dgm:styleLbl>
+  <dgm:styleLbl name="fgAcc0">
+    <dgm:fillClrLst meth="repeat">
+      <a:schemeClr val="lt1">
+        <a:alpha val="90000"/>
+      </a:schemeClr>
+    </dgm:fillClrLst>
+    <dgm:linClrLst meth="repeat">
+      <a:schemeClr val="accent1"/>
+    </dgm:linClrLst>
+    <dgm:effectClrLst/>
+    <dgm:txLinClrLst/>
+    <dgm:txFillClrLst meth="repeat">
+      <a:schemeClr val="dk1"/>
+    </dgm:txFillClrLst>
+    <dgm:txEffectClrLst/>
+  </dgm:styleLbl>
+  <dgm:styleLbl name="fgAcc2">
+    <dgm:fillClrLst meth="repeat">
+      <a:schemeClr val="lt1">
+        <a:alpha val="90000"/>
+      </a:schemeClr>
+    </dgm:fillClrLst>
+    <dgm:linClrLst meth="repeat">
+      <a:schemeClr val="accent1"/>
+    </dgm:linClrLst>
+    <dgm:effectClrLst/>
+    <dgm:txLinClrLst/>
+    <dgm:txFillClrLst meth="repeat">
+      <a:schemeClr val="dk1"/>
+    </dgm:txFillClrLst>
+    <dgm:txEffectClrLst/>
+  </dgm:styleLbl>
+  <dgm:styleLbl name="fgAcc3">
+    <dgm:fillClrLst meth="repeat">
+      <a:schemeClr val="lt1">
+        <a:alpha val="90000"/>
+      </a:schemeClr>
+    </dgm:fillClrLst>
+    <dgm:linClrLst meth="repeat">
+      <a:schemeClr val="accent1"/>
+    </dgm:linClrLst>
+    <dgm:effectClrLst/>
+    <dgm:txLinClrLst/>
+    <dgm:txFillClrLst meth="repeat">
+      <a:schemeClr val="dk1"/>
+    </dgm:txFillClrLst>
+    <dgm:txEffectClrLst/>
+  </dgm:styleLbl>
+  <dgm:styleLbl name="fgAcc4">
+    <dgm:fillClrLst meth="repeat">
+      <a:schemeClr val="lt1">
+        <a:alpha val="90000"/>
+      </a:schemeClr>
+    </dgm:fillClrLst>
+    <dgm:linClrLst meth="repeat">
+      <a:schemeClr val="accent1"/>
+    </dgm:linClrLst>
+    <dgm:effectClrLst/>
+    <dgm:txLinClrLst/>
+    <dgm:txFillClrLst meth="repeat">
+      <a:schemeClr val="dk1"/>
+    </dgm:txFillClrLst>
+    <dgm:txEffectClrLst/>
+  </dgm:styleLbl>
+  <dgm:styleLbl name="bgShp">
+    <dgm:fillClrLst meth="repeat">
+      <a:schemeClr val="accent1">
+        <a:tint val="40000"/>
+      </a:schemeClr>
+    </dgm:fillClrLst>
+    <dgm:linClrLst meth="repeat">
+      <a:schemeClr val="accent1"/>
+    </dgm:linClrLst>
+    <dgm:effectClrLst/>
+    <dgm:txLinClrLst/>
+    <dgm:txFillClrLst meth="repeat">
+      <a:schemeClr val="dk1"/>
+    </dgm:txFillClrLst>
+    <dgm:txEffectClrLst/>
+  </dgm:styleLbl>
+  <dgm:styleLbl name="dkBgShp">
+    <dgm:fillClrLst meth="repeat">
+      <a:schemeClr val="accent1">
+        <a:shade val="80000"/>
+      </a:schemeClr>
+    </dgm:fillClrLst>
+    <dgm:linClrLst meth="repeat">
+      <a:schemeClr val="accent1"/>
+    </dgm:linClrLst>
+    <dgm:effectClrLst/>
+    <dgm:txLinClrLst/>
+    <dgm:txFillClrLst meth="repeat">
+      <a:schemeClr val="lt1"/>
+    </dgm:txFillClrLst>
+    <dgm:txEffectClrLst/>
+  </dgm:styleLbl>
+  <dgm:styleLbl name="trBgShp">
+    <dgm:fillClrLst meth="repeat">
+      <a:schemeClr val="accent1">
+        <a:tint val="50000"/>
+        <a:alpha val="40000"/>
+      </a:schemeClr>
+    </dgm:fillClrLst>
+    <dgm:linClrLst meth="repeat">
+      <a:schemeClr val="accent1"/>
+    </dgm:linClrLst>
+    <dgm:effectClrLst/>
+    <dgm:txLinClrLst/>
+    <dgm:txFillClrLst meth="repeat">
+      <a:schemeClr val="lt1"/>
+    </dgm:txFillClrLst>
+    <dgm:txEffectClrLst/>
+  </dgm:styleLbl>
+  <dgm:styleLbl name="fgShp">
+    <dgm:fillClrLst meth="repeat">
+      <a:schemeClr val="accent1">
+        <a:tint val="60000"/>
+      </a:schemeClr>
+    </dgm:fillClrLst>
+    <dgm:linClrLst meth="repeat">
+      <a:schemeClr val="lt1"/>
+    </dgm:linClrLst>
+    <dgm:effectClrLst/>
+    <dgm:txLinClrLst/>
+    <dgm:txFillClrLst meth="repeat">
+      <a:schemeClr val="dk1"/>
+    </dgm:txFillClrLst>
+    <dgm:txEffectClrLst/>
+  </dgm:styleLbl>
+  <dgm:styleLbl name="revTx">
+    <dgm:fillClrLst meth="repeat">
+      <a:schemeClr val="lt1">
+        <a:alpha val="0"/>
+      </a:schemeClr>
+    </dgm:fillClrLst>
+    <dgm:linClrLst meth="repeat">
+      <a:schemeClr val="dk1">
+        <a:alpha val="0"/>
+      </a:schemeClr>
+    </dgm:linClrLst>
+    <dgm:effectClrLst/>
+    <dgm:txLinClrLst/>
+    <dgm:txFillClrLst meth="repeat">
+      <a:schemeClr val="tx1"/>
+    </dgm:txFillClrLst>
+    <dgm:txEffectClrLst/>
+  </dgm:styleLbl>
+</dgm:colorsDef>
+</file>
+
+<file path=ppt/diagrams/colors2.xml><?xml version="1.0" encoding="utf-8"?>
 <dgm:colorsDef xmlns:dgm="http://schemas.openxmlformats.org/drawingml/2006/diagram" xmlns:a="http://schemas.openxmlformats.org/drawingml/2006/main" uniqueId="urn:microsoft.com/office/officeart/2005/8/colors/accent1_2">
   <dgm:title val=""/>
   <dgm:desc val=""/>
@@ -975,7 +1728,267 @@
 </dgm:dataModel>
 </file>
 
+<file path=ppt/diagrams/data2.xml><?xml version="1.0" encoding="utf-8"?>
+<dgm:dataModel xmlns:dgm="http://schemas.openxmlformats.org/drawingml/2006/diagram" xmlns:a="http://schemas.openxmlformats.org/drawingml/2006/main">
+  <dgm:ptLst>
+    <dgm:pt modelId="{4EB0BEED-E85D-4AD3-B669-928311BB3CEC}" type="doc">
+      <dgm:prSet loTypeId="urn:microsoft.com/office/officeart/2008/layout/CircularPictureCallout" loCatId="picture" qsTypeId="urn:microsoft.com/office/officeart/2005/8/quickstyle/simple1" qsCatId="simple" csTypeId="urn:microsoft.com/office/officeart/2005/8/colors/accent1_2" csCatId="accent1" phldr="1"/>
+      <dgm:spPr/>
+    </dgm:pt>
+    <dgm:pt modelId="{04437758-2101-4FE4-84A0-18A250674CE6}">
+      <dgm:prSet phldrT="[Text]"/>
+      <dgm:spPr/>
+      <dgm:t>
+        <a:bodyPr/>
+        <a:lstStyle/>
+        <a:p>
+          <a:r>
+            <a:rPr lang="en-US" dirty="0"/>
+            <a:t> </a:t>
+          </a:r>
+        </a:p>
+      </dgm:t>
+    </dgm:pt>
+    <dgm:pt modelId="{FE2FE291-3AAD-4F9B-86F2-B6843B7CBED7}" type="sibTrans" cxnId="{BE2F75C2-7949-4164-A65F-613328A8C84A}">
+      <dgm:prSet/>
+      <dgm:spPr>
+        <a:blipFill rotWithShape="1">
+          <a:blip xmlns:r="http://schemas.openxmlformats.org/officeDocument/2006/relationships" r:embed="rId1">
+            <a:extLst>
+              <a:ext uri="{BEBA8EAE-BF5A-486C-A8C5-ECC9F3942E4B}">
+                <a14:imgProps xmlns:a14="http://schemas.microsoft.com/office/drawing/2010/main">
+                  <a14:imgLayer r:embed="rId2">
+                    <a14:imgEffect>
+                      <a14:backgroundRemoval t="10000" b="90000" l="4651" r="89922">
+                        <a14:foregroundMark x1="4651" y1="38333" x2="4651" y2="38333"/>
+                        <a14:foregroundMark x1="52713" y1="10000" x2="52713" y2="10000"/>
+                        <a14:foregroundMark x1="68217" y1="28333" x2="68217" y2="28333"/>
+                        <a14:foregroundMark x1="59690" y1="30000" x2="51938" y2="31667"/>
+                        <a14:foregroundMark x1="39535" y1="37500" x2="44961" y2="43333"/>
+                      </a14:backgroundRemoval>
+                    </a14:imgEffect>
+                  </a14:imgLayer>
+                </a14:imgProps>
+              </a:ext>
+            </a:extLst>
+          </a:blip>
+          <a:srcRect/>
+          <a:stretch>
+            <a:fillRect l="-4000" r="-4000"/>
+          </a:stretch>
+        </a:blipFill>
+      </dgm:spPr>
+      <dgm:t>
+        <a:bodyPr/>
+        <a:lstStyle/>
+        <a:p>
+          <a:endParaRPr lang="en-US"/>
+        </a:p>
+      </dgm:t>
+    </dgm:pt>
+    <dgm:pt modelId="{AA11BA69-DAEE-4016-826C-A55E13113073}" type="parTrans" cxnId="{BE2F75C2-7949-4164-A65F-613328A8C84A}">
+      <dgm:prSet/>
+      <dgm:spPr/>
+      <dgm:t>
+        <a:bodyPr/>
+        <a:lstStyle/>
+        <a:p>
+          <a:endParaRPr lang="en-US"/>
+        </a:p>
+      </dgm:t>
+    </dgm:pt>
+    <dgm:pt modelId="{70E8BD16-03F1-475C-9E1E-580BFE1B39BB}" type="pres">
+      <dgm:prSet presAssocID="{4EB0BEED-E85D-4AD3-B669-928311BB3CEC}" presName="Name0" presStyleCnt="0">
+        <dgm:presLayoutVars>
+          <dgm:chMax val="7"/>
+          <dgm:chPref val="7"/>
+          <dgm:dir/>
+        </dgm:presLayoutVars>
+      </dgm:prSet>
+      <dgm:spPr/>
+    </dgm:pt>
+    <dgm:pt modelId="{04372246-FF00-429B-BFCF-0614307890EE}" type="pres">
+      <dgm:prSet presAssocID="{4EB0BEED-E85D-4AD3-B669-928311BB3CEC}" presName="Name1" presStyleCnt="0"/>
+      <dgm:spPr/>
+    </dgm:pt>
+    <dgm:pt modelId="{AE0439F7-35CF-45BE-96F9-DA2BFF5D6B79}" type="pres">
+      <dgm:prSet presAssocID="{FE2FE291-3AAD-4F9B-86F2-B6843B7CBED7}" presName="picture_1" presStyleCnt="0"/>
+      <dgm:spPr/>
+    </dgm:pt>
+    <dgm:pt modelId="{255437AE-4459-4F14-88FD-45501391F8AF}" type="pres">
+      <dgm:prSet presAssocID="{FE2FE291-3AAD-4F9B-86F2-B6843B7CBED7}" presName="pictureRepeatNode" presStyleLbl="alignImgPlace1" presStyleIdx="0" presStyleCnt="1"/>
+      <dgm:spPr/>
+    </dgm:pt>
+    <dgm:pt modelId="{9F853342-3DDA-4CCA-842D-B6CC8A1793D2}" type="pres">
+      <dgm:prSet presAssocID="{04437758-2101-4FE4-84A0-18A250674CE6}" presName="text_1" presStyleLbl="node1" presStyleIdx="0" presStyleCnt="0" custLinFactX="252119" custLinFactY="-347583" custLinFactNeighborX="300000" custLinFactNeighborY="-400000">
+        <dgm:presLayoutVars>
+          <dgm:bulletEnabled val="1"/>
+        </dgm:presLayoutVars>
+      </dgm:prSet>
+      <dgm:spPr/>
+    </dgm:pt>
+  </dgm:ptLst>
+  <dgm:cxnLst>
+    <dgm:cxn modelId="{ABC13925-227A-4545-8763-25A064C10459}" type="presOf" srcId="{4EB0BEED-E85D-4AD3-B669-928311BB3CEC}" destId="{70E8BD16-03F1-475C-9E1E-580BFE1B39BB}" srcOrd="0" destOrd="0" presId="urn:microsoft.com/office/officeart/2008/layout/CircularPictureCallout"/>
+    <dgm:cxn modelId="{C8A71E36-589C-4D18-82D5-69C12905B380}" type="presOf" srcId="{FE2FE291-3AAD-4F9B-86F2-B6843B7CBED7}" destId="{255437AE-4459-4F14-88FD-45501391F8AF}" srcOrd="0" destOrd="0" presId="urn:microsoft.com/office/officeart/2008/layout/CircularPictureCallout"/>
+    <dgm:cxn modelId="{B7AEB661-F06E-4160-82B3-6DF6C558F381}" type="presOf" srcId="{04437758-2101-4FE4-84A0-18A250674CE6}" destId="{9F853342-3DDA-4CCA-842D-B6CC8A1793D2}" srcOrd="0" destOrd="0" presId="urn:microsoft.com/office/officeart/2008/layout/CircularPictureCallout"/>
+    <dgm:cxn modelId="{BE2F75C2-7949-4164-A65F-613328A8C84A}" srcId="{4EB0BEED-E85D-4AD3-B669-928311BB3CEC}" destId="{04437758-2101-4FE4-84A0-18A250674CE6}" srcOrd="0" destOrd="0" parTransId="{AA11BA69-DAEE-4016-826C-A55E13113073}" sibTransId="{FE2FE291-3AAD-4F9B-86F2-B6843B7CBED7}"/>
+    <dgm:cxn modelId="{AE3A62E8-C02C-4881-BBE6-8C119E1DFF13}" type="presParOf" srcId="{70E8BD16-03F1-475C-9E1E-580BFE1B39BB}" destId="{04372246-FF00-429B-BFCF-0614307890EE}" srcOrd="0" destOrd="0" presId="urn:microsoft.com/office/officeart/2008/layout/CircularPictureCallout"/>
+    <dgm:cxn modelId="{E34BCE55-4D33-4714-B227-22D5A2344F4E}" type="presParOf" srcId="{04372246-FF00-429B-BFCF-0614307890EE}" destId="{AE0439F7-35CF-45BE-96F9-DA2BFF5D6B79}" srcOrd="0" destOrd="0" presId="urn:microsoft.com/office/officeart/2008/layout/CircularPictureCallout"/>
+    <dgm:cxn modelId="{DC83340F-53AE-4404-8191-CBFE673FE2D1}" type="presParOf" srcId="{AE0439F7-35CF-45BE-96F9-DA2BFF5D6B79}" destId="{255437AE-4459-4F14-88FD-45501391F8AF}" srcOrd="0" destOrd="0" presId="urn:microsoft.com/office/officeart/2008/layout/CircularPictureCallout"/>
+    <dgm:cxn modelId="{620EBCE8-98A5-44A5-A6E3-170AC4F5A9FE}" type="presParOf" srcId="{04372246-FF00-429B-BFCF-0614307890EE}" destId="{9F853342-3DDA-4CCA-842D-B6CC8A1793D2}" srcOrd="1" destOrd="0" presId="urn:microsoft.com/office/officeart/2008/layout/CircularPictureCallout"/>
+  </dgm:cxnLst>
+  <dgm:bg/>
+  <dgm:whole/>
+  <dgm:extLst>
+    <a:ext uri="http://schemas.microsoft.com/office/drawing/2008/diagram">
+      <dsp:dataModelExt xmlns:dsp="http://schemas.microsoft.com/office/drawing/2008/diagram" relId="rId7" minVer="http://schemas.openxmlformats.org/drawingml/2006/diagram"/>
+    </a:ext>
+  </dgm:extLst>
+</dgm:dataModel>
+</file>
+
 <file path=ppt/diagrams/drawing1.xml><?xml version="1.0" encoding="utf-8"?>
+<dsp:drawing xmlns:dgm="http://schemas.openxmlformats.org/drawingml/2006/diagram" xmlns:dsp="http://schemas.microsoft.com/office/drawing/2008/diagram" xmlns:a="http://schemas.openxmlformats.org/drawingml/2006/main">
+  <dsp:spTree>
+    <dsp:nvGrpSpPr>
+      <dsp:cNvPr id="0" name=""/>
+      <dsp:cNvGrpSpPr/>
+    </dsp:nvGrpSpPr>
+    <dsp:grpSpPr/>
+    <dsp:sp modelId="{255437AE-4459-4F14-88FD-45501391F8AF}">
+      <dsp:nvSpPr>
+        <dsp:cNvPr id="0" name=""/>
+        <dsp:cNvSpPr/>
+      </dsp:nvSpPr>
+      <dsp:spPr>
+        <a:xfrm>
+          <a:off x="295503" y="323816"/>
+          <a:ext cx="591006" cy="591006"/>
+        </a:xfrm>
+        <a:prstGeom prst="ellipse">
+          <a:avLst/>
+        </a:prstGeom>
+        <a:blipFill rotWithShape="1">
+          <a:blip xmlns:r="http://schemas.openxmlformats.org/officeDocument/2006/relationships" r:embed="rId1">
+            <a:extLst>
+              <a:ext uri="{BEBA8EAE-BF5A-486C-A8C5-ECC9F3942E4B}">
+                <a14:imgProps xmlns:a14="http://schemas.microsoft.com/office/drawing/2010/main">
+                  <a14:imgLayer r:embed="rId2">
+                    <a14:imgEffect>
+                      <a14:backgroundRemoval t="10000" b="90000" l="4651" r="89922">
+                        <a14:foregroundMark x1="4651" y1="38333" x2="4651" y2="38333"/>
+                        <a14:foregroundMark x1="52713" y1="10000" x2="52713" y2="10000"/>
+                        <a14:foregroundMark x1="68217" y1="28333" x2="68217" y2="28333"/>
+                        <a14:foregroundMark x1="59690" y1="30000" x2="51938" y2="31667"/>
+                        <a14:foregroundMark x1="39535" y1="37500" x2="44961" y2="43333"/>
+                      </a14:backgroundRemoval>
+                    </a14:imgEffect>
+                  </a14:imgLayer>
+                </a14:imgProps>
+              </a:ext>
+            </a:extLst>
+          </a:blip>
+          <a:srcRect/>
+          <a:stretch>
+            <a:fillRect l="-4000" r="-4000"/>
+          </a:stretch>
+        </a:blipFill>
+        <a:ln w="19050" cap="rnd" cmpd="sng" algn="ctr">
+          <a:solidFill>
+            <a:schemeClr val="lt1">
+              <a:hueOff val="0"/>
+              <a:satOff val="0"/>
+              <a:lumOff val="0"/>
+              <a:alphaOff val="0"/>
+            </a:schemeClr>
+          </a:solidFill>
+          <a:prstDash val="solid"/>
+        </a:ln>
+        <a:effectLst/>
+      </dsp:spPr>
+      <dsp:style>
+        <a:lnRef idx="2">
+          <a:scrgbClr r="0" g="0" b="0"/>
+        </a:lnRef>
+        <a:fillRef idx="1">
+          <a:scrgbClr r="0" g="0" b="0"/>
+        </a:fillRef>
+        <a:effectRef idx="0">
+          <a:scrgbClr r="0" g="0" b="0"/>
+        </a:effectRef>
+        <a:fontRef idx="minor"/>
+      </dsp:style>
+    </dsp:sp>
+    <dsp:sp modelId="{9F853342-3DDA-4CCA-842D-B6CC8A1793D2}">
+      <dsp:nvSpPr>
+        <dsp:cNvPr id="0" name=""/>
+        <dsp:cNvSpPr/>
+      </dsp:nvSpPr>
+      <dsp:spPr>
+        <a:xfrm>
+          <a:off x="803768" y="0"/>
+          <a:ext cx="378243" cy="195031"/>
+        </a:xfrm>
+        <a:prstGeom prst="rect">
+          <a:avLst/>
+        </a:prstGeom>
+        <a:noFill/>
+        <a:ln w="19050" cap="rnd" cmpd="sng" algn="ctr">
+          <a:noFill/>
+          <a:prstDash val="solid"/>
+        </a:ln>
+        <a:effectLst/>
+        <a:sp3d/>
+      </dsp:spPr>
+      <dsp:style>
+        <a:lnRef idx="2">
+          <a:scrgbClr r="0" g="0" b="0"/>
+        </a:lnRef>
+        <a:fillRef idx="1">
+          <a:scrgbClr r="0" g="0" b="0"/>
+        </a:fillRef>
+        <a:effectRef idx="0">
+          <a:scrgbClr r="0" g="0" b="0"/>
+        </a:effectRef>
+        <a:fontRef idx="minor">
+          <a:schemeClr val="lt1"/>
+        </a:fontRef>
+      </dsp:style>
+      <dsp:txBody>
+        <a:bodyPr spcFirstLastPara="0" vert="horz" wrap="square" lIns="0" tIns="0" rIns="0" bIns="0" numCol="1" spcCol="1270" anchor="b" anchorCtr="0">
+          <a:noAutofit/>
+        </a:bodyPr>
+        <a:lstStyle/>
+        <a:p>
+          <a:pPr marL="0" lvl="0" indent="0" algn="ctr" defTabSz="577850">
+            <a:lnSpc>
+              <a:spcPct val="90000"/>
+            </a:lnSpc>
+            <a:spcBef>
+              <a:spcPct val="0"/>
+            </a:spcBef>
+            <a:spcAft>
+              <a:spcPct val="35000"/>
+            </a:spcAft>
+            <a:buNone/>
+          </a:pPr>
+          <a:r>
+            <a:rPr lang="en-US" sz="1300" kern="1200" dirty="0"/>
+            <a:t> </a:t>
+          </a:r>
+        </a:p>
+      </dsp:txBody>
+      <dsp:txXfrm>
+        <a:off x="803768" y="0"/>
+        <a:ext cx="378243" cy="195031"/>
+      </dsp:txXfrm>
+    </dsp:sp>
+  </dsp:spTree>
+</dsp:drawing>
+</file>
+
+<file path=ppt/diagrams/drawing2.xml><?xml version="1.0" encoding="utf-8"?>
 <dsp:drawing xmlns:dgm="http://schemas.openxmlformats.org/drawingml/2006/diagram" xmlns:dsp="http://schemas.microsoft.com/office/drawing/2008/diagram" xmlns:a="http://schemas.openxmlformats.org/drawingml/2006/main">
   <dsp:spTree>
     <dsp:nvGrpSpPr>
@@ -2523,7 +3536,2449 @@
 </dgm:layoutDef>
 </file>
 
+<file path=ppt/diagrams/layout2.xml><?xml version="1.0" encoding="utf-8"?>
+<dgm:layoutDef xmlns:dgm="http://schemas.openxmlformats.org/drawingml/2006/diagram" xmlns:a="http://schemas.openxmlformats.org/drawingml/2006/main" uniqueId="urn:microsoft.com/office/officeart/2008/layout/CircularPictureCallout">
+  <dgm:title val=""/>
+  <dgm:desc val=""/>
+  <dgm:catLst>
+    <dgm:cat type="picture" pri="2000"/>
+    <dgm:cat type="pictureconvert" pri="2000"/>
+  </dgm:catLst>
+  <dgm:sampData>
+    <dgm:dataModel>
+      <dgm:ptLst>
+        <dgm:pt modelId="0" type="doc"/>
+        <dgm:pt modelId="1"/>
+        <dgm:pt modelId="2">
+          <dgm:prSet phldr="1"/>
+        </dgm:pt>
+        <dgm:pt modelId="3">
+          <dgm:prSet phldr="1"/>
+        </dgm:pt>
+        <dgm:pt modelId="4">
+          <dgm:prSet phldr="1"/>
+        </dgm:pt>
+      </dgm:ptLst>
+      <dgm:cxnLst>
+        <dgm:cxn modelId="5" srcId="0" destId="1" srcOrd="0" destOrd="0"/>
+        <dgm:cxn modelId="6" srcId="0" destId="2" srcOrd="1" destOrd="0"/>
+        <dgm:cxn modelId="7" srcId="0" destId="3" srcOrd="2" destOrd="0"/>
+        <dgm:cxn modelId="8" srcId="0" destId="4" srcOrd="3" destOrd="0"/>
+      </dgm:cxnLst>
+      <dgm:bg/>
+      <dgm:whole/>
+    </dgm:dataModel>
+  </dgm:sampData>
+  <dgm:styleData>
+    <dgm:dataModel>
+      <dgm:ptLst>
+        <dgm:pt modelId="0" type="doc"/>
+        <dgm:pt modelId="1">
+          <dgm:prSet phldr="1"/>
+        </dgm:pt>
+        <dgm:pt modelId="2">
+          <dgm:prSet phldr="1"/>
+        </dgm:pt>
+        <dgm:pt modelId="3">
+          <dgm:prSet phldr="1"/>
+        </dgm:pt>
+        <dgm:pt modelId="4">
+          <dgm:prSet phldr="1"/>
+        </dgm:pt>
+      </dgm:ptLst>
+      <dgm:cxnLst>
+        <dgm:cxn modelId="5" srcId="0" destId="1" srcOrd="0" destOrd="0"/>
+        <dgm:cxn modelId="6" srcId="0" destId="2" srcOrd="1" destOrd="0"/>
+        <dgm:cxn modelId="7" srcId="0" destId="3" srcOrd="2" destOrd="0"/>
+        <dgm:cxn modelId="8" srcId="0" destId="4" srcOrd="3" destOrd="0"/>
+      </dgm:cxnLst>
+      <dgm:bg/>
+      <dgm:whole/>
+    </dgm:dataModel>
+  </dgm:styleData>
+  <dgm:clrData>
+    <dgm:dataModel>
+      <dgm:ptLst>
+        <dgm:pt modelId="0" type="doc"/>
+        <dgm:pt modelId="1">
+          <dgm:prSet phldr="1"/>
+        </dgm:pt>
+        <dgm:pt modelId="2">
+          <dgm:prSet phldr="1"/>
+        </dgm:pt>
+        <dgm:pt modelId="3">
+          <dgm:prSet phldr="1"/>
+        </dgm:pt>
+        <dgm:pt modelId="4">
+          <dgm:prSet phldr="1"/>
+        </dgm:pt>
+      </dgm:ptLst>
+      <dgm:cxnLst>
+        <dgm:cxn modelId="5" srcId="0" destId="1" srcOrd="0" destOrd="0"/>
+        <dgm:cxn modelId="6" srcId="0" destId="2" srcOrd="1" destOrd="0"/>
+        <dgm:cxn modelId="7" srcId="0" destId="3" srcOrd="2" destOrd="0"/>
+        <dgm:cxn modelId="8" srcId="0" destId="4" srcOrd="3" destOrd="0"/>
+      </dgm:cxnLst>
+      <dgm:bg/>
+      <dgm:whole/>
+    </dgm:dataModel>
+  </dgm:clrData>
+  <dgm:layoutNode name="Name0">
+    <dgm:varLst>
+      <dgm:chMax val="7"/>
+      <dgm:chPref val="7"/>
+      <dgm:dir/>
+    </dgm:varLst>
+    <dgm:alg type="composite"/>
+    <dgm:shape xmlns:r="http://schemas.openxmlformats.org/officeDocument/2006/relationships" r:blip="">
+      <dgm:adjLst/>
+    </dgm:shape>
+    <dgm:constrLst>
+      <dgm:constr type="w" for="ch" refType="h" refFor="ch" op="gte" fact="2"/>
+    </dgm:constrLst>
+    <dgm:layoutNode name="Name1">
+      <dgm:alg type="composite"/>
+      <dgm:shape xmlns:r="http://schemas.openxmlformats.org/officeDocument/2006/relationships" r:blip="">
+        <dgm:adjLst/>
+      </dgm:shape>
+      <dgm:choose name="Name2">
+        <dgm:if name="Name3" axis="ch" ptType="node" func="cnt" op="lte" val="1">
+          <dgm:constrLst>
+            <dgm:constr type="h" for="ch" forName="picture_1" refType="h"/>
+            <dgm:constr type="w" for="ch" forName="picture_1" refType="h" refFor="ch" refForName="picture_1" op="equ"/>
+            <dgm:constr type="l" for="ch" forName="picture_1"/>
+            <dgm:constr type="t" for="ch" forName="picture_1"/>
+            <dgm:constr type="w" for="ch" forName="text_1" refType="w" refFor="ch" refForName="picture_1" fact="0.64"/>
+            <dgm:constr type="h" for="ch" forName="text_1" refType="h" refFor="ch" refForName="picture_1" fact="0.33"/>
+            <dgm:constr type="l" for="ch" forName="text_1" refType="w" refFor="ch" refForName="picture_1" fact="0.18"/>
+            <dgm:constr type="t" for="ch" forName="text_1" refType="h" refFor="ch" refForName="picture_1" fact="0.531"/>
+          </dgm:constrLst>
+        </dgm:if>
+        <dgm:if name="Name4" axis="ch" ptType="node" func="cnt" op="lte" val="2">
+          <dgm:choose name="Name5">
+            <dgm:if name="Name6" func="var" arg="dir" op="equ" val="norm">
+              <dgm:constrLst>
+                <dgm:constr type="h" for="ch" forName="picture_1" refType="h"/>
+                <dgm:constr type="w" for="ch" forName="picture_1" refType="h" refFor="ch" refForName="picture_1" op="equ"/>
+                <dgm:constr type="l" for="ch" forName="picture_1"/>
+                <dgm:constr type="t" for="ch" forName="picture_1"/>
+                <dgm:constr type="w" for="ch" forName="text_1" refType="w" refFor="ch" refForName="picture_1" fact="0.64"/>
+                <dgm:constr type="h" for="ch" forName="text_1" refType="h" refFor="ch" refForName="picture_1" fact="0.33"/>
+                <dgm:constr type="l" for="ch" forName="text_1" refType="l" refFor="ch" refForName="picture_1"/>
+                <dgm:constr type="lOff" for="ch" forName="text_1" refType="w" refFor="ch" refForName="picture_1" fact="0.18"/>
+                <dgm:constr type="t" for="ch" forName="text_1" refType="h" refFor="ch" refForName="picture_1" fact="0.531"/>
+                <dgm:constr type="w" for="ch" forName="picture_2" refType="w" refFor="ch" refForName="picture_1" fact="0.5"/>
+                <dgm:constr type="h" for="ch" forName="picture_2" refType="h" refFor="ch" refForName="picture_1" fact="0.5"/>
+                <dgm:constr type="l" for="ch" forName="picture_2" refType="w" refFor="ch" refForName="picture_1" fact="1.21"/>
+                <dgm:constr type="ctrY" for="ch" forName="picture_2" refType="h" refFor="ch" refForName="picture_1" fact="0.5"/>
+                <dgm:constr type="l" for="ch" forName="line_2" refType="ctrX" refFor="ch" refForName="picture_1"/>
+                <dgm:constr type="h" for="ch" forName="line_2"/>
+                <dgm:constr type="r" for="ch" forName="line_2" refType="ctrX" refFor="ch" refForName="picture_2"/>
+                <dgm:constr type="ctrY" for="ch" forName="line_2" refType="ctrY" refFor="ch" refForName="picture_2"/>
+                <dgm:constr type="r" for="ch" forName="textparent_2" refType="w"/>
+                <dgm:constr type="h" for="ch" forName="textparent_2" refType="h" refFor="ch" refForName="picture_2"/>
+                <dgm:constr type="l" for="ch" forName="textparent_2" refType="r" refFor="ch" refForName="picture_2"/>
+                <dgm:constr type="ctrY" for="ch" forName="textparent_2" refType="ctrY" refFor="ch" refForName="picture_2"/>
+                <dgm:constr type="primFontSz" for="des" forName="text_2" val="65"/>
+              </dgm:constrLst>
+            </dgm:if>
+            <dgm:else name="Name7">
+              <dgm:constrLst>
+                <dgm:constr type="h" for="ch" forName="picture_1" refType="h"/>
+                <dgm:constr type="w" for="ch" forName="picture_1" refType="h" refFor="ch" refForName="picture_1" op="equ"/>
+                <dgm:constr type="r" for="ch" forName="picture_1" refType="w"/>
+                <dgm:constr type="t" for="ch" forName="picture_1"/>
+                <dgm:constr type="w" for="ch" forName="text_1" refType="w" refFor="ch" refForName="picture_1" fact="0.64"/>
+                <dgm:constr type="h" for="ch" forName="text_1" refType="h" refFor="ch" refForName="picture_1" fact="0.33"/>
+                <dgm:constr type="l" for="ch" forName="text_1" refType="l" refFor="ch" refForName="picture_1"/>
+                <dgm:constr type="lOff" for="ch" forName="text_1" refType="w" refFor="ch" refForName="picture_1" fact="0.18"/>
+                <dgm:constr type="t" for="ch" forName="text_1" refType="h" refFor="ch" refForName="picture_1" fact="0.531"/>
+                <dgm:constr type="w" for="ch" forName="picture_2" refType="w" refFor="ch" refForName="picture_1" fact="0.5"/>
+                <dgm:constr type="h" for="ch" forName="picture_2" refType="h" refFor="ch" refForName="picture_1" fact="0.5"/>
+                <dgm:constr type="r" for="ch" forName="picture_2" refType="w"/>
+                <dgm:constr type="rOff" for="ch" forName="picture_2" refType="w" refFor="ch" refForName="picture_1" fact="-1.21"/>
+                <dgm:constr type="ctrY" for="ch" forName="picture_2" refType="h" refFor="ch" refForName="picture_1" fact="0.5"/>
+                <dgm:constr type="r" for="ch" forName="line_2" refType="ctrX" refFor="ch" refForName="picture_1"/>
+                <dgm:constr type="h" for="ch" forName="line_2"/>
+                <dgm:constr type="l" for="ch" forName="line_2" refType="ctrX" refFor="ch" refForName="picture_2"/>
+                <dgm:constr type="ctrY" for="ch" forName="line_2" refType="ctrY" refFor="ch" refForName="picture_2"/>
+                <dgm:constr type="l" for="ch" forName="textparent_2"/>
+                <dgm:constr type="h" for="ch" forName="textparent_2" refType="h" refFor="ch" refForName="picture_2"/>
+                <dgm:constr type="r" for="ch" forName="textparent_2" refType="l" refFor="ch" refForName="picture_2"/>
+                <dgm:constr type="ctrY" for="ch" forName="textparent_2" refType="ctrY" refFor="ch" refForName="picture_2"/>
+                <dgm:constr type="primFontSz" for="des" forName="text_2" val="65"/>
+              </dgm:constrLst>
+            </dgm:else>
+          </dgm:choose>
+        </dgm:if>
+        <dgm:if name="Name8" axis="ch" ptType="node" func="cnt" op="lte" val="3">
+          <dgm:choose name="Name9">
+            <dgm:if name="Name10" func="var" arg="dir" op="equ" val="norm">
+              <dgm:constrLst>
+                <dgm:constr type="h" for="ch" forName="picture_1" refType="h"/>
+                <dgm:constr type="w" for="ch" forName="picture_1" refType="h" refFor="ch" refForName="picture_1" op="equ"/>
+                <dgm:constr type="l" for="ch" forName="picture_1"/>
+                <dgm:constr type="t" for="ch" forName="picture_1"/>
+                <dgm:constr type="w" for="ch" forName="text_1" refType="w" refFor="ch" refForName="picture_1" fact="0.64"/>
+                <dgm:constr type="h" for="ch" forName="text_1" refType="h" refFor="ch" refForName="picture_1" fact="0.33"/>
+                <dgm:constr type="l" for="ch" forName="text_1" refType="l" refFor="ch" refForName="picture_1"/>
+                <dgm:constr type="lOff" for="ch" forName="text_1" refType="w" refFor="ch" refForName="picture_1" fact="0.18"/>
+                <dgm:constr type="t" for="ch" forName="text_1" refType="h" refFor="ch" refForName="picture_1" fact="0.531"/>
+                <dgm:constr type="w" for="ch" forName="picture_2" refType="w" refFor="ch" refForName="picture_1" fact="0.375"/>
+                <dgm:constr type="h" for="ch" forName="picture_2" refType="h" refFor="ch" refForName="picture_1" fact="0.375"/>
+                <dgm:constr type="l" for="ch" forName="picture_2" refType="w" refFor="ch" refForName="picture_1" fact="1.21"/>
+                <dgm:constr type="ctrY" for="ch" forName="picture_2" refType="h" refFor="ch" refForName="picture_1" fact="0.1875"/>
+                <dgm:constr type="l" for="ch" forName="line_2" refType="ctrX" refFor="ch" refForName="picture_1"/>
+                <dgm:constr type="h" for="ch" forName="line_2"/>
+                <dgm:constr type="r" for="ch" forName="line_2" refType="ctrX" refFor="ch" refForName="picture_2"/>
+                <dgm:constr type="ctrY" for="ch" forName="line_2" refType="ctrY" refFor="ch" refForName="picture_2"/>
+                <dgm:constr type="r" for="ch" forName="textparent_2" refType="w"/>
+                <dgm:constr type="h" for="ch" forName="textparent_2" refType="h" refFor="ch" refForName="picture_2"/>
+                <dgm:constr type="l" for="ch" forName="textparent_2" refType="r" refFor="ch" refForName="picture_2"/>
+                <dgm:constr type="ctrY" for="ch" forName="textparent_2" refType="ctrY" refFor="ch" refForName="picture_2"/>
+                <dgm:constr type="primFontSz" for="des" forName="text_2" val="65"/>
+                <dgm:constr type="w" for="ch" forName="picture_3" refType="w" refFor="ch" refForName="picture_1" fact="0.375"/>
+                <dgm:constr type="h" for="ch" forName="picture_3" refType="h" refFor="ch" refForName="picture_1" fact="0.375"/>
+                <dgm:constr type="l" for="ch" forName="picture_3" refType="w" refFor="ch" refForName="picture_1" fact="1.21"/>
+                <dgm:constr type="ctrY" for="ch" forName="picture_3" refType="h" refFor="ch" refForName="picture_1" fact="0.8125"/>
+                <dgm:constr type="l" for="ch" forName="line_3" refType="ctrX" refFor="ch" refForName="picture_1"/>
+                <dgm:constr type="h" for="ch" forName="line_3"/>
+                <dgm:constr type="r" for="ch" forName="line_3" refType="ctrX" refFor="ch" refForName="picture_3"/>
+                <dgm:constr type="ctrY" for="ch" forName="line_3" refType="ctrY" refFor="ch" refForName="picture_3"/>
+                <dgm:constr type="r" for="ch" forName="textparent_3" refType="w"/>
+                <dgm:constr type="h" for="ch" forName="textparent_3" refType="h" refFor="ch" refForName="picture_3"/>
+                <dgm:constr type="l" for="ch" forName="textparent_3" refType="r" refFor="ch" refForName="picture_3"/>
+                <dgm:constr type="ctrY" for="ch" forName="textparent_3" refType="ctrY" refFor="ch" refForName="picture_3"/>
+                <dgm:constr type="primFontSz" for="des" forName="text_3" refType="primFontSz" refFor="des" refForName="text_2" op="equ"/>
+              </dgm:constrLst>
+            </dgm:if>
+            <dgm:else name="Name11">
+              <dgm:constrLst>
+                <dgm:constr type="h" for="ch" forName="picture_1" refType="h"/>
+                <dgm:constr type="w" for="ch" forName="picture_1" refType="h" refFor="ch" refForName="picture_1" op="equ"/>
+                <dgm:constr type="r" for="ch" forName="picture_1" refType="w"/>
+                <dgm:constr type="t" for="ch" forName="picture_1"/>
+                <dgm:constr type="w" for="ch" forName="text_1" refType="w" refFor="ch" refForName="picture_1" fact="0.64"/>
+                <dgm:constr type="h" for="ch" forName="text_1" refType="h" refFor="ch" refForName="picture_1" fact="0.33"/>
+                <dgm:constr type="l" for="ch" forName="text_1" refType="l" refFor="ch" refForName="picture_1"/>
+                <dgm:constr type="lOff" for="ch" forName="text_1" refType="w" refFor="ch" refForName="picture_1" fact="0.18"/>
+                <dgm:constr type="t" for="ch" forName="text_1" refType="h" refFor="ch" refForName="picture_1" fact="0.531"/>
+                <dgm:constr type="w" for="ch" forName="picture_2" refType="w" refFor="ch" refForName="picture_1" fact="0.375"/>
+                <dgm:constr type="h" for="ch" forName="picture_2" refType="h" refFor="ch" refForName="picture_1" fact="0.375"/>
+                <dgm:constr type="r" for="ch" forName="picture_2" refType="w"/>
+                <dgm:constr type="rOff" for="ch" forName="picture_2" refType="w" refFor="ch" refForName="picture_1" fact="-1.21"/>
+                <dgm:constr type="ctrY" for="ch" forName="picture_2" refType="h" refFor="ch" refForName="picture_1" fact="0.1875"/>
+                <dgm:constr type="r" for="ch" forName="line_2" refType="ctrX" refFor="ch" refForName="picture_1"/>
+                <dgm:constr type="h" for="ch" forName="line_2"/>
+                <dgm:constr type="l" for="ch" forName="line_2" refType="ctrX" refFor="ch" refForName="picture_2"/>
+                <dgm:constr type="ctrY" for="ch" forName="line_2" refType="ctrY" refFor="ch" refForName="picture_2"/>
+                <dgm:constr type="l" for="ch" forName="textparent_2"/>
+                <dgm:constr type="h" for="ch" forName="textparent_2" refType="h" refFor="ch" refForName="picture_2"/>
+                <dgm:constr type="r" for="ch" forName="textparent_2" refType="l" refFor="ch" refForName="picture_2"/>
+                <dgm:constr type="ctrY" for="ch" forName="textparent_2" refType="ctrY" refFor="ch" refForName="picture_2"/>
+                <dgm:constr type="primFontSz" for="des" forName="text_2" val="65"/>
+                <dgm:constr type="w" for="ch" forName="picture_3" refType="w" refFor="ch" refForName="picture_1" fact="0.375"/>
+                <dgm:constr type="h" for="ch" forName="picture_3" refType="h" refFor="ch" refForName="picture_1" fact="0.375"/>
+                <dgm:constr type="r" for="ch" forName="picture_3" refType="w"/>
+                <dgm:constr type="rOff" for="ch" forName="picture_3" refType="w" refFor="ch" refForName="picture_1" fact="-1.21"/>
+                <dgm:constr type="ctrY" for="ch" forName="picture_3" refType="h" refFor="ch" refForName="picture_1" fact="0.8125"/>
+                <dgm:constr type="r" for="ch" forName="line_3" refType="ctrX" refFor="ch" refForName="picture_1"/>
+                <dgm:constr type="h" for="ch" forName="line_3"/>
+                <dgm:constr type="l" for="ch" forName="line_3" refType="ctrX" refFor="ch" refForName="picture_3"/>
+                <dgm:constr type="ctrY" for="ch" forName="line_3" refType="ctrY" refFor="ch" refForName="picture_3"/>
+                <dgm:constr type="l" for="ch" forName="textparent_3"/>
+                <dgm:constr type="h" for="ch" forName="textparent_3" refType="h" refFor="ch" refForName="picture_3"/>
+                <dgm:constr type="r" for="ch" forName="textparent_3" refType="l" refFor="ch" refForName="picture_3"/>
+                <dgm:constr type="ctrY" for="ch" forName="textparent_3" refType="ctrY" refFor="ch" refForName="picture_3"/>
+                <dgm:constr type="primFontSz" for="des" forName="text_3" refType="primFontSz" refFor="des" refForName="text_2" op="equ"/>
+              </dgm:constrLst>
+            </dgm:else>
+          </dgm:choose>
+        </dgm:if>
+        <dgm:if name="Name12" axis="ch" ptType="node" func="cnt" op="lte" val="4">
+          <dgm:choose name="Name13">
+            <dgm:if name="Name14" func="var" arg="dir" op="equ" val="norm">
+              <dgm:constrLst>
+                <dgm:constr type="h" for="ch" forName="picture_1" refType="h"/>
+                <dgm:constr type="w" for="ch" forName="picture_1" refType="h" refFor="ch" refForName="picture_1" op="equ"/>
+                <dgm:constr type="l" for="ch" forName="picture_1"/>
+                <dgm:constr type="t" for="ch" forName="picture_1"/>
+                <dgm:constr type="w" for="ch" forName="text_1" refType="w" refFor="ch" refForName="picture_1" fact="0.64"/>
+                <dgm:constr type="h" for="ch" forName="text_1" refType="h" refFor="ch" refForName="picture_1" fact="0.33"/>
+                <dgm:constr type="l" for="ch" forName="text_1" refType="l" refFor="ch" refForName="picture_1"/>
+                <dgm:constr type="lOff" for="ch" forName="text_1" refType="w" refFor="ch" refForName="picture_1" fact="0.18"/>
+                <dgm:constr type="t" for="ch" forName="text_1" refType="h" refFor="ch" refForName="picture_1" fact="0.531"/>
+                <dgm:constr type="w" for="ch" forName="picture_2" refType="w" refFor="ch" refForName="picture_1" fact="0.3"/>
+                <dgm:constr type="h" for="ch" forName="picture_2" refType="h" refFor="ch" refForName="picture_1" fact="0.3"/>
+                <dgm:constr type="l" for="ch" forName="picture_2" refType="w" refFor="ch" refForName="picture_1" fact="1.354"/>
+                <dgm:constr type="ctrY" for="ch" forName="picture_2" refType="h" refFor="ch" refForName="picture_1" fact="0.15"/>
+                <dgm:constr type="l" for="ch" forName="line_2" refType="ctrX" refFor="ch" refForName="picture_1"/>
+                <dgm:constr type="h" for="ch" forName="line_2"/>
+                <dgm:constr type="r" for="ch" forName="line_2" refType="ctrX" refFor="ch" refForName="picture_2"/>
+                <dgm:constr type="ctrY" for="ch" forName="line_2" refType="ctrY" refFor="ch" refForName="picture_2"/>
+                <dgm:constr type="r" for="ch" forName="textparent_2" refType="w"/>
+                <dgm:constr type="h" for="ch" forName="textparent_2" refType="h" refFor="ch" refForName="picture_2"/>
+                <dgm:constr type="l" for="ch" forName="textparent_2" refType="r" refFor="ch" refForName="picture_2"/>
+                <dgm:constr type="ctrY" for="ch" forName="textparent_2" refType="ctrY" refFor="ch" refForName="picture_2"/>
+                <dgm:constr type="primFontSz" for="des" forName="text_2" val="65"/>
+                <dgm:constr type="w" for="ch" forName="picture_3" refType="w" refFor="ch" refForName="picture_1" fact="0.3"/>
+                <dgm:constr type="h" for="ch" forName="picture_3" refType="h" refFor="ch" refForName="picture_1" fact="0.3"/>
+                <dgm:constr type="l" for="ch" forName="picture_3" refType="w" refFor="ch" refForName="picture_1" fact="1.21"/>
+                <dgm:constr type="ctrY" for="ch" forName="picture_3" refType="h" refFor="ch" refForName="picture_1" fact="0.5"/>
+                <dgm:constr type="l" for="ch" forName="line_3" refType="ctrX" refFor="ch" refForName="picture_1"/>
+                <dgm:constr type="h" for="ch" forName="line_3"/>
+                <dgm:constr type="r" for="ch" forName="line_3" refType="ctrX" refFor="ch" refForName="picture_3"/>
+                <dgm:constr type="ctrY" for="ch" forName="line_3" refType="ctrY" refFor="ch" refForName="picture_3"/>
+                <dgm:constr type="r" for="ch" forName="textparent_3" refType="w"/>
+                <dgm:constr type="h" for="ch" forName="textparent_3" refType="h" refFor="ch" refForName="picture_3"/>
+                <dgm:constr type="l" for="ch" forName="textparent_3" refType="r" refFor="ch" refForName="picture_3"/>
+                <dgm:constr type="ctrY" for="ch" forName="textparent_3" refType="ctrY" refFor="ch" refForName="picture_3"/>
+                <dgm:constr type="primFontSz" for="des" forName="text_3" refType="primFontSz" refFor="des" refForName="text_2" op="equ"/>
+                <dgm:constr type="w" for="ch" forName="picture_4" refType="w" refFor="ch" refForName="picture_1" fact="0.3"/>
+                <dgm:constr type="h" for="ch" forName="picture_4" refType="h" refFor="ch" refForName="picture_1" fact="0.3"/>
+                <dgm:constr type="l" for="ch" forName="picture_4" refType="w" refFor="ch" refForName="picture_1" fact="1.354"/>
+                <dgm:constr type="ctrY" for="ch" forName="picture_4" refType="h" refFor="ch" refForName="picture_1" fact="0.85"/>
+                <dgm:constr type="l" for="ch" forName="line_4" refType="ctrX" refFor="ch" refForName="picture_1"/>
+                <dgm:constr type="h" for="ch" forName="line_4"/>
+                <dgm:constr type="r" for="ch" forName="line_4" refType="ctrX" refFor="ch" refForName="picture_4"/>
+                <dgm:constr type="ctrY" for="ch" forName="line_4" refType="ctrY" refFor="ch" refForName="picture_4"/>
+                <dgm:constr type="r" for="ch" forName="textparent_4" refType="w"/>
+                <dgm:constr type="h" for="ch" forName="textparent_4" refType="h" refFor="ch" refForName="picture_4"/>
+                <dgm:constr type="l" for="ch" forName="textparent_4" refType="r" refFor="ch" refForName="picture_4"/>
+                <dgm:constr type="ctrY" for="ch" forName="textparent_4" refType="ctrY" refFor="ch" refForName="picture_4"/>
+                <dgm:constr type="primFontSz" for="des" forName="text_4" refType="primFontSz" refFor="des" refForName="text_2" op="equ"/>
+              </dgm:constrLst>
+            </dgm:if>
+            <dgm:else name="Name15">
+              <dgm:constrLst>
+                <dgm:constr type="h" for="ch" forName="picture_1" refType="h"/>
+                <dgm:constr type="w" for="ch" forName="picture_1" refType="h" refFor="ch" refForName="picture_1" op="equ"/>
+                <dgm:constr type="r" for="ch" forName="picture_1" refType="w"/>
+                <dgm:constr type="t" for="ch" forName="picture_1"/>
+                <dgm:constr type="w" for="ch" forName="text_1" refType="w" refFor="ch" refForName="picture_1" fact="0.64"/>
+                <dgm:constr type="h" for="ch" forName="text_1" refType="h" refFor="ch" refForName="picture_1" fact="0.33"/>
+                <dgm:constr type="l" for="ch" forName="text_1" refType="l" refFor="ch" refForName="picture_1"/>
+                <dgm:constr type="lOff" for="ch" forName="text_1" refType="w" refFor="ch" refForName="picture_1" fact="0.18"/>
+                <dgm:constr type="t" for="ch" forName="text_1" refType="h" refFor="ch" refForName="picture_1" fact="0.531"/>
+                <dgm:constr type="w" for="ch" forName="picture_2" refType="w" refFor="ch" refForName="picture_1" fact="0.3"/>
+                <dgm:constr type="h" for="ch" forName="picture_2" refType="h" refFor="ch" refForName="picture_1" fact="0.3"/>
+                <dgm:constr type="r" for="ch" forName="picture_2" refType="w"/>
+                <dgm:constr type="rOff" for="ch" forName="picture_2" refType="w" refFor="ch" refForName="picture_1" fact="-1.354"/>
+                <dgm:constr type="ctrY" for="ch" forName="picture_2" refType="h" refFor="ch" refForName="picture_1" fact="0.15"/>
+                <dgm:constr type="r" for="ch" forName="line_2" refType="ctrX" refFor="ch" refForName="picture_1"/>
+                <dgm:constr type="h" for="ch" forName="line_2"/>
+                <dgm:constr type="l" for="ch" forName="line_2" refType="ctrX" refFor="ch" refForName="picture_2"/>
+                <dgm:constr type="ctrY" for="ch" forName="line_2" refType="ctrY" refFor="ch" refForName="picture_2"/>
+                <dgm:constr type="l" for="ch" forName="textparent_2"/>
+                <dgm:constr type="h" for="ch" forName="textparent_2" refType="h" refFor="ch" refForName="picture_2"/>
+                <dgm:constr type="r" for="ch" forName="textparent_2" refType="l" refFor="ch" refForName="picture_2"/>
+                <dgm:constr type="ctrY" for="ch" forName="textparent_2" refType="ctrY" refFor="ch" refForName="picture_2"/>
+                <dgm:constr type="primFontSz" for="des" forName="text_2" val="65"/>
+                <dgm:constr type="w" for="ch" forName="picture_3" refType="w" refFor="ch" refForName="picture_1" fact="0.3"/>
+                <dgm:constr type="h" for="ch" forName="picture_3" refType="h" refFor="ch" refForName="picture_1" fact="0.3"/>
+                <dgm:constr type="r" for="ch" forName="picture_3" refType="w"/>
+                <dgm:constr type="rOff" for="ch" forName="picture_3" refType="w" refFor="ch" refForName="picture_1" fact="-1.21"/>
+                <dgm:constr type="ctrY" for="ch" forName="picture_3" refType="h" refFor="ch" refForName="picture_1" fact="0.5"/>
+                <dgm:constr type="r" for="ch" forName="line_3" refType="ctrX" refFor="ch" refForName="picture_1"/>
+                <dgm:constr type="h" for="ch" forName="line_3"/>
+                <dgm:constr type="l" for="ch" forName="line_3" refType="ctrX" refFor="ch" refForName="picture_3"/>
+                <dgm:constr type="ctrY" for="ch" forName="line_3" refType="ctrY" refFor="ch" refForName="picture_3"/>
+                <dgm:constr type="l" for="ch" forName="textparent_3"/>
+                <dgm:constr type="h" for="ch" forName="textparent_3" refType="h" refFor="ch" refForName="picture_3"/>
+                <dgm:constr type="r" for="ch" forName="textparent_3" refType="l" refFor="ch" refForName="picture_3"/>
+                <dgm:constr type="ctrY" for="ch" forName="textparent_3" refType="ctrY" refFor="ch" refForName="picture_3"/>
+                <dgm:constr type="primFontSz" for="des" forName="text_3" refType="primFontSz" refFor="des" refForName="text_2" op="equ"/>
+                <dgm:constr type="w" for="ch" forName="picture_4" refType="w" refFor="ch" refForName="picture_1" fact="0.3"/>
+                <dgm:constr type="h" for="ch" forName="picture_4" refType="h" refFor="ch" refForName="picture_1" fact="0.3"/>
+                <dgm:constr type="r" for="ch" forName="picture_4" refType="w"/>
+                <dgm:constr type="rOff" for="ch" forName="picture_4" refType="w" refFor="ch" refForName="picture_1" fact="-1.354"/>
+                <dgm:constr type="ctrY" for="ch" forName="picture_4" refType="h" refFor="ch" refForName="picture_1" fact="0.85"/>
+                <dgm:constr type="r" for="ch" forName="line_4" refType="ctrX" refFor="ch" refForName="picture_1"/>
+                <dgm:constr type="h" for="ch" forName="line_4"/>
+                <dgm:constr type="l" for="ch" forName="line_4" refType="ctrX" refFor="ch" refForName="picture_4"/>
+                <dgm:constr type="ctrY" for="ch" forName="line_4" refType="ctrY" refFor="ch" refForName="picture_4"/>
+                <dgm:constr type="l" for="ch" forName="textparent_4"/>
+                <dgm:constr type="h" for="ch" forName="textparent_4" refType="h" refFor="ch" refForName="picture_4"/>
+                <dgm:constr type="r" for="ch" forName="textparent_4" refType="l" refFor="ch" refForName="picture_4"/>
+                <dgm:constr type="ctrY" for="ch" forName="textparent_4" refType="ctrY" refFor="ch" refForName="picture_4"/>
+                <dgm:constr type="primFontSz" for="des" forName="text_4" refType="primFontSz" refFor="des" refForName="text_2" op="equ"/>
+              </dgm:constrLst>
+            </dgm:else>
+          </dgm:choose>
+        </dgm:if>
+        <dgm:if name="Name16" axis="ch" ptType="node" func="cnt" op="lte" val="5">
+          <dgm:choose name="Name17">
+            <dgm:if name="Name18" func="var" arg="dir" op="equ" val="norm">
+              <dgm:constrLst>
+                <dgm:constr type="h" for="ch" forName="picture_1" refType="h"/>
+                <dgm:constr type="w" for="ch" forName="picture_1" refType="h" refFor="ch" refForName="picture_1" op="equ"/>
+                <dgm:constr type="l" for="ch" forName="picture_1"/>
+                <dgm:constr type="t" for="ch" forName="picture_1"/>
+                <dgm:constr type="w" for="ch" forName="text_1" refType="w" refFor="ch" refForName="picture_1" fact="0.64"/>
+                <dgm:constr type="h" for="ch" forName="text_1" refType="h" refFor="ch" refForName="picture_1" fact="0.33"/>
+                <dgm:constr type="l" for="ch" forName="text_1" refType="l" refFor="ch" refForName="picture_1"/>
+                <dgm:constr type="lOff" for="ch" forName="text_1" refType="w" refFor="ch" refForName="picture_1" fact="0.18"/>
+                <dgm:constr type="t" for="ch" forName="text_1" refType="h" refFor="ch" refForName="picture_1" fact="0.531"/>
+                <dgm:constr type="w" for="ch" forName="picture_2" refType="w" refFor="ch" refForName="picture_1" fact="0.22"/>
+                <dgm:constr type="h" for="ch" forName="picture_2" refType="h" refFor="ch" refForName="picture_1" fact="0.22"/>
+                <dgm:constr type="l" for="ch" forName="picture_2" refType="w" refFor="ch" refForName="picture_1" fact="1.375"/>
+                <dgm:constr type="ctrY" for="ch" forName="picture_2" refType="h" refFor="ch" refForName="picture_1" fact="0.11"/>
+                <dgm:constr type="l" for="ch" forName="line_2" refType="ctrX" refFor="ch" refForName="picture_1"/>
+                <dgm:constr type="h" for="ch" forName="line_2"/>
+                <dgm:constr type="r" for="ch" forName="line_2" refType="ctrX" refFor="ch" refForName="picture_2"/>
+                <dgm:constr type="ctrY" for="ch" forName="line_2" refType="ctrY" refFor="ch" refForName="picture_2"/>
+                <dgm:constr type="r" for="ch" forName="textparent_2" refType="w"/>
+                <dgm:constr type="h" for="ch" forName="textparent_2" refType="h" refFor="ch" refForName="picture_2"/>
+                <dgm:constr type="l" for="ch" forName="textparent_2" refType="r" refFor="ch" refForName="picture_2"/>
+                <dgm:constr type="ctrY" for="ch" forName="textparent_2" refType="ctrY" refFor="ch" refForName="picture_2"/>
+                <dgm:constr type="primFontSz" for="des" forName="text_2" val="65"/>
+                <dgm:constr type="w" for="ch" forName="picture_3" refType="w" refFor="ch" refForName="picture_1" fact="0.22"/>
+                <dgm:constr type="h" for="ch" forName="picture_3" refType="h" refFor="ch" refForName="picture_1" fact="0.22"/>
+                <dgm:constr type="l" for="ch" forName="picture_3" refType="w" refFor="ch" refForName="picture_1" fact="1.21"/>
+                <dgm:constr type="ctrY" for="ch" forName="picture_3" refType="h" refFor="ch" refForName="picture_1" fact="0.353"/>
+                <dgm:constr type="l" for="ch" forName="line_3" refType="ctrX" refFor="ch" refForName="picture_1"/>
+                <dgm:constr type="h" for="ch" forName="line_3"/>
+                <dgm:constr type="r" for="ch" forName="line_3" refType="ctrX" refFor="ch" refForName="picture_3"/>
+                <dgm:constr type="ctrY" for="ch" forName="line_3" refType="ctrY" refFor="ch" refForName="picture_3"/>
+                <dgm:constr type="r" for="ch" forName="textparent_3" refType="w"/>
+                <dgm:constr type="h" for="ch" forName="textparent_3" refType="h" refFor="ch" refForName="picture_3"/>
+                <dgm:constr type="l" for="ch" forName="textparent_3" refType="r" refFor="ch" refForName="picture_3"/>
+                <dgm:constr type="ctrY" for="ch" forName="textparent_3" refType="ctrY" refFor="ch" refForName="picture_3"/>
+                <dgm:constr type="primFontSz" for="des" forName="text_3" refType="primFontSz" refFor="des" refForName="text_2" op="equ"/>
+                <dgm:constr type="w" for="ch" forName="picture_4" refType="w" refFor="ch" refForName="picture_1" fact="0.22"/>
+                <dgm:constr type="h" for="ch" forName="picture_4" refType="h" refFor="ch" refForName="picture_1" fact="0.22"/>
+                <dgm:constr type="l" for="ch" forName="picture_4" refType="w" refFor="ch" refForName="picture_1" fact="1.21"/>
+                <dgm:constr type="ctrY" for="ch" forName="picture_4" refType="h" refFor="ch" refForName="picture_1" fact="0.647"/>
+                <dgm:constr type="l" for="ch" forName="line_4" refType="ctrX" refFor="ch" refForName="picture_1"/>
+                <dgm:constr type="h" for="ch" forName="line_4"/>
+                <dgm:constr type="r" for="ch" forName="line_4" refType="ctrX" refFor="ch" refForName="picture_4"/>
+                <dgm:constr type="ctrY" for="ch" forName="line_4" refType="ctrY" refFor="ch" refForName="picture_4"/>
+                <dgm:constr type="r" for="ch" forName="textparent_4" refType="w"/>
+                <dgm:constr type="h" for="ch" forName="textparent_4" refType="h" refFor="ch" refForName="picture_4"/>
+                <dgm:constr type="l" for="ch" forName="textparent_4" refType="r" refFor="ch" refForName="picture_4"/>
+                <dgm:constr type="ctrY" for="ch" forName="textparent_4" refType="ctrY" refFor="ch" refForName="picture_4"/>
+                <dgm:constr type="primFontSz" for="des" forName="text_4" refType="primFontSz" refFor="des" refForName="text_2" op="equ"/>
+                <dgm:constr type="w" for="ch" forName="picture_5" refType="w" refFor="ch" refForName="picture_1" fact="0.22"/>
+                <dgm:constr type="h" for="ch" forName="picture_5" refType="h" refFor="ch" refForName="picture_1" fact="0.22"/>
+                <dgm:constr type="l" for="ch" forName="picture_5" refType="w" refFor="ch" refForName="picture_1" fact="1.375"/>
+                <dgm:constr type="ctrY" for="ch" forName="picture_5" refType="h" refFor="ch" refForName="picture_1" fact="0.89"/>
+                <dgm:constr type="l" for="ch" forName="line_5" refType="ctrX" refFor="ch" refForName="picture_1"/>
+                <dgm:constr type="h" for="ch" forName="line_5"/>
+                <dgm:constr type="r" for="ch" forName="line_5" refType="ctrX" refFor="ch" refForName="picture_5"/>
+                <dgm:constr type="ctrY" for="ch" forName="line_5" refType="ctrY" refFor="ch" refForName="picture_5"/>
+                <dgm:constr type="r" for="ch" forName="textparent_5" refType="w"/>
+                <dgm:constr type="h" for="ch" forName="textparent_5" refType="h" refFor="ch" refForName="picture_5"/>
+                <dgm:constr type="l" for="ch" forName="textparent_5" refType="r" refFor="ch" refForName="picture_5"/>
+                <dgm:constr type="ctrY" for="ch" forName="textparent_5" refType="ctrY" refFor="ch" refForName="picture_5"/>
+                <dgm:constr type="primFontSz" for="des" forName="text_5" refType="primFontSz" refFor="des" refForName="text_2" op="equ"/>
+              </dgm:constrLst>
+            </dgm:if>
+            <dgm:else name="Name19">
+              <dgm:constrLst>
+                <dgm:constr type="h" for="ch" forName="picture_1" refType="h"/>
+                <dgm:constr type="w" for="ch" forName="picture_1" refType="h" refFor="ch" refForName="picture_1" op="equ"/>
+                <dgm:constr type="r" for="ch" forName="picture_1" refType="w"/>
+                <dgm:constr type="t" for="ch" forName="picture_1"/>
+                <dgm:constr type="w" for="ch" forName="text_1" refType="w" refFor="ch" refForName="picture_1" fact="0.64"/>
+                <dgm:constr type="h" for="ch" forName="text_1" refType="h" refFor="ch" refForName="picture_1" fact="0.33"/>
+                <dgm:constr type="l" for="ch" forName="text_1" refType="l" refFor="ch" refForName="picture_1"/>
+                <dgm:constr type="lOff" for="ch" forName="text_1" refType="w" refFor="ch" refForName="picture_1" fact="0.18"/>
+                <dgm:constr type="t" for="ch" forName="text_1" refType="h" refFor="ch" refForName="picture_1" fact="0.531"/>
+                <dgm:constr type="w" for="ch" forName="picture_2" refType="w" refFor="ch" refForName="picture_1" fact="0.22"/>
+                <dgm:constr type="h" for="ch" forName="picture_2" refType="h" refFor="ch" refForName="picture_1" fact="0.22"/>
+                <dgm:constr type="r" for="ch" forName="picture_2" refType="w"/>
+                <dgm:constr type="rOff" for="ch" forName="picture_2" refType="w" refFor="ch" refForName="picture_1" fact="-1.375"/>
+                <dgm:constr type="ctrY" for="ch" forName="picture_2" refType="h" refFor="ch" refForName="picture_1" fact="0.11"/>
+                <dgm:constr type="r" for="ch" forName="line_2" refType="ctrX" refFor="ch" refForName="picture_1"/>
+                <dgm:constr type="h" for="ch" forName="line_2"/>
+                <dgm:constr type="l" for="ch" forName="line_2" refType="ctrX" refFor="ch" refForName="picture_2"/>
+                <dgm:constr type="ctrY" for="ch" forName="line_2" refType="ctrY" refFor="ch" refForName="picture_2"/>
+                <dgm:constr type="l" for="ch" forName="textparent_2"/>
+                <dgm:constr type="h" for="ch" forName="textparent_2" refType="h" refFor="ch" refForName="picture_2"/>
+                <dgm:constr type="r" for="ch" forName="textparent_2" refType="l" refFor="ch" refForName="picture_2"/>
+                <dgm:constr type="ctrY" for="ch" forName="textparent_2" refType="ctrY" refFor="ch" refForName="picture_2"/>
+                <dgm:constr type="primFontSz" for="des" forName="text_2" val="65"/>
+                <dgm:constr type="w" for="ch" forName="picture_3" refType="w" refFor="ch" refForName="picture_1" fact="0.22"/>
+                <dgm:constr type="h" for="ch" forName="picture_3" refType="h" refFor="ch" refForName="picture_1" fact="0.22"/>
+                <dgm:constr type="r" for="ch" forName="picture_3" refType="w"/>
+                <dgm:constr type="rOff" for="ch" forName="picture_3" refType="w" refFor="ch" refForName="picture_1" fact="-1.21"/>
+                <dgm:constr type="ctrY" for="ch" forName="picture_3" refType="h" refFor="ch" refForName="picture_1" fact="0.353"/>
+                <dgm:constr type="r" for="ch" forName="line_3" refType="ctrX" refFor="ch" refForName="picture_1"/>
+                <dgm:constr type="h" for="ch" forName="line_3"/>
+                <dgm:constr type="l" for="ch" forName="line_3" refType="ctrX" refFor="ch" refForName="picture_3"/>
+                <dgm:constr type="ctrY" for="ch" forName="line_3" refType="ctrY" refFor="ch" refForName="picture_3"/>
+                <dgm:constr type="l" for="ch" forName="textparent_3"/>
+                <dgm:constr type="h" for="ch" forName="textparent_3" refType="h" refFor="ch" refForName="picture_3"/>
+                <dgm:constr type="r" for="ch" forName="textparent_3" refType="l" refFor="ch" refForName="picture_3"/>
+                <dgm:constr type="ctrY" for="ch" forName="textparent_3" refType="ctrY" refFor="ch" refForName="picture_3"/>
+                <dgm:constr type="primFontSz" for="des" forName="text_3" refType="primFontSz" refFor="des" refForName="text_2" op="equ"/>
+                <dgm:constr type="w" for="ch" forName="picture_4" refType="w" refFor="ch" refForName="picture_1" fact="0.22"/>
+                <dgm:constr type="h" for="ch" forName="picture_4" refType="h" refFor="ch" refForName="picture_1" fact="0.22"/>
+                <dgm:constr type="r" for="ch" forName="picture_4" refType="w"/>
+                <dgm:constr type="rOff" for="ch" forName="picture_4" refType="w" refFor="ch" refForName="picture_1" fact="-1.21"/>
+                <dgm:constr type="ctrY" for="ch" forName="picture_4" refType="h" refFor="ch" refForName="picture_1" fact="0.647"/>
+                <dgm:constr type="r" for="ch" forName="line_4" refType="ctrX" refFor="ch" refForName="picture_1"/>
+                <dgm:constr type="h" for="ch" forName="line_4"/>
+                <dgm:constr type="l" for="ch" forName="line_4" refType="ctrX" refFor="ch" refForName="picture_4"/>
+                <dgm:constr type="ctrY" for="ch" forName="line_4" refType="ctrY" refFor="ch" refForName="picture_4"/>
+                <dgm:constr type="l" for="ch" forName="textparent_4"/>
+                <dgm:constr type="h" for="ch" forName="textparent_4" refType="h" refFor="ch" refForName="picture_4"/>
+                <dgm:constr type="r" for="ch" forName="textparent_4" refType="l" refFor="ch" refForName="picture_4"/>
+                <dgm:constr type="ctrY" for="ch" forName="textparent_4" refType="ctrY" refFor="ch" refForName="picture_4"/>
+                <dgm:constr type="primFontSz" for="des" forName="text_4" refType="primFontSz" refFor="des" refForName="text_2" op="equ"/>
+                <dgm:constr type="w" for="ch" forName="picture_5" refType="w" refFor="ch" refForName="picture_1" fact="0.22"/>
+                <dgm:constr type="h" for="ch" forName="picture_5" refType="h" refFor="ch" refForName="picture_1" fact="0.22"/>
+                <dgm:constr type="r" for="ch" forName="picture_5" refType="w"/>
+                <dgm:constr type="rOff" for="ch" forName="picture_5" refType="w" refFor="ch" refForName="picture_1" fact="-1.375"/>
+                <dgm:constr type="ctrY" for="ch" forName="picture_5" refType="h" refFor="ch" refForName="picture_1" fact="0.89"/>
+                <dgm:constr type="r" for="ch" forName="line_5" refType="ctrX" refFor="ch" refForName="picture_1"/>
+                <dgm:constr type="h" for="ch" forName="line_5"/>
+                <dgm:constr type="l" for="ch" forName="line_5" refType="ctrX" refFor="ch" refForName="picture_5"/>
+                <dgm:constr type="ctrY" for="ch" forName="line_5" refType="ctrY" refFor="ch" refForName="picture_5"/>
+                <dgm:constr type="l" for="ch" forName="textparent_5"/>
+                <dgm:constr type="h" for="ch" forName="textparent_5" refType="h" refFor="ch" refForName="picture_5"/>
+                <dgm:constr type="r" for="ch" forName="textparent_5" refType="l" refFor="ch" refForName="picture_5"/>
+                <dgm:constr type="ctrY" for="ch" forName="textparent_5" refType="ctrY" refFor="ch" refForName="picture_5"/>
+                <dgm:constr type="primFontSz" for="des" forName="text_5" refType="primFontSz" refFor="des" refForName="text_2" op="equ"/>
+              </dgm:constrLst>
+            </dgm:else>
+          </dgm:choose>
+        </dgm:if>
+        <dgm:if name="Name20" axis="ch" ptType="node" func="cnt" op="lte" val="6">
+          <dgm:choose name="Name21">
+            <dgm:if name="Name22" func="var" arg="dir" op="equ" val="norm">
+              <dgm:constrLst>
+                <dgm:constr type="h" for="ch" forName="picture_1" refType="h"/>
+                <dgm:constr type="w" for="ch" forName="picture_1" refType="h" refFor="ch" refForName="picture_1" op="equ"/>
+                <dgm:constr type="l" for="ch" forName="picture_1"/>
+                <dgm:constr type="t" for="ch" forName="picture_1"/>
+                <dgm:constr type="w" for="ch" forName="text_1" refType="w" refFor="ch" refForName="picture_1" fact="0.64"/>
+                <dgm:constr type="h" for="ch" forName="text_1" refType="h" refFor="ch" refForName="picture_1" fact="0.33"/>
+                <dgm:constr type="l" for="ch" forName="text_1" refType="l" refFor="ch" refForName="picture_1"/>
+                <dgm:constr type="lOff" for="ch" forName="text_1" refType="w" refFor="ch" refForName="picture_1" fact="0.18"/>
+                <dgm:constr type="t" for="ch" forName="text_1" refType="h" refFor="ch" refForName="picture_1" fact="0.531"/>
+                <dgm:constr type="w" for="ch" forName="picture_2" refType="w" refFor="ch" refForName="picture_1" fact="0.18"/>
+                <dgm:constr type="h" for="ch" forName="picture_2" refType="h" refFor="ch" refForName="picture_1" fact="0.18"/>
+                <dgm:constr type="l" for="ch" forName="picture_2" refType="w" refFor="ch" refForName="picture_1" fact="1.4238"/>
+                <dgm:constr type="ctrY" for="ch" forName="picture_2" refType="h" refFor="ch" refForName="picture_1" fact="0.09"/>
+                <dgm:constr type="l" for="ch" forName="line_2" refType="ctrX" refFor="ch" refForName="picture_1"/>
+                <dgm:constr type="h" for="ch" forName="line_2"/>
+                <dgm:constr type="r" for="ch" forName="line_2" refType="ctrX" refFor="ch" refForName="picture_2"/>
+                <dgm:constr type="ctrY" for="ch" forName="line_2" refType="ctrY" refFor="ch" refForName="picture_2"/>
+                <dgm:constr type="r" for="ch" forName="textparent_2" refType="w"/>
+                <dgm:constr type="h" for="ch" forName="textparent_2" refType="h" refFor="ch" refForName="picture_2"/>
+                <dgm:constr type="l" for="ch" forName="textparent_2" refType="r" refFor="ch" refForName="picture_2"/>
+                <dgm:constr type="ctrY" for="ch" forName="textparent_2" refType="ctrY" refFor="ch" refForName="picture_2"/>
+                <dgm:constr type="primFontSz" for="des" forName="text_2" val="65"/>
+                <dgm:constr type="w" for="ch" forName="picture_3" refType="w" refFor="ch" refForName="picture_1" fact="0.18"/>
+                <dgm:constr type="h" for="ch" forName="picture_3" refType="h" refFor="ch" refForName="picture_1" fact="0.18"/>
+                <dgm:constr type="l" for="ch" forName="picture_3" refType="w" refFor="ch" refForName="picture_1" fact="1.2667"/>
+                <dgm:constr type="ctrY" for="ch" forName="picture_3" refType="h" refFor="ch" refForName="picture_1" fact="0.261"/>
+                <dgm:constr type="l" for="ch" forName="line_3" refType="ctrX" refFor="ch" refForName="picture_1"/>
+                <dgm:constr type="h" for="ch" forName="line_3"/>
+                <dgm:constr type="r" for="ch" forName="line_3" refType="ctrX" refFor="ch" refForName="picture_3"/>
+                <dgm:constr type="ctrY" for="ch" forName="line_3" refType="ctrY" refFor="ch" refForName="picture_3"/>
+                <dgm:constr type="r" for="ch" forName="textparent_3" refType="w"/>
+                <dgm:constr type="h" for="ch" forName="textparent_3" refType="h" refFor="ch" refForName="picture_3"/>
+                <dgm:constr type="l" for="ch" forName="textparent_3" refType="r" refFor="ch" refForName="picture_3"/>
+                <dgm:constr type="ctrY" for="ch" forName="textparent_3" refType="ctrY" refFor="ch" refForName="picture_3"/>
+                <dgm:constr type="primFontSz" for="des" forName="text_3" refType="primFontSz" refFor="des" refForName="text_2" op="equ"/>
+                <dgm:constr type="w" for="ch" forName="picture_4" refType="w" refFor="ch" refForName="picture_1" fact="0.18"/>
+                <dgm:constr type="h" for="ch" forName="picture_4" refType="h" refFor="ch" refForName="picture_1" fact="0.18"/>
+                <dgm:constr type="l" for="ch" forName="picture_4" refType="w" refFor="ch" refForName="picture_1" fact="1.21"/>
+                <dgm:constr type="ctrY" for="ch" forName="picture_4" refType="h" refFor="ch" refForName="picture_1" fact="0.5"/>
+                <dgm:constr type="l" for="ch" forName="line_4" refType="ctrX" refFor="ch" refForName="picture_1"/>
+                <dgm:constr type="h" for="ch" forName="line_4"/>
+                <dgm:constr type="r" for="ch" forName="line_4" refType="ctrX" refFor="ch" refForName="picture_4"/>
+                <dgm:constr type="ctrY" for="ch" forName="line_4" refType="ctrY" refFor="ch" refForName="picture_4"/>
+                <dgm:constr type="r" for="ch" forName="textparent_4" refType="w"/>
+                <dgm:constr type="h" for="ch" forName="textparent_4" refType="h" refFor="ch" refForName="picture_4"/>
+                <dgm:constr type="l" for="ch" forName="textparent_4" refType="r" refFor="ch" refForName="picture_4"/>
+                <dgm:constr type="ctrY" for="ch" forName="textparent_4" refType="ctrY" refFor="ch" refForName="picture_4"/>
+                <dgm:constr type="primFontSz" for="des" forName="text_4" refType="primFontSz" refFor="des" refForName="text_2" op="equ"/>
+                <dgm:constr type="w" for="ch" forName="picture_5" refType="w" refFor="ch" refForName="picture_1" fact="0.18"/>
+                <dgm:constr type="h" for="ch" forName="picture_5" refType="h" refFor="ch" refForName="picture_1" fact="0.18"/>
+                <dgm:constr type="l" for="ch" forName="picture_5" refType="w" refFor="ch" refForName="picture_1" fact="1.2667"/>
+                <dgm:constr type="ctrY" for="ch" forName="picture_5" refType="h" refFor="ch" refForName="picture_1" fact="0.739"/>
+                <dgm:constr type="l" for="ch" forName="line_5" refType="ctrX" refFor="ch" refForName="picture_1"/>
+                <dgm:constr type="h" for="ch" forName="line_5"/>
+                <dgm:constr type="r" for="ch" forName="line_5" refType="ctrX" refFor="ch" refForName="picture_5"/>
+                <dgm:constr type="ctrY" for="ch" forName="line_5" refType="ctrY" refFor="ch" refForName="picture_5"/>
+                <dgm:constr type="r" for="ch" forName="textparent_5" refType="w"/>
+                <dgm:constr type="h" for="ch" forName="textparent_5" refType="h" refFor="ch" refForName="picture_5"/>
+                <dgm:constr type="l" for="ch" forName="textparent_5" refType="r" refFor="ch" refForName="picture_5"/>
+                <dgm:constr type="ctrY" for="ch" forName="textparent_5" refType="ctrY" refFor="ch" refForName="picture_5"/>
+                <dgm:constr type="primFontSz" for="des" forName="text_5" refType="primFontSz" refFor="des" refForName="text_2" op="equ"/>
+                <dgm:constr type="w" for="ch" forName="picture_6" refType="w" refFor="ch" refForName="picture_1" fact="0.18"/>
+                <dgm:constr type="h" for="ch" forName="picture_6" refType="h" refFor="ch" refForName="picture_1" fact="0.18"/>
+                <dgm:constr type="l" for="ch" forName="picture_6" refType="w" refFor="ch" refForName="picture_1" fact="1.4238"/>
+                <dgm:constr type="ctrY" for="ch" forName="picture_6" refType="h" refFor="ch" refForName="picture_1" fact="0.91"/>
+                <dgm:constr type="l" for="ch" forName="line_6" refType="ctrX" refFor="ch" refForName="picture_1"/>
+                <dgm:constr type="h" for="ch" forName="line_6"/>
+                <dgm:constr type="r" for="ch" forName="line_6" refType="ctrX" refFor="ch" refForName="picture_6"/>
+                <dgm:constr type="ctrY" for="ch" forName="line_6" refType="ctrY" refFor="ch" refForName="picture_6"/>
+                <dgm:constr type="r" for="ch" forName="textparent_6" refType="w"/>
+                <dgm:constr type="h" for="ch" forName="textparent_6" refType="h" refFor="ch" refForName="picture_6"/>
+                <dgm:constr type="l" for="ch" forName="textparent_6" refType="r" refFor="ch" refForName="picture_6"/>
+                <dgm:constr type="ctrY" for="ch" forName="textparent_6" refType="ctrY" refFor="ch" refForName="picture_6"/>
+                <dgm:constr type="primFontSz" for="des" forName="text_6" refType="primFontSz" refFor="des" refForName="text_2" op="equ"/>
+              </dgm:constrLst>
+            </dgm:if>
+            <dgm:else name="Name23">
+              <dgm:constrLst>
+                <dgm:constr type="h" for="ch" forName="picture_1" refType="h"/>
+                <dgm:constr type="w" for="ch" forName="picture_1" refType="h" refFor="ch" refForName="picture_1" op="equ"/>
+                <dgm:constr type="r" for="ch" forName="picture_1" refType="w"/>
+                <dgm:constr type="t" for="ch" forName="picture_1"/>
+                <dgm:constr type="w" for="ch" forName="text_1" refType="w" refFor="ch" refForName="picture_1" fact="0.64"/>
+                <dgm:constr type="h" for="ch" forName="text_1" refType="h" refFor="ch" refForName="picture_1" fact="0.33"/>
+                <dgm:constr type="l" for="ch" forName="text_1" refType="l" refFor="ch" refForName="picture_1"/>
+                <dgm:constr type="lOff" for="ch" forName="text_1" refType="w" refFor="ch" refForName="picture_1" fact="0.18"/>
+                <dgm:constr type="t" for="ch" forName="text_1" refType="h" refFor="ch" refForName="picture_1" fact="0.531"/>
+                <dgm:constr type="w" for="ch" forName="picture_2" refType="w" refFor="ch" refForName="picture_1" fact="0.18"/>
+                <dgm:constr type="h" for="ch" forName="picture_2" refType="h" refFor="ch" refForName="picture_1" fact="0.18"/>
+                <dgm:constr type="r" for="ch" forName="picture_2" refType="w"/>
+                <dgm:constr type="rOff" for="ch" forName="picture_2" refType="w" refFor="ch" refForName="picture_1" fact="-1.4238"/>
+                <dgm:constr type="ctrY" for="ch" forName="picture_2" refType="h" refFor="ch" refForName="picture_1" fact="0.09"/>
+                <dgm:constr type="r" for="ch" forName="line_2" refType="ctrX" refFor="ch" refForName="picture_1"/>
+                <dgm:constr type="h" for="ch" forName="line_2"/>
+                <dgm:constr type="l" for="ch" forName="line_2" refType="ctrX" refFor="ch" refForName="picture_2"/>
+                <dgm:constr type="ctrY" for="ch" forName="line_2" refType="ctrY" refFor="ch" refForName="picture_2"/>
+                <dgm:constr type="l" for="ch" forName="textparent_2"/>
+                <dgm:constr type="h" for="ch" forName="textparent_2" refType="h" refFor="ch" refForName="picture_2"/>
+                <dgm:constr type="r" for="ch" forName="textparent_2" refType="l" refFor="ch" refForName="picture_2"/>
+                <dgm:constr type="ctrY" for="ch" forName="textparent_2" refType="ctrY" refFor="ch" refForName="picture_2"/>
+                <dgm:constr type="primFontSz" for="des" forName="text_2" val="65"/>
+                <dgm:constr type="w" for="ch" forName="picture_3" refType="w" refFor="ch" refForName="picture_1" fact="0.18"/>
+                <dgm:constr type="h" for="ch" forName="picture_3" refType="h" refFor="ch" refForName="picture_1" fact="0.18"/>
+                <dgm:constr type="r" for="ch" forName="picture_3" refType="w"/>
+                <dgm:constr type="rOff" for="ch" forName="picture_3" refType="w" refFor="ch" refForName="picture_1" fact="-1.2667"/>
+                <dgm:constr type="ctrY" for="ch" forName="picture_3" refType="h" refFor="ch" refForName="picture_1" fact="0.261"/>
+                <dgm:constr type="r" for="ch" forName="line_3" refType="ctrX" refFor="ch" refForName="picture_1"/>
+                <dgm:constr type="h" for="ch" forName="line_3"/>
+                <dgm:constr type="l" for="ch" forName="line_3" refType="ctrX" refFor="ch" refForName="picture_3"/>
+                <dgm:constr type="ctrY" for="ch" forName="line_3" refType="ctrY" refFor="ch" refForName="picture_3"/>
+                <dgm:constr type="l" for="ch" forName="textparent_3"/>
+                <dgm:constr type="h" for="ch" forName="textparent_3" refType="h" refFor="ch" refForName="picture_3"/>
+                <dgm:constr type="r" for="ch" forName="textparent_3" refType="l" refFor="ch" refForName="picture_3"/>
+                <dgm:constr type="ctrY" for="ch" forName="textparent_3" refType="ctrY" refFor="ch" refForName="picture_3"/>
+                <dgm:constr type="primFontSz" for="des" forName="text_3" refType="primFontSz" refFor="des" refForName="text_2" op="equ"/>
+                <dgm:constr type="w" for="ch" forName="picture_4" refType="w" refFor="ch" refForName="picture_1" fact="0.18"/>
+                <dgm:constr type="h" for="ch" forName="picture_4" refType="h" refFor="ch" refForName="picture_1" fact="0.18"/>
+                <dgm:constr type="r" for="ch" forName="picture_4" refType="w"/>
+                <dgm:constr type="rOff" for="ch" forName="picture_4" refType="w" refFor="ch" refForName="picture_1" fact="-1.21"/>
+                <dgm:constr type="ctrY" for="ch" forName="picture_4" refType="h" refFor="ch" refForName="picture_1" fact="0.5"/>
+                <dgm:constr type="r" for="ch" forName="line_4" refType="ctrX" refFor="ch" refForName="picture_1"/>
+                <dgm:constr type="h" for="ch" forName="line_4"/>
+                <dgm:constr type="l" for="ch" forName="line_4" refType="ctrX" refFor="ch" refForName="picture_4"/>
+                <dgm:constr type="ctrY" for="ch" forName="line_4" refType="ctrY" refFor="ch" refForName="picture_4"/>
+                <dgm:constr type="l" for="ch" forName="textparent_4"/>
+                <dgm:constr type="h" for="ch" forName="textparent_4" refType="h" refFor="ch" refForName="picture_4"/>
+                <dgm:constr type="r" for="ch" forName="textparent_4" refType="l" refFor="ch" refForName="picture_4"/>
+                <dgm:constr type="ctrY" for="ch" forName="textparent_4" refType="ctrY" refFor="ch" refForName="picture_4"/>
+                <dgm:constr type="primFontSz" for="des" forName="text_4" refType="primFontSz" refFor="des" refForName="text_2" op="equ"/>
+                <dgm:constr type="w" for="ch" forName="picture_5" refType="w" refFor="ch" refForName="picture_1" fact="0.18"/>
+                <dgm:constr type="h" for="ch" forName="picture_5" refType="h" refFor="ch" refForName="picture_1" fact="0.18"/>
+                <dgm:constr type="r" for="ch" forName="picture_5" refType="w"/>
+                <dgm:constr type="rOff" for="ch" forName="picture_5" refType="w" refFor="ch" refForName="picture_1" fact="-1.2667"/>
+                <dgm:constr type="ctrY" for="ch" forName="picture_5" refType="h" refFor="ch" refForName="picture_1" fact="0.739"/>
+                <dgm:constr type="r" for="ch" forName="line_5" refType="ctrX" refFor="ch" refForName="picture_1"/>
+                <dgm:constr type="h" for="ch" forName="line_5"/>
+                <dgm:constr type="l" for="ch" forName="line_5" refType="ctrX" refFor="ch" refForName="picture_5"/>
+                <dgm:constr type="ctrY" for="ch" forName="line_5" refType="ctrY" refFor="ch" refForName="picture_5"/>
+                <dgm:constr type="l" for="ch" forName="textparent_5"/>
+                <dgm:constr type="h" for="ch" forName="textparent_5" refType="h" refFor="ch" refForName="picture_5"/>
+                <dgm:constr type="r" for="ch" forName="textparent_5" refType="l" refFor="ch" refForName="picture_5"/>
+                <dgm:constr type="ctrY" for="ch" forName="textparent_5" refType="ctrY" refFor="ch" refForName="picture_5"/>
+                <dgm:constr type="primFontSz" for="des" forName="text_5" refType="primFontSz" refFor="des" refForName="text_2" op="equ"/>
+                <dgm:constr type="w" for="ch" forName="picture_6" refType="w" refFor="ch" refForName="picture_1" fact="0.18"/>
+                <dgm:constr type="h" for="ch" forName="picture_6" refType="h" refFor="ch" refForName="picture_1" fact="0.18"/>
+                <dgm:constr type="r" for="ch" forName="picture_6" refType="w"/>
+                <dgm:constr type="rOff" for="ch" forName="picture_6" refType="w" refFor="ch" refForName="picture_1" fact="-1.4238"/>
+                <dgm:constr type="ctrY" for="ch" forName="picture_6" refType="h" refFor="ch" refForName="picture_1" fact="0.91"/>
+                <dgm:constr type="r" for="ch" forName="line_6" refType="ctrX" refFor="ch" refForName="picture_1"/>
+                <dgm:constr type="h" for="ch" forName="line_6"/>
+                <dgm:constr type="l" for="ch" forName="line_6" refType="ctrX" refFor="ch" refForName="picture_6"/>
+                <dgm:constr type="ctrY" for="ch" forName="line_6" refType="ctrY" refFor="ch" refForName="picture_6"/>
+                <dgm:constr type="l" for="ch" forName="textparent_6"/>
+                <dgm:constr type="h" for="ch" forName="textparent_6" refType="h" refFor="ch" refForName="picture_6"/>
+                <dgm:constr type="r" for="ch" forName="textparent_6" refType="l" refFor="ch" refForName="picture_6"/>
+                <dgm:constr type="ctrY" for="ch" forName="textparent_6" refType="ctrY" refFor="ch" refForName="picture_6"/>
+                <dgm:constr type="primFontSz" for="des" forName="text_6" refType="primFontSz" refFor="des" refForName="text_2" op="equ"/>
+              </dgm:constrLst>
+            </dgm:else>
+          </dgm:choose>
+        </dgm:if>
+        <dgm:else name="Name24">
+          <dgm:choose name="Name25">
+            <dgm:if name="Name26" func="var" arg="dir" op="equ" val="norm">
+              <dgm:constrLst>
+                <dgm:constr type="h" for="ch" forName="picture_1" refType="h"/>
+                <dgm:constr type="w" for="ch" forName="picture_1" refType="h" refFor="ch" refForName="picture_1" op="equ"/>
+                <dgm:constr type="l" for="ch" forName="picture_1"/>
+                <dgm:constr type="t" for="ch" forName="picture_1"/>
+                <dgm:constr type="w" for="ch" forName="text_1" refType="w" refFor="ch" refForName="picture_1" fact="0.64"/>
+                <dgm:constr type="h" for="ch" forName="text_1" refType="h" refFor="ch" refForName="picture_1" fact="0.33"/>
+                <dgm:constr type="l" for="ch" forName="text_1" refType="l" refFor="ch" refForName="picture_1"/>
+                <dgm:constr type="lOff" for="ch" forName="text_1" refType="w" refFor="ch" refForName="picture_1" fact="0.18"/>
+                <dgm:constr type="t" for="ch" forName="text_1" refType="h" refFor="ch" refForName="picture_1" fact="0.531"/>
+                <dgm:constr type="w" for="ch" forName="picture_2" refType="w" refFor="ch" refForName="picture_1" fact="0.15"/>
+                <dgm:constr type="h" for="ch" forName="picture_2" refType="h" refFor="ch" refForName="picture_1" fact="0.15"/>
+                <dgm:constr type="l" for="ch" forName="picture_2" refType="w" refFor="ch" refForName="picture_1" fact="1.4363"/>
+                <dgm:constr type="ctrY" for="ch" forName="picture_2" refType="h" refFor="ch" refForName="picture_1" fact="0.075"/>
+                <dgm:constr type="l" for="ch" forName="line_2" refType="ctrX" refFor="ch" refForName="picture_1"/>
+                <dgm:constr type="h" for="ch" forName="line_2"/>
+                <dgm:constr type="r" for="ch" forName="line_2" refType="ctrX" refFor="ch" refForName="picture_2"/>
+                <dgm:constr type="ctrY" for="ch" forName="line_2" refType="ctrY" refFor="ch" refForName="picture_2"/>
+                <dgm:constr type="r" for="ch" forName="textparent_2" refType="w"/>
+                <dgm:constr type="h" for="ch" forName="textparent_2" refType="h" refFor="ch" refForName="picture_2"/>
+                <dgm:constr type="l" for="ch" forName="textparent_2" refType="r" refFor="ch" refForName="picture_2"/>
+                <dgm:constr type="ctrY" for="ch" forName="textparent_2" refType="ctrY" refFor="ch" refForName="picture_2"/>
+                <dgm:constr type="primFontSz" for="des" forName="text_2" val="65"/>
+                <dgm:constr type="w" for="ch" forName="picture_3" refType="w" refFor="ch" refForName="picture_1" fact="0.15"/>
+                <dgm:constr type="h" for="ch" forName="picture_3" refType="h" refFor="ch" refForName="picture_1" fact="0.15"/>
+                <dgm:constr type="l" for="ch" forName="picture_3" refType="w" refFor="ch" refForName="picture_1" fact="1.2898"/>
+                <dgm:constr type="ctrY" for="ch" forName="picture_3" refType="h" refFor="ch" refForName="picture_1" fact="0.227"/>
+                <dgm:constr type="l" for="ch" forName="line_3" refType="ctrX" refFor="ch" refForName="picture_1"/>
+                <dgm:constr type="h" for="ch" forName="line_3"/>
+                <dgm:constr type="r" for="ch" forName="line_3" refType="ctrX" refFor="ch" refForName="picture_3"/>
+                <dgm:constr type="ctrY" for="ch" forName="line_3" refType="ctrY" refFor="ch" refForName="picture_3"/>
+                <dgm:constr type="r" for="ch" forName="textparent_3" refType="w"/>
+                <dgm:constr type="h" for="ch" forName="textparent_3" refType="h" refFor="ch" refForName="picture_3"/>
+                <dgm:constr type="l" for="ch" forName="textparent_3" refType="r" refFor="ch" refForName="picture_3"/>
+                <dgm:constr type="ctrY" for="ch" forName="textparent_3" refType="ctrY" refFor="ch" refForName="picture_3"/>
+                <dgm:constr type="primFontSz" for="des" forName="text_3" refType="primFontSz" refFor="des" refForName="text_2" op="equ"/>
+                <dgm:constr type="w" for="ch" forName="picture_4" refType="w" refFor="ch" refForName="picture_1" fact="0.15"/>
+                <dgm:constr type="h" for="ch" forName="picture_4" refType="h" refFor="ch" refForName="picture_1" fact="0.15"/>
+                <dgm:constr type="l" for="ch" forName="picture_4" refType="w" refFor="ch" refForName="picture_1" fact="1.21"/>
+                <dgm:constr type="ctrY" for="ch" forName="picture_4" refType="h" refFor="ch" refForName="picture_1" fact="0.405"/>
+                <dgm:constr type="l" for="ch" forName="line_4" refType="ctrX" refFor="ch" refForName="picture_1"/>
+                <dgm:constr type="h" for="ch" forName="line_4"/>
+                <dgm:constr type="r" for="ch" forName="line_4" refType="ctrX" refFor="ch" refForName="picture_4"/>
+                <dgm:constr type="ctrY" for="ch" forName="line_4" refType="ctrY" refFor="ch" refForName="picture_4"/>
+                <dgm:constr type="r" for="ch" forName="textparent_4" refType="w"/>
+                <dgm:constr type="h" for="ch" forName="textparent_4" refType="h" refFor="ch" refForName="picture_4"/>
+                <dgm:constr type="l" for="ch" forName="textparent_4" refType="r" refFor="ch" refForName="picture_4"/>
+                <dgm:constr type="ctrY" for="ch" forName="textparent_4" refType="ctrY" refFor="ch" refForName="picture_4"/>
+                <dgm:constr type="primFontSz" for="des" forName="text_4" refType="primFontSz" refFor="des" refForName="text_2" op="equ"/>
+                <dgm:constr type="w" for="ch" forName="picture_5" refType="w" refFor="ch" refForName="picture_1" fact="0.15"/>
+                <dgm:constr type="h" for="ch" forName="picture_5" refType="h" refFor="ch" refForName="picture_1" fact="0.15"/>
+                <dgm:constr type="l" for="ch" forName="picture_5" refType="w" refFor="ch" refForName="picture_1" fact="1.21"/>
+                <dgm:constr type="ctrY" for="ch" forName="picture_5" refType="h" refFor="ch" refForName="picture_1" fact="0.595"/>
+                <dgm:constr type="l" for="ch" forName="line_5" refType="ctrX" refFor="ch" refForName="picture_1"/>
+                <dgm:constr type="h" for="ch" forName="line_5"/>
+                <dgm:constr type="r" for="ch" forName="line_5" refType="ctrX" refFor="ch" refForName="picture_5"/>
+                <dgm:constr type="ctrY" for="ch" forName="line_5" refType="ctrY" refFor="ch" refForName="picture_5"/>
+                <dgm:constr type="r" for="ch" forName="textparent_5" refType="w"/>
+                <dgm:constr type="h" for="ch" forName="textparent_5" refType="h" refFor="ch" refForName="picture_5"/>
+                <dgm:constr type="l" for="ch" forName="textparent_5" refType="r" refFor="ch" refForName="picture_5"/>
+                <dgm:constr type="ctrY" for="ch" forName="textparent_5" refType="ctrY" refFor="ch" refForName="picture_5"/>
+                <dgm:constr type="primFontSz" for="des" forName="text_5" refType="primFontSz" refFor="des" refForName="text_2" op="equ"/>
+                <dgm:constr type="w" for="ch" forName="picture_6" refType="w" refFor="ch" refForName="picture_1" fact="0.15"/>
+                <dgm:constr type="h" for="ch" forName="picture_6" refType="h" refFor="ch" refForName="picture_1" fact="0.15"/>
+                <dgm:constr type="l" for="ch" forName="picture_6" refType="w" refFor="ch" refForName="picture_1" fact="1.2898"/>
+                <dgm:constr type="ctrY" for="ch" forName="picture_6" refType="h" refFor="ch" refForName="picture_1" fact="0.773"/>
+                <dgm:constr type="l" for="ch" forName="line_6" refType="ctrX" refFor="ch" refForName="picture_1"/>
+                <dgm:constr type="h" for="ch" forName="line_6"/>
+                <dgm:constr type="r" for="ch" forName="line_6" refType="ctrX" refFor="ch" refForName="picture_6"/>
+                <dgm:constr type="ctrY" for="ch" forName="line_6" refType="ctrY" refFor="ch" refForName="picture_6"/>
+                <dgm:constr type="r" for="ch" forName="textparent_6" refType="w"/>
+                <dgm:constr type="h" for="ch" forName="textparent_6" refType="h" refFor="ch" refForName="picture_6"/>
+                <dgm:constr type="l" for="ch" forName="textparent_6" refType="r" refFor="ch" refForName="picture_6"/>
+                <dgm:constr type="ctrY" for="ch" forName="textparent_6" refType="ctrY" refFor="ch" refForName="picture_6"/>
+                <dgm:constr type="primFontSz" for="des" forName="text_6" refType="primFontSz" refFor="des" refForName="text_2" op="equ"/>
+                <dgm:constr type="w" for="ch" forName="picture_7" refType="w" refFor="ch" refForName="picture_1" fact="0.15"/>
+                <dgm:constr type="h" for="ch" forName="picture_7" refType="h" refFor="ch" refForName="picture_1" fact="0.15"/>
+                <dgm:constr type="l" for="ch" forName="picture_7" refType="w" refFor="ch" refForName="picture_1" fact="1.4363"/>
+                <dgm:constr type="ctrY" for="ch" forName="picture_7" refType="h" refFor="ch" refForName="picture_1" fact="0.925"/>
+                <dgm:constr type="l" for="ch" forName="line_7" refType="ctrX" refFor="ch" refForName="picture_1"/>
+                <dgm:constr type="h" for="ch" forName="line_7"/>
+                <dgm:constr type="r" for="ch" forName="line_7" refType="ctrX" refFor="ch" refForName="picture_7"/>
+                <dgm:constr type="ctrY" for="ch" forName="line_7" refType="ctrY" refFor="ch" refForName="picture_7"/>
+                <dgm:constr type="r" for="ch" forName="textparent_7" refType="w"/>
+                <dgm:constr type="h" for="ch" forName="textparent_7" refType="h" refFor="ch" refForName="picture_7"/>
+                <dgm:constr type="l" for="ch" forName="textparent_7" refType="r" refFor="ch" refForName="picture_7"/>
+                <dgm:constr type="ctrY" for="ch" forName="textparent_7" refType="ctrY" refFor="ch" refForName="picture_7"/>
+                <dgm:constr type="primFontSz" for="des" forName="text_7" refType="primFontSz" refFor="des" refForName="text_2" op="equ"/>
+              </dgm:constrLst>
+            </dgm:if>
+            <dgm:else name="Name27">
+              <dgm:constrLst>
+                <dgm:constr type="h" for="ch" forName="picture_1" refType="h"/>
+                <dgm:constr type="w" for="ch" forName="picture_1" refType="h" refFor="ch" refForName="picture_1" op="equ"/>
+                <dgm:constr type="r" for="ch" forName="picture_1" refType="w"/>
+                <dgm:constr type="t" for="ch" forName="picture_1"/>
+                <dgm:constr type="w" for="ch" forName="text_1" refType="w" refFor="ch" refForName="picture_1" fact="0.64"/>
+                <dgm:constr type="h" for="ch" forName="text_1" refType="h" refFor="ch" refForName="picture_1" fact="0.33"/>
+                <dgm:constr type="l" for="ch" forName="text_1" refType="l" refFor="ch" refForName="picture_1"/>
+                <dgm:constr type="lOff" for="ch" forName="text_1" refType="w" refFor="ch" refForName="picture_1" fact="0.18"/>
+                <dgm:constr type="t" for="ch" forName="text_1" refType="h" refFor="ch" refForName="picture_1" fact="0.531"/>
+                <dgm:constr type="w" for="ch" forName="picture_2" refType="w" refFor="ch" refForName="picture_1" fact="0.15"/>
+                <dgm:constr type="h" for="ch" forName="picture_2" refType="h" refFor="ch" refForName="picture_1" fact="0.15"/>
+                <dgm:constr type="r" for="ch" forName="picture_2" refType="w"/>
+                <dgm:constr type="rOff" for="ch" forName="picture_2" refType="w" refFor="ch" refForName="picture_1" fact="-1.4363"/>
+                <dgm:constr type="ctrY" for="ch" forName="picture_2" refType="h" refFor="ch" refForName="picture_1" fact="0.075"/>
+                <dgm:constr type="r" for="ch" forName="line_2" refType="ctrX" refFor="ch" refForName="picture_1"/>
+                <dgm:constr type="h" for="ch" forName="line_2"/>
+                <dgm:constr type="l" for="ch" forName="line_2" refType="ctrX" refFor="ch" refForName="picture_2"/>
+                <dgm:constr type="ctrY" for="ch" forName="line_2" refType="ctrY" refFor="ch" refForName="picture_2"/>
+                <dgm:constr type="l" for="ch" forName="textparent_2"/>
+                <dgm:constr type="h" for="ch" forName="textparent_2" refType="h" refFor="ch" refForName="picture_2"/>
+                <dgm:constr type="r" for="ch" forName="textparent_2" refType="l" refFor="ch" refForName="picture_2"/>
+                <dgm:constr type="ctrY" for="ch" forName="textparent_2" refType="ctrY" refFor="ch" refForName="picture_2"/>
+                <dgm:constr type="primFontSz" for="des" forName="text_2" val="65"/>
+                <dgm:constr type="w" for="ch" forName="picture_3" refType="w" refFor="ch" refForName="picture_1" fact="0.15"/>
+                <dgm:constr type="h" for="ch" forName="picture_3" refType="h" refFor="ch" refForName="picture_1" fact="0.15"/>
+                <dgm:constr type="r" for="ch" forName="picture_3" refType="w"/>
+                <dgm:constr type="rOff" for="ch" forName="picture_3" refType="w" refFor="ch" refForName="picture_1" fact="-1.2898"/>
+                <dgm:constr type="ctrY" for="ch" forName="picture_3" refType="h" refFor="ch" refForName="picture_1" fact="0.227"/>
+                <dgm:constr type="r" for="ch" forName="line_3" refType="ctrX" refFor="ch" refForName="picture_1"/>
+                <dgm:constr type="h" for="ch" forName="line_3"/>
+                <dgm:constr type="l" for="ch" forName="line_3" refType="ctrX" refFor="ch" refForName="picture_3"/>
+                <dgm:constr type="ctrY" for="ch" forName="line_3" refType="ctrY" refFor="ch" refForName="picture_3"/>
+                <dgm:constr type="l" for="ch" forName="textparent_3"/>
+                <dgm:constr type="h" for="ch" forName="textparent_3" refType="h" refFor="ch" refForName="picture_3"/>
+                <dgm:constr type="r" for="ch" forName="textparent_3" refType="l" refFor="ch" refForName="picture_3"/>
+                <dgm:constr type="ctrY" for="ch" forName="textparent_3" refType="ctrY" refFor="ch" refForName="picture_3"/>
+                <dgm:constr type="primFontSz" for="des" forName="text_3" refType="primFontSz" refFor="des" refForName="text_2" op="equ"/>
+                <dgm:constr type="w" for="ch" forName="picture_4" refType="w" refFor="ch" refForName="picture_1" fact="0.15"/>
+                <dgm:constr type="h" for="ch" forName="picture_4" refType="h" refFor="ch" refForName="picture_1" fact="0.15"/>
+                <dgm:constr type="r" for="ch" forName="picture_4" refType="w"/>
+                <dgm:constr type="rOff" for="ch" forName="picture_4" refType="w" refFor="ch" refForName="picture_1" fact="-1.21"/>
+                <dgm:constr type="ctrY" for="ch" forName="picture_4" refType="h" refFor="ch" refForName="picture_1" fact="0.405"/>
+                <dgm:constr type="r" for="ch" forName="line_4" refType="ctrX" refFor="ch" refForName="picture_1"/>
+                <dgm:constr type="h" for="ch" forName="line_4"/>
+                <dgm:constr type="l" for="ch" forName="line_4" refType="ctrX" refFor="ch" refForName="picture_4"/>
+                <dgm:constr type="ctrY" for="ch" forName="line_4" refType="ctrY" refFor="ch" refForName="picture_4"/>
+                <dgm:constr type="l" for="ch" forName="textparent_4"/>
+                <dgm:constr type="h" for="ch" forName="textparent_4" refType="h" refFor="ch" refForName="picture_4"/>
+                <dgm:constr type="r" for="ch" forName="textparent_4" refType="l" refFor="ch" refForName="picture_4"/>
+                <dgm:constr type="ctrY" for="ch" forName="textparent_4" refType="ctrY" refFor="ch" refForName="picture_4"/>
+                <dgm:constr type="primFontSz" for="des" forName="text_4" refType="primFontSz" refFor="des" refForName="text_2" op="equ"/>
+                <dgm:constr type="w" for="ch" forName="picture_5" refType="w" refFor="ch" refForName="picture_1" fact="0.15"/>
+                <dgm:constr type="h" for="ch" forName="picture_5" refType="h" refFor="ch" refForName="picture_1" fact="0.15"/>
+                <dgm:constr type="r" for="ch" forName="picture_5" refType="w"/>
+                <dgm:constr type="rOff" for="ch" forName="picture_5" refType="w" refFor="ch" refForName="picture_1" fact="-1.21"/>
+                <dgm:constr type="ctrY" for="ch" forName="picture_5" refType="h" refFor="ch" refForName="picture_1" fact="0.595"/>
+                <dgm:constr type="r" for="ch" forName="line_5" refType="ctrX" refFor="ch" refForName="picture_1"/>
+                <dgm:constr type="h" for="ch" forName="line_5"/>
+                <dgm:constr type="l" for="ch" forName="line_5" refType="ctrX" refFor="ch" refForName="picture_5"/>
+                <dgm:constr type="ctrY" for="ch" forName="line_5" refType="ctrY" refFor="ch" refForName="picture_5"/>
+                <dgm:constr type="l" for="ch" forName="textparent_5"/>
+                <dgm:constr type="h" for="ch" forName="textparent_5" refType="h" refFor="ch" refForName="picture_5"/>
+                <dgm:constr type="r" for="ch" forName="textparent_5" refType="l" refFor="ch" refForName="picture_5"/>
+                <dgm:constr type="ctrY" for="ch" forName="textparent_5" refType="ctrY" refFor="ch" refForName="picture_5"/>
+                <dgm:constr type="primFontSz" for="des" forName="text_5" refType="primFontSz" refFor="des" refForName="text_2" op="equ"/>
+                <dgm:constr type="w" for="ch" forName="picture_6" refType="w" refFor="ch" refForName="picture_1" fact="0.15"/>
+                <dgm:constr type="h" for="ch" forName="picture_6" refType="h" refFor="ch" refForName="picture_1" fact="0.15"/>
+                <dgm:constr type="r" for="ch" forName="picture_6" refType="w"/>
+                <dgm:constr type="rOff" for="ch" forName="picture_6" refType="w" refFor="ch" refForName="picture_1" fact="-1.2898"/>
+                <dgm:constr type="ctrY" for="ch" forName="picture_6" refType="h" refFor="ch" refForName="picture_1" fact="0.773"/>
+                <dgm:constr type="r" for="ch" forName="line_6" refType="ctrX" refFor="ch" refForName="picture_1"/>
+                <dgm:constr type="h" for="ch" forName="line_6"/>
+                <dgm:constr type="l" for="ch" forName="line_6" refType="ctrX" refFor="ch" refForName="picture_6"/>
+                <dgm:constr type="ctrY" for="ch" forName="line_6" refType="ctrY" refFor="ch" refForName="picture_6"/>
+                <dgm:constr type="l" for="ch" forName="textparent_6"/>
+                <dgm:constr type="h" for="ch" forName="textparent_6" refType="h" refFor="ch" refForName="picture_6"/>
+                <dgm:constr type="r" for="ch" forName="textparent_6" refType="l" refFor="ch" refForName="picture_6"/>
+                <dgm:constr type="ctrY" for="ch" forName="textparent_6" refType="ctrY" refFor="ch" refForName="picture_6"/>
+                <dgm:constr type="primFontSz" for="des" forName="text_6" refType="primFontSz" refFor="des" refForName="text_2" op="equ"/>
+                <dgm:constr type="w" for="ch" forName="picture_7" refType="w" refFor="ch" refForName="picture_1" fact="0.15"/>
+                <dgm:constr type="h" for="ch" forName="picture_7" refType="h" refFor="ch" refForName="picture_1" fact="0.15"/>
+                <dgm:constr type="r" for="ch" forName="picture_7" refType="w"/>
+                <dgm:constr type="rOff" for="ch" forName="picture_7" refType="w" refFor="ch" refForName="picture_1" fact="-1.4363"/>
+                <dgm:constr type="ctrY" for="ch" forName="picture_7" refType="h" refFor="ch" refForName="picture_1" fact="0.925"/>
+                <dgm:constr type="r" for="ch" forName="line_7" refType="ctrX" refFor="ch" refForName="picture_1"/>
+                <dgm:constr type="h" for="ch" forName="line_7"/>
+                <dgm:constr type="l" for="ch" forName="line_7" refType="ctrX" refFor="ch" refForName="picture_7"/>
+                <dgm:constr type="ctrY" for="ch" forName="line_7" refType="ctrY" refFor="ch" refForName="picture_7"/>
+                <dgm:constr type="l" for="ch" forName="textparent_7"/>
+                <dgm:constr type="h" for="ch" forName="textparent_7" refType="h" refFor="ch" refForName="picture_7"/>
+                <dgm:constr type="r" for="ch" forName="textparent_7" refType="l" refFor="ch" refForName="picture_7"/>
+                <dgm:constr type="ctrY" for="ch" forName="textparent_7" refType="ctrY" refFor="ch" refForName="picture_7"/>
+                <dgm:constr type="primFontSz" for="des" forName="text_7" refType="primFontSz" refFor="des" refForName="text_2" op="equ"/>
+              </dgm:constrLst>
+            </dgm:else>
+          </dgm:choose>
+        </dgm:else>
+      </dgm:choose>
+      <dgm:forEach name="wrapper" axis="self" ptType="parTrans">
+        <dgm:forEach name="wrapper2" axis="self" ptType="sibTrans" st="2">
+          <dgm:forEach name="pictureRepeat" axis="self">
+            <dgm:layoutNode name="pictureRepeatNode" styleLbl="alignImgPlace1">
+              <dgm:alg type="sp"/>
+              <dgm:shape xmlns:r="http://schemas.openxmlformats.org/officeDocument/2006/relationships" type="ellipse" r:blip="" blipPhldr="1">
+                <dgm:adjLst/>
+              </dgm:shape>
+              <dgm:presOf axis="self"/>
+            </dgm:layoutNode>
+          </dgm:forEach>
+        </dgm:forEach>
+      </dgm:forEach>
+      <dgm:forEach name="Name28" axis="ch" ptType="sibTrans" hideLastTrans="0" cnt="1">
+        <dgm:layoutNode name="picture_1">
+          <dgm:alg type="sp"/>
+          <dgm:shape xmlns:r="http://schemas.openxmlformats.org/officeDocument/2006/relationships" r:blip="">
+            <dgm:adjLst/>
+          </dgm:shape>
+          <dgm:presOf/>
+          <dgm:constrLst/>
+          <dgm:forEach name="Name29" ref="pictureRepeat"/>
+        </dgm:layoutNode>
+      </dgm:forEach>
+      <dgm:forEach name="Name30" axis="ch" ptType="node" cnt="1">
+        <dgm:layoutNode name="text_1" styleLbl="node1">
+          <dgm:varLst>
+            <dgm:bulletEnabled val="1"/>
+          </dgm:varLst>
+          <dgm:alg type="tx">
+            <dgm:param type="txAnchorVert" val="b"/>
+            <dgm:param type="txAnchorVertCh" val="b"/>
+            <dgm:param type="parTxRTLAlign" val="r"/>
+            <dgm:param type="shpTxRTLAlignCh" val="r"/>
+          </dgm:alg>
+          <dgm:shape xmlns:r="http://schemas.openxmlformats.org/officeDocument/2006/relationships" type="rect" r:blip="" hideGeom="1">
+            <dgm:adjLst/>
+          </dgm:shape>
+          <dgm:presOf axis="desOrSelf" ptType="node"/>
+          <dgm:constrLst>
+            <dgm:constr type="primFontSz" val="65"/>
+            <dgm:constr type="lMarg"/>
+            <dgm:constr type="rMarg"/>
+            <dgm:constr type="tMarg"/>
+            <dgm:constr type="bMarg"/>
+          </dgm:constrLst>
+          <dgm:ruleLst>
+            <dgm:rule type="primFontSz" val="5" fact="NaN" max="NaN"/>
+          </dgm:ruleLst>
+        </dgm:layoutNode>
+      </dgm:forEach>
+      <dgm:forEach name="Name31" axis="ch" ptType="sibTrans" hideLastTrans="0" st="2" cnt="1">
+        <dgm:layoutNode name="picture_2">
+          <dgm:alg type="sp"/>
+          <dgm:shape xmlns:r="http://schemas.openxmlformats.org/officeDocument/2006/relationships" r:blip="">
+            <dgm:adjLst/>
+          </dgm:shape>
+          <dgm:presOf/>
+          <dgm:constrLst/>
+          <dgm:forEach name="Name32" ref="pictureRepeat"/>
+        </dgm:layoutNode>
+      </dgm:forEach>
+      <dgm:forEach name="Name33" axis="ch" ptType="node" st="2" cnt="1">
+        <dgm:layoutNode name="line_2" styleLbl="parChTrans1D1">
+          <dgm:alg type="sp"/>
+          <dgm:shape xmlns:r="http://schemas.openxmlformats.org/officeDocument/2006/relationships" type="line" r:blip="" zOrderOff="-100">
+            <dgm:adjLst/>
+          </dgm:shape>
+          <dgm:presOf/>
+        </dgm:layoutNode>
+        <dgm:layoutNode name="textparent_2">
+          <dgm:choose name="Name34">
+            <dgm:if name="Name35" func="var" arg="dir" op="equ" val="norm">
+              <dgm:alg type="lin">
+                <dgm:param type="horzAlign" val="l"/>
+              </dgm:alg>
+            </dgm:if>
+            <dgm:else name="Name36">
+              <dgm:alg type="lin">
+                <dgm:param type="horzAlign" val="r"/>
+              </dgm:alg>
+            </dgm:else>
+          </dgm:choose>
+          <dgm:shape xmlns:r="http://schemas.openxmlformats.org/officeDocument/2006/relationships" type="rect" r:blip="" hideGeom="1">
+            <dgm:adjLst/>
+          </dgm:shape>
+          <dgm:constrLst>
+            <dgm:constr type="userW" for="ch" forName="text_2" refType="w"/>
+            <dgm:constr type="h" for="ch" forName="text_2" refType="h"/>
+          </dgm:constrLst>
+          <dgm:presOf/>
+          <dgm:layoutNode name="text_2" styleLbl="revTx">
+            <dgm:varLst>
+              <dgm:bulletEnabled val="1"/>
+            </dgm:varLst>
+            <dgm:choose name="Name37">
+              <dgm:if name="Name38" func="var" arg="dir" op="equ" val="norm">
+                <dgm:alg type="tx">
+                  <dgm:param type="parTxLTRAlign" val="l"/>
+                  <dgm:param type="shpTxLTRAlignCh" val="l"/>
+                  <dgm:param type="parTxRTLAlign" val="r"/>
+                  <dgm:param type="shpTxRTLAlignCh" val="r"/>
+                </dgm:alg>
+              </dgm:if>
+              <dgm:else name="Name39">
+                <dgm:alg type="tx">
+                  <dgm:param type="parTxLTRAlign" val="r"/>
+                  <dgm:param type="shpTxLTRAlignCh" val="r"/>
+                  <dgm:param type="parTxRTLAlign" val="r"/>
+                  <dgm:param type="shpTxRTLAlignCh" val="r"/>
+                </dgm:alg>
+              </dgm:else>
+            </dgm:choose>
+            <dgm:shape xmlns:r="http://schemas.openxmlformats.org/officeDocument/2006/relationships" type="rect" r:blip="">
+              <dgm:adjLst/>
+            </dgm:shape>
+            <dgm:presOf axis="desOrSelf" ptType="node"/>
+            <dgm:constrLst>
+              <dgm:constr type="userW"/>
+              <dgm:constr type="w" refType="userW" fact="0.1"/>
+              <dgm:constr type="lMarg" refType="primFontSz" fact="0.3"/>
+              <dgm:constr type="rMarg" refType="primFontSz" fact="0.3"/>
+              <dgm:constr type="tMarg"/>
+              <dgm:constr type="bMarg"/>
+            </dgm:constrLst>
+            <dgm:ruleLst>
+              <dgm:rule type="w" val="NaN" fact="1" max="NaN"/>
+              <dgm:rule type="primFontSz" val="5" fact="NaN" max="NaN"/>
+            </dgm:ruleLst>
+          </dgm:layoutNode>
+        </dgm:layoutNode>
+      </dgm:forEach>
+      <dgm:forEach name="Name40" axis="ch" ptType="sibTrans" hideLastTrans="0" st="3" cnt="1">
+        <dgm:layoutNode name="picture_3">
+          <dgm:alg type="sp"/>
+          <dgm:shape xmlns:r="http://schemas.openxmlformats.org/officeDocument/2006/relationships" r:blip="">
+            <dgm:adjLst/>
+          </dgm:shape>
+          <dgm:presOf/>
+          <dgm:constrLst/>
+          <dgm:forEach name="Name41" ref="pictureRepeat"/>
+        </dgm:layoutNode>
+      </dgm:forEach>
+      <dgm:forEach name="Name42" axis="ch" ptType="node" st="3" cnt="1">
+        <dgm:layoutNode name="line_3" styleLbl="parChTrans1D1">
+          <dgm:alg type="sp"/>
+          <dgm:shape xmlns:r="http://schemas.openxmlformats.org/officeDocument/2006/relationships" type="line" r:blip="" zOrderOff="-100">
+            <dgm:adjLst/>
+          </dgm:shape>
+          <dgm:presOf/>
+        </dgm:layoutNode>
+        <dgm:layoutNode name="textparent_3">
+          <dgm:choose name="Name43">
+            <dgm:if name="Name44" func="var" arg="dir" op="equ" val="norm">
+              <dgm:alg type="lin">
+                <dgm:param type="horzAlign" val="l"/>
+              </dgm:alg>
+            </dgm:if>
+            <dgm:else name="Name45">
+              <dgm:alg type="lin">
+                <dgm:param type="horzAlign" val="r"/>
+              </dgm:alg>
+            </dgm:else>
+          </dgm:choose>
+          <dgm:shape xmlns:r="http://schemas.openxmlformats.org/officeDocument/2006/relationships" type="rect" r:blip="" hideGeom="1">
+            <dgm:adjLst/>
+          </dgm:shape>
+          <dgm:constrLst>
+            <dgm:constr type="userW" for="ch" forName="text_3" refType="w"/>
+            <dgm:constr type="h" for="ch" forName="text_3" refType="h"/>
+          </dgm:constrLst>
+          <dgm:presOf/>
+          <dgm:layoutNode name="text_3" styleLbl="revTx">
+            <dgm:varLst>
+              <dgm:bulletEnabled val="1"/>
+            </dgm:varLst>
+            <dgm:choose name="Name46">
+              <dgm:if name="Name47" func="var" arg="dir" op="equ" val="norm">
+                <dgm:alg type="tx">
+                  <dgm:param type="parTxLTRAlign" val="l"/>
+                  <dgm:param type="shpTxLTRAlignCh" val="l"/>
+                  <dgm:param type="parTxRTLAlign" val="r"/>
+                  <dgm:param type="shpTxRTLAlignCh" val="r"/>
+                </dgm:alg>
+              </dgm:if>
+              <dgm:else name="Name48">
+                <dgm:alg type="tx">
+                  <dgm:param type="parTxLTRAlign" val="r"/>
+                  <dgm:param type="shpTxLTRAlignCh" val="r"/>
+                  <dgm:param type="parTxRTLAlign" val="r"/>
+                  <dgm:param type="shpTxRTLAlignCh" val="r"/>
+                </dgm:alg>
+              </dgm:else>
+            </dgm:choose>
+            <dgm:shape xmlns:r="http://schemas.openxmlformats.org/officeDocument/2006/relationships" type="rect" r:blip="">
+              <dgm:adjLst/>
+            </dgm:shape>
+            <dgm:presOf axis="desOrSelf" ptType="node"/>
+            <dgm:constrLst>
+              <dgm:constr type="userW"/>
+              <dgm:constr type="w" refType="userW" fact="0.1"/>
+              <dgm:constr type="lMarg" refType="primFontSz" fact="0.3"/>
+              <dgm:constr type="rMarg" refType="primFontSz" fact="0.3"/>
+              <dgm:constr type="tMarg"/>
+              <dgm:constr type="bMarg"/>
+            </dgm:constrLst>
+            <dgm:ruleLst>
+              <dgm:rule type="w" val="NaN" fact="1" max="NaN"/>
+              <dgm:rule type="primFontSz" val="5" fact="NaN" max="NaN"/>
+            </dgm:ruleLst>
+          </dgm:layoutNode>
+        </dgm:layoutNode>
+      </dgm:forEach>
+      <dgm:forEach name="Name49" axis="ch" ptType="sibTrans" hideLastTrans="0" st="4" cnt="1">
+        <dgm:layoutNode name="picture_4">
+          <dgm:alg type="sp"/>
+          <dgm:shape xmlns:r="http://schemas.openxmlformats.org/officeDocument/2006/relationships" r:blip="">
+            <dgm:adjLst/>
+          </dgm:shape>
+          <dgm:presOf/>
+          <dgm:constrLst/>
+          <dgm:forEach name="Name50" ref="pictureRepeat"/>
+        </dgm:layoutNode>
+      </dgm:forEach>
+      <dgm:forEach name="Name51" axis="ch" ptType="node" st="4" cnt="1">
+        <dgm:layoutNode name="line_4" styleLbl="parChTrans1D1">
+          <dgm:alg type="sp"/>
+          <dgm:shape xmlns:r="http://schemas.openxmlformats.org/officeDocument/2006/relationships" type="line" r:blip="" zOrderOff="-100">
+            <dgm:adjLst/>
+          </dgm:shape>
+          <dgm:presOf/>
+        </dgm:layoutNode>
+        <dgm:layoutNode name="textparent_4">
+          <dgm:choose name="Name52">
+            <dgm:if name="Name53" func="var" arg="dir" op="equ" val="norm">
+              <dgm:alg type="lin">
+                <dgm:param type="horzAlign" val="l"/>
+              </dgm:alg>
+            </dgm:if>
+            <dgm:else name="Name54">
+              <dgm:alg type="lin">
+                <dgm:param type="horzAlign" val="r"/>
+              </dgm:alg>
+            </dgm:else>
+          </dgm:choose>
+          <dgm:shape xmlns:r="http://schemas.openxmlformats.org/officeDocument/2006/relationships" type="rect" r:blip="" hideGeom="1">
+            <dgm:adjLst/>
+          </dgm:shape>
+          <dgm:constrLst>
+            <dgm:constr type="userW" for="ch" forName="text_4" refType="w"/>
+            <dgm:constr type="h" for="ch" forName="text_4" refType="h"/>
+          </dgm:constrLst>
+          <dgm:presOf/>
+          <dgm:layoutNode name="text_4" styleLbl="revTx">
+            <dgm:varLst>
+              <dgm:bulletEnabled val="1"/>
+            </dgm:varLst>
+            <dgm:choose name="Name55">
+              <dgm:if name="Name56" func="var" arg="dir" op="equ" val="norm">
+                <dgm:alg type="tx">
+                  <dgm:param type="parTxLTRAlign" val="l"/>
+                  <dgm:param type="shpTxLTRAlignCh" val="l"/>
+                  <dgm:param type="parTxRTLAlign" val="r"/>
+                  <dgm:param type="shpTxRTLAlignCh" val="r"/>
+                </dgm:alg>
+              </dgm:if>
+              <dgm:else name="Name57">
+                <dgm:alg type="tx">
+                  <dgm:param type="parTxLTRAlign" val="r"/>
+                  <dgm:param type="shpTxLTRAlignCh" val="r"/>
+                  <dgm:param type="parTxRTLAlign" val="r"/>
+                  <dgm:param type="shpTxRTLAlignCh" val="r"/>
+                </dgm:alg>
+              </dgm:else>
+            </dgm:choose>
+            <dgm:shape xmlns:r="http://schemas.openxmlformats.org/officeDocument/2006/relationships" type="rect" r:blip="">
+              <dgm:adjLst/>
+            </dgm:shape>
+            <dgm:presOf axis="desOrSelf" ptType="node"/>
+            <dgm:constrLst>
+              <dgm:constr type="userW"/>
+              <dgm:constr type="w" refType="userW" fact="0.1"/>
+              <dgm:constr type="lMarg" refType="primFontSz" fact="0.3"/>
+              <dgm:constr type="rMarg" refType="primFontSz" fact="0.3"/>
+              <dgm:constr type="tMarg"/>
+              <dgm:constr type="bMarg"/>
+            </dgm:constrLst>
+            <dgm:ruleLst>
+              <dgm:rule type="w" val="NaN" fact="1" max="NaN"/>
+              <dgm:rule type="primFontSz" val="5" fact="NaN" max="NaN"/>
+            </dgm:ruleLst>
+          </dgm:layoutNode>
+        </dgm:layoutNode>
+      </dgm:forEach>
+      <dgm:forEach name="Name58" axis="ch" ptType="sibTrans" hideLastTrans="0" st="5" cnt="1">
+        <dgm:layoutNode name="picture_5">
+          <dgm:alg type="sp"/>
+          <dgm:shape xmlns:r="http://schemas.openxmlformats.org/officeDocument/2006/relationships" r:blip="">
+            <dgm:adjLst/>
+          </dgm:shape>
+          <dgm:presOf/>
+          <dgm:constrLst/>
+          <dgm:forEach name="Name59" ref="pictureRepeat"/>
+        </dgm:layoutNode>
+      </dgm:forEach>
+      <dgm:forEach name="Name60" axis="ch" ptType="node" st="5" cnt="1">
+        <dgm:layoutNode name="line_5" styleLbl="parChTrans1D1">
+          <dgm:alg type="sp"/>
+          <dgm:shape xmlns:r="http://schemas.openxmlformats.org/officeDocument/2006/relationships" type="line" r:blip="" zOrderOff="-100">
+            <dgm:adjLst/>
+          </dgm:shape>
+          <dgm:presOf/>
+        </dgm:layoutNode>
+        <dgm:layoutNode name="textparent_5">
+          <dgm:choose name="Name61">
+            <dgm:if name="Name62" func="var" arg="dir" op="equ" val="norm">
+              <dgm:alg type="lin">
+                <dgm:param type="horzAlign" val="l"/>
+              </dgm:alg>
+            </dgm:if>
+            <dgm:else name="Name63">
+              <dgm:alg type="lin">
+                <dgm:param type="horzAlign" val="r"/>
+              </dgm:alg>
+            </dgm:else>
+          </dgm:choose>
+          <dgm:shape xmlns:r="http://schemas.openxmlformats.org/officeDocument/2006/relationships" type="rect" r:blip="" hideGeom="1">
+            <dgm:adjLst/>
+          </dgm:shape>
+          <dgm:constrLst>
+            <dgm:constr type="userW" for="ch" forName="text_5" refType="w"/>
+            <dgm:constr type="h" for="ch" forName="text_5" refType="h"/>
+          </dgm:constrLst>
+          <dgm:presOf/>
+          <dgm:layoutNode name="text_5" styleLbl="revTx">
+            <dgm:varLst>
+              <dgm:bulletEnabled val="1"/>
+            </dgm:varLst>
+            <dgm:choose name="Name64">
+              <dgm:if name="Name65" func="var" arg="dir" op="equ" val="norm">
+                <dgm:alg type="tx">
+                  <dgm:param type="parTxLTRAlign" val="l"/>
+                  <dgm:param type="shpTxLTRAlignCh" val="l"/>
+                  <dgm:param type="parTxRTLAlign" val="r"/>
+                  <dgm:param type="shpTxRTLAlignCh" val="r"/>
+                </dgm:alg>
+              </dgm:if>
+              <dgm:else name="Name66">
+                <dgm:alg type="tx">
+                  <dgm:param type="parTxLTRAlign" val="r"/>
+                  <dgm:param type="shpTxLTRAlignCh" val="r"/>
+                  <dgm:param type="parTxRTLAlign" val="r"/>
+                  <dgm:param type="shpTxRTLAlignCh" val="r"/>
+                </dgm:alg>
+              </dgm:else>
+            </dgm:choose>
+            <dgm:shape xmlns:r="http://schemas.openxmlformats.org/officeDocument/2006/relationships" type="rect" r:blip="">
+              <dgm:adjLst/>
+            </dgm:shape>
+            <dgm:presOf axis="desOrSelf" ptType="node"/>
+            <dgm:constrLst>
+              <dgm:constr type="userW"/>
+              <dgm:constr type="w" refType="userW" fact="0.1"/>
+              <dgm:constr type="lMarg" refType="primFontSz" fact="0.3"/>
+              <dgm:constr type="rMarg" refType="primFontSz" fact="0.3"/>
+              <dgm:constr type="tMarg"/>
+              <dgm:constr type="bMarg"/>
+            </dgm:constrLst>
+            <dgm:ruleLst>
+              <dgm:rule type="w" val="NaN" fact="1" max="NaN"/>
+              <dgm:rule type="primFontSz" val="5" fact="NaN" max="NaN"/>
+            </dgm:ruleLst>
+          </dgm:layoutNode>
+        </dgm:layoutNode>
+      </dgm:forEach>
+      <dgm:forEach name="Name67" axis="ch" ptType="sibTrans" hideLastTrans="0" st="6" cnt="1">
+        <dgm:layoutNode name="picture_6">
+          <dgm:alg type="sp"/>
+          <dgm:shape xmlns:r="http://schemas.openxmlformats.org/officeDocument/2006/relationships" r:blip="">
+            <dgm:adjLst/>
+          </dgm:shape>
+          <dgm:presOf/>
+          <dgm:constrLst/>
+          <dgm:forEach name="Name68" ref="pictureRepeat"/>
+        </dgm:layoutNode>
+      </dgm:forEach>
+      <dgm:forEach name="Name69" axis="ch" ptType="node" st="6" cnt="1">
+        <dgm:layoutNode name="line_6" styleLbl="parChTrans1D1">
+          <dgm:alg type="sp"/>
+          <dgm:shape xmlns:r="http://schemas.openxmlformats.org/officeDocument/2006/relationships" type="line" r:blip="" zOrderOff="-100">
+            <dgm:adjLst/>
+          </dgm:shape>
+          <dgm:presOf/>
+        </dgm:layoutNode>
+        <dgm:layoutNode name="textparent_6">
+          <dgm:choose name="Name70">
+            <dgm:if name="Name71" func="var" arg="dir" op="equ" val="norm">
+              <dgm:alg type="lin">
+                <dgm:param type="horzAlign" val="l"/>
+              </dgm:alg>
+            </dgm:if>
+            <dgm:else name="Name72">
+              <dgm:alg type="lin">
+                <dgm:param type="horzAlign" val="r"/>
+              </dgm:alg>
+            </dgm:else>
+          </dgm:choose>
+          <dgm:shape xmlns:r="http://schemas.openxmlformats.org/officeDocument/2006/relationships" type="rect" r:blip="" hideGeom="1">
+            <dgm:adjLst/>
+          </dgm:shape>
+          <dgm:constrLst>
+            <dgm:constr type="userW" for="ch" forName="text_6" refType="w"/>
+            <dgm:constr type="h" for="ch" forName="text_6" refType="h"/>
+          </dgm:constrLst>
+          <dgm:presOf/>
+          <dgm:layoutNode name="text_6" styleLbl="revTx">
+            <dgm:varLst>
+              <dgm:bulletEnabled val="1"/>
+            </dgm:varLst>
+            <dgm:choose name="Name73">
+              <dgm:if name="Name74" func="var" arg="dir" op="equ" val="norm">
+                <dgm:alg type="tx">
+                  <dgm:param type="parTxLTRAlign" val="l"/>
+                  <dgm:param type="shpTxLTRAlignCh" val="l"/>
+                  <dgm:param type="parTxRTLAlign" val="r"/>
+                  <dgm:param type="shpTxRTLAlignCh" val="r"/>
+                </dgm:alg>
+              </dgm:if>
+              <dgm:else name="Name75">
+                <dgm:alg type="tx">
+                  <dgm:param type="parTxLTRAlign" val="r"/>
+                  <dgm:param type="shpTxLTRAlignCh" val="r"/>
+                  <dgm:param type="parTxRTLAlign" val="r"/>
+                  <dgm:param type="shpTxRTLAlignCh" val="r"/>
+                </dgm:alg>
+              </dgm:else>
+            </dgm:choose>
+            <dgm:shape xmlns:r="http://schemas.openxmlformats.org/officeDocument/2006/relationships" type="rect" r:blip="">
+              <dgm:adjLst/>
+            </dgm:shape>
+            <dgm:presOf axis="desOrSelf" ptType="node"/>
+            <dgm:constrLst>
+              <dgm:constr type="userW"/>
+              <dgm:constr type="w" refType="userW" fact="0.1"/>
+              <dgm:constr type="lMarg" refType="primFontSz" fact="0.3"/>
+              <dgm:constr type="rMarg" refType="primFontSz" fact="0.3"/>
+              <dgm:constr type="tMarg"/>
+              <dgm:constr type="bMarg"/>
+            </dgm:constrLst>
+            <dgm:ruleLst>
+              <dgm:rule type="w" val="NaN" fact="1" max="NaN"/>
+              <dgm:rule type="primFontSz" val="5" fact="NaN" max="NaN"/>
+            </dgm:ruleLst>
+          </dgm:layoutNode>
+        </dgm:layoutNode>
+      </dgm:forEach>
+      <dgm:forEach name="Name76" axis="ch" ptType="sibTrans" hideLastTrans="0" st="7" cnt="1">
+        <dgm:layoutNode name="picture_7">
+          <dgm:alg type="sp"/>
+          <dgm:shape xmlns:r="http://schemas.openxmlformats.org/officeDocument/2006/relationships" r:blip="">
+            <dgm:adjLst/>
+          </dgm:shape>
+          <dgm:presOf/>
+          <dgm:constrLst/>
+          <dgm:forEach name="Name77" ref="pictureRepeat"/>
+        </dgm:layoutNode>
+      </dgm:forEach>
+      <dgm:forEach name="Name78" axis="ch" ptType="node" st="7" cnt="1">
+        <dgm:layoutNode name="line_7" styleLbl="parChTrans1D1">
+          <dgm:alg type="sp"/>
+          <dgm:shape xmlns:r="http://schemas.openxmlformats.org/officeDocument/2006/relationships" type="line" r:blip="" zOrderOff="-100">
+            <dgm:adjLst/>
+          </dgm:shape>
+          <dgm:presOf/>
+        </dgm:layoutNode>
+        <dgm:layoutNode name="textparent_7">
+          <dgm:choose name="Name79">
+            <dgm:if name="Name80" func="var" arg="dir" op="equ" val="norm">
+              <dgm:alg type="lin">
+                <dgm:param type="horzAlign" val="l"/>
+              </dgm:alg>
+            </dgm:if>
+            <dgm:else name="Name81">
+              <dgm:alg type="lin">
+                <dgm:param type="horzAlign" val="r"/>
+              </dgm:alg>
+            </dgm:else>
+          </dgm:choose>
+          <dgm:shape xmlns:r="http://schemas.openxmlformats.org/officeDocument/2006/relationships" type="rect" r:blip="" hideGeom="1">
+            <dgm:adjLst/>
+          </dgm:shape>
+          <dgm:constrLst>
+            <dgm:constr type="userW" for="ch" forName="text_7" refType="w"/>
+            <dgm:constr type="h" for="ch" forName="text_7" refType="h"/>
+          </dgm:constrLst>
+          <dgm:presOf/>
+          <dgm:layoutNode name="text_7" styleLbl="revTx">
+            <dgm:varLst>
+              <dgm:bulletEnabled val="1"/>
+            </dgm:varLst>
+            <dgm:choose name="Name82">
+              <dgm:if name="Name83" func="var" arg="dir" op="equ" val="norm">
+                <dgm:alg type="tx">
+                  <dgm:param type="parTxLTRAlign" val="l"/>
+                  <dgm:param type="shpTxLTRAlignCh" val="l"/>
+                  <dgm:param type="parTxRTLAlign" val="r"/>
+                  <dgm:param type="shpTxRTLAlignCh" val="r"/>
+                </dgm:alg>
+              </dgm:if>
+              <dgm:else name="Name84">
+                <dgm:alg type="tx">
+                  <dgm:param type="parTxLTRAlign" val="r"/>
+                  <dgm:param type="shpTxLTRAlignCh" val="r"/>
+                  <dgm:param type="parTxRTLAlign" val="r"/>
+                  <dgm:param type="shpTxRTLAlignCh" val="r"/>
+                </dgm:alg>
+              </dgm:else>
+            </dgm:choose>
+            <dgm:shape xmlns:r="http://schemas.openxmlformats.org/officeDocument/2006/relationships" type="rect" r:blip="">
+              <dgm:adjLst/>
+            </dgm:shape>
+            <dgm:presOf axis="desOrSelf" ptType="node"/>
+            <dgm:constrLst>
+              <dgm:constr type="userW"/>
+              <dgm:constr type="w" refType="userW" fact="0.1"/>
+              <dgm:constr type="lMarg" refType="primFontSz" fact="0.3"/>
+              <dgm:constr type="rMarg" refType="primFontSz" fact="0.3"/>
+              <dgm:constr type="tMarg"/>
+              <dgm:constr type="bMarg"/>
+            </dgm:constrLst>
+            <dgm:ruleLst>
+              <dgm:rule type="w" val="NaN" fact="1" max="NaN"/>
+              <dgm:rule type="primFontSz" val="5" fact="NaN" max="NaN"/>
+            </dgm:ruleLst>
+          </dgm:layoutNode>
+        </dgm:layoutNode>
+      </dgm:forEach>
+    </dgm:layoutNode>
+  </dgm:layoutNode>
+</dgm:layoutDef>
+</file>
+
 <file path=ppt/diagrams/quickStyle1.xml><?xml version="1.0" encoding="utf-8"?>
+<dgm:styleDef xmlns:dgm="http://schemas.openxmlformats.org/drawingml/2006/diagram" xmlns:a="http://schemas.openxmlformats.org/drawingml/2006/main" uniqueId="urn:microsoft.com/office/officeart/2005/8/quickstyle/simple1">
+  <dgm:title val=""/>
+  <dgm:desc val=""/>
+  <dgm:catLst>
+    <dgm:cat type="simple" pri="10100"/>
+  </dgm:catLst>
+  <dgm:scene3d>
+    <a:camera prst="orthographicFront"/>
+    <a:lightRig rig="threePt" dir="t"/>
+  </dgm:scene3d>
+  <dgm:styleLbl name="node0">
+    <dgm:scene3d>
+      <a:camera prst="orthographicFront"/>
+      <a:lightRig rig="threePt" dir="t"/>
+    </dgm:scene3d>
+    <dgm:sp3d/>
+    <dgm:txPr/>
+    <dgm:style>
+      <a:lnRef idx="2">
+        <a:scrgbClr r="0" g="0" b="0"/>
+      </a:lnRef>
+      <a:fillRef idx="1">
+        <a:scrgbClr r="0" g="0" b="0"/>
+      </a:fillRef>
+      <a:effectRef idx="0">
+        <a:scrgbClr r="0" g="0" b="0"/>
+      </a:effectRef>
+      <a:fontRef idx="minor">
+        <a:schemeClr val="lt1"/>
+      </a:fontRef>
+    </dgm:style>
+  </dgm:styleLbl>
+  <dgm:styleLbl name="lnNode1">
+    <dgm:scene3d>
+      <a:camera prst="orthographicFront"/>
+      <a:lightRig rig="threePt" dir="t"/>
+    </dgm:scene3d>
+    <dgm:sp3d/>
+    <dgm:txPr/>
+    <dgm:style>
+      <a:lnRef idx="2">
+        <a:scrgbClr r="0" g="0" b="0"/>
+      </a:lnRef>
+      <a:fillRef idx="1">
+        <a:scrgbClr r="0" g="0" b="0"/>
+      </a:fillRef>
+      <a:effectRef idx="0">
+        <a:scrgbClr r="0" g="0" b="0"/>
+      </a:effectRef>
+      <a:fontRef idx="minor">
+        <a:schemeClr val="lt1"/>
+      </a:fontRef>
+    </dgm:style>
+  </dgm:styleLbl>
+  <dgm:styleLbl name="vennNode1">
+    <dgm:scene3d>
+      <a:camera prst="orthographicFront"/>
+      <a:lightRig rig="threePt" dir="t"/>
+    </dgm:scene3d>
+    <dgm:sp3d/>
+    <dgm:txPr/>
+    <dgm:style>
+      <a:lnRef idx="2">
+        <a:scrgbClr r="0" g="0" b="0"/>
+      </a:lnRef>
+      <a:fillRef idx="1">
+        <a:scrgbClr r="0" g="0" b="0"/>
+      </a:fillRef>
+      <a:effectRef idx="0">
+        <a:scrgbClr r="0" g="0" b="0"/>
+      </a:effectRef>
+      <a:fontRef idx="minor">
+        <a:schemeClr val="tx1"/>
+      </a:fontRef>
+    </dgm:style>
+  </dgm:styleLbl>
+  <dgm:styleLbl name="alignNode1">
+    <dgm:scene3d>
+      <a:camera prst="orthographicFront"/>
+      <a:lightRig rig="threePt" dir="t"/>
+    </dgm:scene3d>
+    <dgm:sp3d/>
+    <dgm:txPr/>
+    <dgm:style>
+      <a:lnRef idx="2">
+        <a:scrgbClr r="0" g="0" b="0"/>
+      </a:lnRef>
+      <a:fillRef idx="1">
+        <a:scrgbClr r="0" g="0" b="0"/>
+      </a:fillRef>
+      <a:effectRef idx="0">
+        <a:scrgbClr r="0" g="0" b="0"/>
+      </a:effectRef>
+      <a:fontRef idx="minor">
+        <a:schemeClr val="lt1"/>
+      </a:fontRef>
+    </dgm:style>
+  </dgm:styleLbl>
+  <dgm:styleLbl name="node1">
+    <dgm:scene3d>
+      <a:camera prst="orthographicFront"/>
+      <a:lightRig rig="threePt" dir="t"/>
+    </dgm:scene3d>
+    <dgm:sp3d/>
+    <dgm:txPr/>
+    <dgm:style>
+      <a:lnRef idx="2">
+        <a:scrgbClr r="0" g="0" b="0"/>
+      </a:lnRef>
+      <a:fillRef idx="1">
+        <a:scrgbClr r="0" g="0" b="0"/>
+      </a:fillRef>
+      <a:effectRef idx="0">
+        <a:scrgbClr r="0" g="0" b="0"/>
+      </a:effectRef>
+      <a:fontRef idx="minor">
+        <a:schemeClr val="lt1"/>
+      </a:fontRef>
+    </dgm:style>
+  </dgm:styleLbl>
+  <dgm:styleLbl name="node2">
+    <dgm:scene3d>
+      <a:camera prst="orthographicFront"/>
+      <a:lightRig rig="threePt" dir="t"/>
+    </dgm:scene3d>
+    <dgm:sp3d/>
+    <dgm:txPr/>
+    <dgm:style>
+      <a:lnRef idx="2">
+        <a:scrgbClr r="0" g="0" b="0"/>
+      </a:lnRef>
+      <a:fillRef idx="1">
+        <a:scrgbClr r="0" g="0" b="0"/>
+      </a:fillRef>
+      <a:effectRef idx="0">
+        <a:scrgbClr r="0" g="0" b="0"/>
+      </a:effectRef>
+      <a:fontRef idx="minor">
+        <a:schemeClr val="lt1"/>
+      </a:fontRef>
+    </dgm:style>
+  </dgm:styleLbl>
+  <dgm:styleLbl name="node3">
+    <dgm:scene3d>
+      <a:camera prst="orthographicFront"/>
+      <a:lightRig rig="threePt" dir="t"/>
+    </dgm:scene3d>
+    <dgm:sp3d/>
+    <dgm:txPr/>
+    <dgm:style>
+      <a:lnRef idx="2">
+        <a:scrgbClr r="0" g="0" b="0"/>
+      </a:lnRef>
+      <a:fillRef idx="1">
+        <a:scrgbClr r="0" g="0" b="0"/>
+      </a:fillRef>
+      <a:effectRef idx="0">
+        <a:scrgbClr r="0" g="0" b="0"/>
+      </a:effectRef>
+      <a:fontRef idx="minor">
+        <a:schemeClr val="lt1"/>
+      </a:fontRef>
+    </dgm:style>
+  </dgm:styleLbl>
+  <dgm:styleLbl name="node4">
+    <dgm:scene3d>
+      <a:camera prst="orthographicFront"/>
+      <a:lightRig rig="threePt" dir="t"/>
+    </dgm:scene3d>
+    <dgm:sp3d/>
+    <dgm:txPr/>
+    <dgm:style>
+      <a:lnRef idx="2">
+        <a:scrgbClr r="0" g="0" b="0"/>
+      </a:lnRef>
+      <a:fillRef idx="1">
+        <a:scrgbClr r="0" g="0" b="0"/>
+      </a:fillRef>
+      <a:effectRef idx="0">
+        <a:scrgbClr r="0" g="0" b="0"/>
+      </a:effectRef>
+      <a:fontRef idx="minor">
+        <a:schemeClr val="lt1"/>
+      </a:fontRef>
+    </dgm:style>
+  </dgm:styleLbl>
+  <dgm:styleLbl name="fgImgPlace1">
+    <dgm:scene3d>
+      <a:camera prst="orthographicFront"/>
+      <a:lightRig rig="threePt" dir="t"/>
+    </dgm:scene3d>
+    <dgm:sp3d/>
+    <dgm:txPr/>
+    <dgm:style>
+      <a:lnRef idx="2">
+        <a:scrgbClr r="0" g="0" b="0"/>
+      </a:lnRef>
+      <a:fillRef idx="1">
+        <a:scrgbClr r="0" g="0" b="0"/>
+      </a:fillRef>
+      <a:effectRef idx="0">
+        <a:scrgbClr r="0" g="0" b="0"/>
+      </a:effectRef>
+      <a:fontRef idx="minor"/>
+    </dgm:style>
+  </dgm:styleLbl>
+  <dgm:styleLbl name="alignImgPlace1">
+    <dgm:scene3d>
+      <a:camera prst="orthographicFront"/>
+      <a:lightRig rig="threePt" dir="t"/>
+    </dgm:scene3d>
+    <dgm:sp3d/>
+    <dgm:txPr/>
+    <dgm:style>
+      <a:lnRef idx="2">
+        <a:scrgbClr r="0" g="0" b="0"/>
+      </a:lnRef>
+      <a:fillRef idx="1">
+        <a:scrgbClr r="0" g="0" b="0"/>
+      </a:fillRef>
+      <a:effectRef idx="0">
+        <a:scrgbClr r="0" g="0" b="0"/>
+      </a:effectRef>
+      <a:fontRef idx="minor"/>
+    </dgm:style>
+  </dgm:styleLbl>
+  <dgm:styleLbl name="bgImgPlace1">
+    <dgm:scene3d>
+      <a:camera prst="orthographicFront"/>
+      <a:lightRig rig="threePt" dir="t"/>
+    </dgm:scene3d>
+    <dgm:sp3d/>
+    <dgm:txPr/>
+    <dgm:style>
+      <a:lnRef idx="2">
+        <a:scrgbClr r="0" g="0" b="0"/>
+      </a:lnRef>
+      <a:fillRef idx="1">
+        <a:scrgbClr r="0" g="0" b="0"/>
+      </a:fillRef>
+      <a:effectRef idx="0">
+        <a:scrgbClr r="0" g="0" b="0"/>
+      </a:effectRef>
+      <a:fontRef idx="minor"/>
+    </dgm:style>
+  </dgm:styleLbl>
+  <dgm:styleLbl name="sibTrans2D1">
+    <dgm:scene3d>
+      <a:camera prst="orthographicFront"/>
+      <a:lightRig rig="threePt" dir="t"/>
+    </dgm:scene3d>
+    <dgm:sp3d/>
+    <dgm:txPr/>
+    <dgm:style>
+      <a:lnRef idx="0">
+        <a:scrgbClr r="0" g="0" b="0"/>
+      </a:lnRef>
+      <a:fillRef idx="1">
+        <a:scrgbClr r="0" g="0" b="0"/>
+      </a:fillRef>
+      <a:effectRef idx="0">
+        <a:scrgbClr r="0" g="0" b="0"/>
+      </a:effectRef>
+      <a:fontRef idx="minor">
+        <a:schemeClr val="lt1"/>
+      </a:fontRef>
+    </dgm:style>
+  </dgm:styleLbl>
+  <dgm:styleLbl name="fgSibTrans2D1">
+    <dgm:scene3d>
+      <a:camera prst="orthographicFront"/>
+      <a:lightRig rig="threePt" dir="t"/>
+    </dgm:scene3d>
+    <dgm:sp3d/>
+    <dgm:txPr/>
+    <dgm:style>
+      <a:lnRef idx="0">
+        <a:scrgbClr r="0" g="0" b="0"/>
+      </a:lnRef>
+      <a:fillRef idx="1">
+        <a:scrgbClr r="0" g="0" b="0"/>
+      </a:fillRef>
+      <a:effectRef idx="0">
+        <a:scrgbClr r="0" g="0" b="0"/>
+      </a:effectRef>
+      <a:fontRef idx="minor">
+        <a:schemeClr val="lt1"/>
+      </a:fontRef>
+    </dgm:style>
+  </dgm:styleLbl>
+  <dgm:styleLbl name="bgSibTrans2D1">
+    <dgm:scene3d>
+      <a:camera prst="orthographicFront"/>
+      <a:lightRig rig="threePt" dir="t"/>
+    </dgm:scene3d>
+    <dgm:sp3d/>
+    <dgm:txPr/>
+    <dgm:style>
+      <a:lnRef idx="0">
+        <a:scrgbClr r="0" g="0" b="0"/>
+      </a:lnRef>
+      <a:fillRef idx="1">
+        <a:scrgbClr r="0" g="0" b="0"/>
+      </a:fillRef>
+      <a:effectRef idx="0">
+        <a:scrgbClr r="0" g="0" b="0"/>
+      </a:effectRef>
+      <a:fontRef idx="minor">
+        <a:schemeClr val="lt1"/>
+      </a:fontRef>
+    </dgm:style>
+  </dgm:styleLbl>
+  <dgm:styleLbl name="sibTrans1D1">
+    <dgm:scene3d>
+      <a:camera prst="orthographicFront"/>
+      <a:lightRig rig="threePt" dir="t"/>
+    </dgm:scene3d>
+    <dgm:sp3d/>
+    <dgm:txPr/>
+    <dgm:style>
+      <a:lnRef idx="1">
+        <a:scrgbClr r="0" g="0" b="0"/>
+      </a:lnRef>
+      <a:fillRef idx="0">
+        <a:scrgbClr r="0" g="0" b="0"/>
+      </a:fillRef>
+      <a:effectRef idx="0">
+        <a:scrgbClr r="0" g="0" b="0"/>
+      </a:effectRef>
+      <a:fontRef idx="minor"/>
+    </dgm:style>
+  </dgm:styleLbl>
+  <dgm:styleLbl name="callout">
+    <dgm:scene3d>
+      <a:camera prst="orthographicFront"/>
+      <a:lightRig rig="threePt" dir="t"/>
+    </dgm:scene3d>
+    <dgm:sp3d/>
+    <dgm:txPr/>
+    <dgm:style>
+      <a:lnRef idx="2">
+        <a:scrgbClr r="0" g="0" b="0"/>
+      </a:lnRef>
+      <a:fillRef idx="1">
+        <a:scrgbClr r="0" g="0" b="0"/>
+      </a:fillRef>
+      <a:effectRef idx="0">
+        <a:scrgbClr r="0" g="0" b="0"/>
+      </a:effectRef>
+      <a:fontRef idx="minor"/>
+    </dgm:style>
+  </dgm:styleLbl>
+  <dgm:styleLbl name="asst0">
+    <dgm:scene3d>
+      <a:camera prst="orthographicFront"/>
+      <a:lightRig rig="threePt" dir="t"/>
+    </dgm:scene3d>
+    <dgm:sp3d/>
+    <dgm:txPr/>
+    <dgm:style>
+      <a:lnRef idx="2">
+        <a:scrgbClr r="0" g="0" b="0"/>
+      </a:lnRef>
+      <a:fillRef idx="1">
+        <a:scrgbClr r="0" g="0" b="0"/>
+      </a:fillRef>
+      <a:effectRef idx="0">
+        <a:scrgbClr r="0" g="0" b="0"/>
+      </a:effectRef>
+      <a:fontRef idx="minor">
+        <a:schemeClr val="lt1"/>
+      </a:fontRef>
+    </dgm:style>
+  </dgm:styleLbl>
+  <dgm:styleLbl name="asst1">
+    <dgm:scene3d>
+      <a:camera prst="orthographicFront"/>
+      <a:lightRig rig="threePt" dir="t"/>
+    </dgm:scene3d>
+    <dgm:sp3d/>
+    <dgm:txPr/>
+    <dgm:style>
+      <a:lnRef idx="2">
+        <a:scrgbClr r="0" g="0" b="0"/>
+      </a:lnRef>
+      <a:fillRef idx="1">
+        <a:scrgbClr r="0" g="0" b="0"/>
+      </a:fillRef>
+      <a:effectRef idx="0">
+        <a:scrgbClr r="0" g="0" b="0"/>
+      </a:effectRef>
+      <a:fontRef idx="minor">
+        <a:schemeClr val="lt1"/>
+      </a:fontRef>
+    </dgm:style>
+  </dgm:styleLbl>
+  <dgm:styleLbl name="asst2">
+    <dgm:scene3d>
+      <a:camera prst="orthographicFront"/>
+      <a:lightRig rig="threePt" dir="t"/>
+    </dgm:scene3d>
+    <dgm:sp3d/>
+    <dgm:txPr/>
+    <dgm:style>
+      <a:lnRef idx="2">
+        <a:scrgbClr r="0" g="0" b="0"/>
+      </a:lnRef>
+      <a:fillRef idx="1">
+        <a:scrgbClr r="0" g="0" b="0"/>
+      </a:fillRef>
+      <a:effectRef idx="0">
+        <a:scrgbClr r="0" g="0" b="0"/>
+      </a:effectRef>
+      <a:fontRef idx="minor">
+        <a:schemeClr val="lt1"/>
+      </a:fontRef>
+    </dgm:style>
+  </dgm:styleLbl>
+  <dgm:styleLbl name="asst3">
+    <dgm:scene3d>
+      <a:camera prst="orthographicFront"/>
+      <a:lightRig rig="threePt" dir="t"/>
+    </dgm:scene3d>
+    <dgm:sp3d/>
+    <dgm:txPr/>
+    <dgm:style>
+      <a:lnRef idx="2">
+        <a:scrgbClr r="0" g="0" b="0"/>
+      </a:lnRef>
+      <a:fillRef idx="1">
+        <a:scrgbClr r="0" g="0" b="0"/>
+      </a:fillRef>
+      <a:effectRef idx="0">
+        <a:scrgbClr r="0" g="0" b="0"/>
+      </a:effectRef>
+      <a:fontRef idx="minor">
+        <a:schemeClr val="lt1"/>
+      </a:fontRef>
+    </dgm:style>
+  </dgm:styleLbl>
+  <dgm:styleLbl name="asst4">
+    <dgm:scene3d>
+      <a:camera prst="orthographicFront"/>
+      <a:lightRig rig="threePt" dir="t"/>
+    </dgm:scene3d>
+    <dgm:sp3d/>
+    <dgm:txPr/>
+    <dgm:style>
+      <a:lnRef idx="2">
+        <a:scrgbClr r="0" g="0" b="0"/>
+      </a:lnRef>
+      <a:fillRef idx="1">
+        <a:scrgbClr r="0" g="0" b="0"/>
+      </a:fillRef>
+      <a:effectRef idx="0">
+        <a:scrgbClr r="0" g="0" b="0"/>
+      </a:effectRef>
+      <a:fontRef idx="minor">
+        <a:schemeClr val="lt1"/>
+      </a:fontRef>
+    </dgm:style>
+  </dgm:styleLbl>
+  <dgm:styleLbl name="parChTrans2D1">
+    <dgm:scene3d>
+      <a:camera prst="orthographicFront"/>
+      <a:lightRig rig="threePt" dir="t"/>
+    </dgm:scene3d>
+    <dgm:sp3d/>
+    <dgm:txPr/>
+    <dgm:style>
+      <a:lnRef idx="2">
+        <a:scrgbClr r="0" g="0" b="0"/>
+      </a:lnRef>
+      <a:fillRef idx="1">
+        <a:scrgbClr r="0" g="0" b="0"/>
+      </a:fillRef>
+      <a:effectRef idx="0">
+        <a:scrgbClr r="0" g="0" b="0"/>
+      </a:effectRef>
+      <a:fontRef idx="minor">
+        <a:schemeClr val="lt1"/>
+      </a:fontRef>
+    </dgm:style>
+  </dgm:styleLbl>
+  <dgm:styleLbl name="parChTrans2D2">
+    <dgm:scene3d>
+      <a:camera prst="orthographicFront"/>
+      <a:lightRig rig="threePt" dir="t"/>
+    </dgm:scene3d>
+    <dgm:sp3d/>
+    <dgm:txPr/>
+    <dgm:style>
+      <a:lnRef idx="2">
+        <a:scrgbClr r="0" g="0" b="0"/>
+      </a:lnRef>
+      <a:fillRef idx="1">
+        <a:scrgbClr r="0" g="0" b="0"/>
+      </a:fillRef>
+      <a:effectRef idx="0">
+        <a:scrgbClr r="0" g="0" b="0"/>
+      </a:effectRef>
+      <a:fontRef idx="minor">
+        <a:schemeClr val="lt1"/>
+      </a:fontRef>
+    </dgm:style>
+  </dgm:styleLbl>
+  <dgm:styleLbl name="parChTrans2D3">
+    <dgm:scene3d>
+      <a:camera prst="orthographicFront"/>
+      <a:lightRig rig="threePt" dir="t"/>
+    </dgm:scene3d>
+    <dgm:sp3d/>
+    <dgm:txPr/>
+    <dgm:style>
+      <a:lnRef idx="2">
+        <a:scrgbClr r="0" g="0" b="0"/>
+      </a:lnRef>
+      <a:fillRef idx="1">
+        <a:scrgbClr r="0" g="0" b="0"/>
+      </a:fillRef>
+      <a:effectRef idx="0">
+        <a:scrgbClr r="0" g="0" b="0"/>
+      </a:effectRef>
+      <a:fontRef idx="minor">
+        <a:schemeClr val="lt1"/>
+      </a:fontRef>
+    </dgm:style>
+  </dgm:styleLbl>
+  <dgm:styleLbl name="parChTrans2D4">
+    <dgm:scene3d>
+      <a:camera prst="orthographicFront"/>
+      <a:lightRig rig="threePt" dir="t"/>
+    </dgm:scene3d>
+    <dgm:sp3d/>
+    <dgm:txPr/>
+    <dgm:style>
+      <a:lnRef idx="2">
+        <a:scrgbClr r="0" g="0" b="0"/>
+      </a:lnRef>
+      <a:fillRef idx="1">
+        <a:scrgbClr r="0" g="0" b="0"/>
+      </a:fillRef>
+      <a:effectRef idx="0">
+        <a:scrgbClr r="0" g="0" b="0"/>
+      </a:effectRef>
+      <a:fontRef idx="minor">
+        <a:schemeClr val="lt1"/>
+      </a:fontRef>
+    </dgm:style>
+  </dgm:styleLbl>
+  <dgm:styleLbl name="parChTrans1D1">
+    <dgm:scene3d>
+      <a:camera prst="orthographicFront"/>
+      <a:lightRig rig="threePt" dir="t"/>
+    </dgm:scene3d>
+    <dgm:sp3d/>
+    <dgm:txPr/>
+    <dgm:style>
+      <a:lnRef idx="2">
+        <a:scrgbClr r="0" g="0" b="0"/>
+      </a:lnRef>
+      <a:fillRef idx="0">
+        <a:scrgbClr r="0" g="0" b="0"/>
+      </a:fillRef>
+      <a:effectRef idx="0">
+        <a:scrgbClr r="0" g="0" b="0"/>
+      </a:effectRef>
+      <a:fontRef idx="minor"/>
+    </dgm:style>
+  </dgm:styleLbl>
+  <dgm:styleLbl name="parChTrans1D2">
+    <dgm:scene3d>
+      <a:camera prst="orthographicFront"/>
+      <a:lightRig rig="threePt" dir="t"/>
+    </dgm:scene3d>
+    <dgm:sp3d/>
+    <dgm:txPr/>
+    <dgm:style>
+      <a:lnRef idx="2">
+        <a:scrgbClr r="0" g="0" b="0"/>
+      </a:lnRef>
+      <a:fillRef idx="0">
+        <a:scrgbClr r="0" g="0" b="0"/>
+      </a:fillRef>
+      <a:effectRef idx="0">
+        <a:scrgbClr r="0" g="0" b="0"/>
+      </a:effectRef>
+      <a:fontRef idx="minor"/>
+    </dgm:style>
+  </dgm:styleLbl>
+  <dgm:styleLbl name="parChTrans1D3">
+    <dgm:scene3d>
+      <a:camera prst="orthographicFront"/>
+      <a:lightRig rig="threePt" dir="t"/>
+    </dgm:scene3d>
+    <dgm:sp3d/>
+    <dgm:txPr/>
+    <dgm:style>
+      <a:lnRef idx="2">
+        <a:scrgbClr r="0" g="0" b="0"/>
+      </a:lnRef>
+      <a:fillRef idx="0">
+        <a:scrgbClr r="0" g="0" b="0"/>
+      </a:fillRef>
+      <a:effectRef idx="0">
+        <a:scrgbClr r="0" g="0" b="0"/>
+      </a:effectRef>
+      <a:fontRef idx="minor"/>
+    </dgm:style>
+  </dgm:styleLbl>
+  <dgm:styleLbl name="parChTrans1D4">
+    <dgm:scene3d>
+      <a:camera prst="orthographicFront"/>
+      <a:lightRig rig="threePt" dir="t"/>
+    </dgm:scene3d>
+    <dgm:sp3d/>
+    <dgm:txPr/>
+    <dgm:style>
+      <a:lnRef idx="2">
+        <a:scrgbClr r="0" g="0" b="0"/>
+      </a:lnRef>
+      <a:fillRef idx="0">
+        <a:scrgbClr r="0" g="0" b="0"/>
+      </a:fillRef>
+      <a:effectRef idx="0">
+        <a:scrgbClr r="0" g="0" b="0"/>
+      </a:effectRef>
+      <a:fontRef idx="minor"/>
+    </dgm:style>
+  </dgm:styleLbl>
+  <dgm:styleLbl name="fgAcc1">
+    <dgm:scene3d>
+      <a:camera prst="orthographicFront"/>
+      <a:lightRig rig="threePt" dir="t"/>
+    </dgm:scene3d>
+    <dgm:sp3d/>
+    <dgm:txPr/>
+    <dgm:style>
+      <a:lnRef idx="2">
+        <a:scrgbClr r="0" g="0" b="0"/>
+      </a:lnRef>
+      <a:fillRef idx="1">
+        <a:scrgbClr r="0" g="0" b="0"/>
+      </a:fillRef>
+      <a:effectRef idx="0">
+        <a:scrgbClr r="0" g="0" b="0"/>
+      </a:effectRef>
+      <a:fontRef idx="minor"/>
+    </dgm:style>
+  </dgm:styleLbl>
+  <dgm:styleLbl name="conFgAcc1">
+    <dgm:scene3d>
+      <a:camera prst="orthographicFront"/>
+      <a:lightRig rig="threePt" dir="t"/>
+    </dgm:scene3d>
+    <dgm:sp3d/>
+    <dgm:txPr/>
+    <dgm:style>
+      <a:lnRef idx="2">
+        <a:scrgbClr r="0" g="0" b="0"/>
+      </a:lnRef>
+      <a:fillRef idx="1">
+        <a:scrgbClr r="0" g="0" b="0"/>
+      </a:fillRef>
+      <a:effectRef idx="0">
+        <a:scrgbClr r="0" g="0" b="0"/>
+      </a:effectRef>
+      <a:fontRef idx="minor"/>
+    </dgm:style>
+  </dgm:styleLbl>
+  <dgm:styleLbl name="alignAcc1">
+    <dgm:scene3d>
+      <a:camera prst="orthographicFront"/>
+      <a:lightRig rig="threePt" dir="t"/>
+    </dgm:scene3d>
+    <dgm:sp3d/>
+    <dgm:txPr/>
+    <dgm:style>
+      <a:lnRef idx="2">
+        <a:scrgbClr r="0" g="0" b="0"/>
+      </a:lnRef>
+      <a:fillRef idx="1">
+        <a:scrgbClr r="0" g="0" b="0"/>
+      </a:fillRef>
+      <a:effectRef idx="0">
+        <a:scrgbClr r="0" g="0" b="0"/>
+      </a:effectRef>
+      <a:fontRef idx="minor"/>
+    </dgm:style>
+  </dgm:styleLbl>
+  <dgm:styleLbl name="trAlignAcc1">
+    <dgm:scene3d>
+      <a:camera prst="orthographicFront"/>
+      <a:lightRig rig="threePt" dir="t"/>
+    </dgm:scene3d>
+    <dgm:sp3d/>
+    <dgm:txPr/>
+    <dgm:style>
+      <a:lnRef idx="1">
+        <a:scrgbClr r="0" g="0" b="0"/>
+      </a:lnRef>
+      <a:fillRef idx="1">
+        <a:scrgbClr r="0" g="0" b="0"/>
+      </a:fillRef>
+      <a:effectRef idx="0">
+        <a:scrgbClr r="0" g="0" b="0"/>
+      </a:effectRef>
+      <a:fontRef idx="minor"/>
+    </dgm:style>
+  </dgm:styleLbl>
+  <dgm:styleLbl name="bgAcc1">
+    <dgm:scene3d>
+      <a:camera prst="orthographicFront"/>
+      <a:lightRig rig="threePt" dir="t"/>
+    </dgm:scene3d>
+    <dgm:sp3d/>
+    <dgm:txPr/>
+    <dgm:style>
+      <a:lnRef idx="2">
+        <a:scrgbClr r="0" g="0" b="0"/>
+      </a:lnRef>
+      <a:fillRef idx="1">
+        <a:scrgbClr r="0" g="0" b="0"/>
+      </a:fillRef>
+      <a:effectRef idx="0">
+        <a:scrgbClr r="0" g="0" b="0"/>
+      </a:effectRef>
+      <a:fontRef idx="minor"/>
+    </dgm:style>
+  </dgm:styleLbl>
+  <dgm:styleLbl name="solidFgAcc1">
+    <dgm:scene3d>
+      <a:camera prst="orthographicFront"/>
+      <a:lightRig rig="threePt" dir="t"/>
+    </dgm:scene3d>
+    <dgm:sp3d/>
+    <dgm:txPr/>
+    <dgm:style>
+      <a:lnRef idx="2">
+        <a:scrgbClr r="0" g="0" b="0"/>
+      </a:lnRef>
+      <a:fillRef idx="1">
+        <a:scrgbClr r="0" g="0" b="0"/>
+      </a:fillRef>
+      <a:effectRef idx="0">
+        <a:scrgbClr r="0" g="0" b="0"/>
+      </a:effectRef>
+      <a:fontRef idx="minor"/>
+    </dgm:style>
+  </dgm:styleLbl>
+  <dgm:styleLbl name="solidAlignAcc1">
+    <dgm:scene3d>
+      <a:camera prst="orthographicFront"/>
+      <a:lightRig rig="threePt" dir="t"/>
+    </dgm:scene3d>
+    <dgm:sp3d/>
+    <dgm:txPr/>
+    <dgm:style>
+      <a:lnRef idx="2">
+        <a:scrgbClr r="0" g="0" b="0"/>
+      </a:lnRef>
+      <a:fillRef idx="1">
+        <a:scrgbClr r="0" g="0" b="0"/>
+      </a:fillRef>
+      <a:effectRef idx="0">
+        <a:scrgbClr r="0" g="0" b="0"/>
+      </a:effectRef>
+      <a:fontRef idx="minor"/>
+    </dgm:style>
+  </dgm:styleLbl>
+  <dgm:styleLbl name="solidBgAcc1">
+    <dgm:scene3d>
+      <a:camera prst="orthographicFront"/>
+      <a:lightRig rig="threePt" dir="t"/>
+    </dgm:scene3d>
+    <dgm:sp3d/>
+    <dgm:txPr/>
+    <dgm:style>
+      <a:lnRef idx="2">
+        <a:scrgbClr r="0" g="0" b="0"/>
+      </a:lnRef>
+      <a:fillRef idx="1">
+        <a:scrgbClr r="0" g="0" b="0"/>
+      </a:fillRef>
+      <a:effectRef idx="0">
+        <a:scrgbClr r="0" g="0" b="0"/>
+      </a:effectRef>
+      <a:fontRef idx="minor"/>
+    </dgm:style>
+  </dgm:styleLbl>
+  <dgm:styleLbl name="fgAccFollowNode1">
+    <dgm:scene3d>
+      <a:camera prst="orthographicFront"/>
+      <a:lightRig rig="threePt" dir="t"/>
+    </dgm:scene3d>
+    <dgm:sp3d/>
+    <dgm:txPr/>
+    <dgm:style>
+      <a:lnRef idx="2">
+        <a:scrgbClr r="0" g="0" b="0"/>
+      </a:lnRef>
+      <a:fillRef idx="1">
+        <a:scrgbClr r="0" g="0" b="0"/>
+      </a:fillRef>
+      <a:effectRef idx="0">
+        <a:scrgbClr r="0" g="0" b="0"/>
+      </a:effectRef>
+      <a:fontRef idx="minor"/>
+    </dgm:style>
+  </dgm:styleLbl>
+  <dgm:styleLbl name="alignAccFollowNode1">
+    <dgm:scene3d>
+      <a:camera prst="orthographicFront"/>
+      <a:lightRig rig="threePt" dir="t"/>
+    </dgm:scene3d>
+    <dgm:sp3d/>
+    <dgm:txPr/>
+    <dgm:style>
+      <a:lnRef idx="2">
+        <a:scrgbClr r="0" g="0" b="0"/>
+      </a:lnRef>
+      <a:fillRef idx="1">
+        <a:scrgbClr r="0" g="0" b="0"/>
+      </a:fillRef>
+      <a:effectRef idx="0">
+        <a:scrgbClr r="0" g="0" b="0"/>
+      </a:effectRef>
+      <a:fontRef idx="minor"/>
+    </dgm:style>
+  </dgm:styleLbl>
+  <dgm:styleLbl name="bgAccFollowNode1">
+    <dgm:scene3d>
+      <a:camera prst="orthographicFront"/>
+      <a:lightRig rig="threePt" dir="t"/>
+    </dgm:scene3d>
+    <dgm:sp3d/>
+    <dgm:txPr/>
+    <dgm:style>
+      <a:lnRef idx="2">
+        <a:scrgbClr r="0" g="0" b="0"/>
+      </a:lnRef>
+      <a:fillRef idx="1">
+        <a:scrgbClr r="0" g="0" b="0"/>
+      </a:fillRef>
+      <a:effectRef idx="0">
+        <a:scrgbClr r="0" g="0" b="0"/>
+      </a:effectRef>
+      <a:fontRef idx="minor"/>
+    </dgm:style>
+  </dgm:styleLbl>
+  <dgm:styleLbl name="fgAcc0">
+    <dgm:scene3d>
+      <a:camera prst="orthographicFront"/>
+      <a:lightRig rig="threePt" dir="t"/>
+    </dgm:scene3d>
+    <dgm:sp3d/>
+    <dgm:txPr/>
+    <dgm:style>
+      <a:lnRef idx="2">
+        <a:scrgbClr r="0" g="0" b="0"/>
+      </a:lnRef>
+      <a:fillRef idx="1">
+        <a:scrgbClr r="0" g="0" b="0"/>
+      </a:fillRef>
+      <a:effectRef idx="0">
+        <a:scrgbClr r="0" g="0" b="0"/>
+      </a:effectRef>
+      <a:fontRef idx="minor"/>
+    </dgm:style>
+  </dgm:styleLbl>
+  <dgm:styleLbl name="fgAcc2">
+    <dgm:scene3d>
+      <a:camera prst="orthographicFront"/>
+      <a:lightRig rig="threePt" dir="t"/>
+    </dgm:scene3d>
+    <dgm:sp3d/>
+    <dgm:txPr/>
+    <dgm:style>
+      <a:lnRef idx="2">
+        <a:scrgbClr r="0" g="0" b="0"/>
+      </a:lnRef>
+      <a:fillRef idx="1">
+        <a:scrgbClr r="0" g="0" b="0"/>
+      </a:fillRef>
+      <a:effectRef idx="0">
+        <a:scrgbClr r="0" g="0" b="0"/>
+      </a:effectRef>
+      <a:fontRef idx="minor"/>
+    </dgm:style>
+  </dgm:styleLbl>
+  <dgm:styleLbl name="fgAcc3">
+    <dgm:scene3d>
+      <a:camera prst="orthographicFront"/>
+      <a:lightRig rig="threePt" dir="t"/>
+    </dgm:scene3d>
+    <dgm:sp3d/>
+    <dgm:txPr/>
+    <dgm:style>
+      <a:lnRef idx="2">
+        <a:scrgbClr r="0" g="0" b="0"/>
+      </a:lnRef>
+      <a:fillRef idx="1">
+        <a:scrgbClr r="0" g="0" b="0"/>
+      </a:fillRef>
+      <a:effectRef idx="0">
+        <a:scrgbClr r="0" g="0" b="0"/>
+      </a:effectRef>
+      <a:fontRef idx="minor"/>
+    </dgm:style>
+  </dgm:styleLbl>
+  <dgm:styleLbl name="fgAcc4">
+    <dgm:scene3d>
+      <a:camera prst="orthographicFront"/>
+      <a:lightRig rig="threePt" dir="t"/>
+    </dgm:scene3d>
+    <dgm:sp3d/>
+    <dgm:txPr/>
+    <dgm:style>
+      <a:lnRef idx="2">
+        <a:scrgbClr r="0" g="0" b="0"/>
+      </a:lnRef>
+      <a:fillRef idx="1">
+        <a:scrgbClr r="0" g="0" b="0"/>
+      </a:fillRef>
+      <a:effectRef idx="0">
+        <a:scrgbClr r="0" g="0" b="0"/>
+      </a:effectRef>
+      <a:fontRef idx="minor"/>
+    </dgm:style>
+  </dgm:styleLbl>
+  <dgm:styleLbl name="bgShp">
+    <dgm:scene3d>
+      <a:camera prst="orthographicFront"/>
+      <a:lightRig rig="threePt" dir="t"/>
+    </dgm:scene3d>
+    <dgm:sp3d/>
+    <dgm:txPr/>
+    <dgm:style>
+      <a:lnRef idx="0">
+        <a:scrgbClr r="0" g="0" b="0"/>
+      </a:lnRef>
+      <a:fillRef idx="1">
+        <a:scrgbClr r="0" g="0" b="0"/>
+      </a:fillRef>
+      <a:effectRef idx="0">
+        <a:scrgbClr r="0" g="0" b="0"/>
+      </a:effectRef>
+      <a:fontRef idx="minor"/>
+    </dgm:style>
+  </dgm:styleLbl>
+  <dgm:styleLbl name="dkBgShp">
+    <dgm:scene3d>
+      <a:camera prst="orthographicFront"/>
+      <a:lightRig rig="threePt" dir="t"/>
+    </dgm:scene3d>
+    <dgm:sp3d/>
+    <dgm:txPr/>
+    <dgm:style>
+      <a:lnRef idx="0">
+        <a:scrgbClr r="0" g="0" b="0"/>
+      </a:lnRef>
+      <a:fillRef idx="1">
+        <a:scrgbClr r="0" g="0" b="0"/>
+      </a:fillRef>
+      <a:effectRef idx="0">
+        <a:scrgbClr r="0" g="0" b="0"/>
+      </a:effectRef>
+      <a:fontRef idx="minor"/>
+    </dgm:style>
+  </dgm:styleLbl>
+  <dgm:styleLbl name="trBgShp">
+    <dgm:scene3d>
+      <a:camera prst="orthographicFront"/>
+      <a:lightRig rig="threePt" dir="t"/>
+    </dgm:scene3d>
+    <dgm:sp3d/>
+    <dgm:txPr/>
+    <dgm:style>
+      <a:lnRef idx="0">
+        <a:scrgbClr r="0" g="0" b="0"/>
+      </a:lnRef>
+      <a:fillRef idx="1">
+        <a:scrgbClr r="0" g="0" b="0"/>
+      </a:fillRef>
+      <a:effectRef idx="0">
+        <a:scrgbClr r="0" g="0" b="0"/>
+      </a:effectRef>
+      <a:fontRef idx="minor"/>
+    </dgm:style>
+  </dgm:styleLbl>
+  <dgm:styleLbl name="fgShp">
+    <dgm:scene3d>
+      <a:camera prst="orthographicFront"/>
+      <a:lightRig rig="threePt" dir="t"/>
+    </dgm:scene3d>
+    <dgm:sp3d/>
+    <dgm:txPr/>
+    <dgm:style>
+      <a:lnRef idx="2">
+        <a:scrgbClr r="0" g="0" b="0"/>
+      </a:lnRef>
+      <a:fillRef idx="1">
+        <a:scrgbClr r="0" g="0" b="0"/>
+      </a:fillRef>
+      <a:effectRef idx="0">
+        <a:scrgbClr r="0" g="0" b="0"/>
+      </a:effectRef>
+      <a:fontRef idx="minor"/>
+    </dgm:style>
+  </dgm:styleLbl>
+  <dgm:styleLbl name="revTx">
+    <dgm:scene3d>
+      <a:camera prst="orthographicFront"/>
+      <a:lightRig rig="threePt" dir="t"/>
+    </dgm:scene3d>
+    <dgm:sp3d/>
+    <dgm:txPr/>
+    <dgm:style>
+      <a:lnRef idx="0">
+        <a:scrgbClr r="0" g="0" b="0"/>
+      </a:lnRef>
+      <a:fillRef idx="0">
+        <a:scrgbClr r="0" g="0" b="0"/>
+      </a:fillRef>
+      <a:effectRef idx="0">
+        <a:scrgbClr r="0" g="0" b="0"/>
+      </a:effectRef>
+      <a:fontRef idx="minor"/>
+    </dgm:style>
+  </dgm:styleLbl>
+</dgm:styleDef>
+</file>
+
+<file path=ppt/diagrams/quickStyle2.xml><?xml version="1.0" encoding="utf-8"?>
 <dgm:styleDef xmlns:dgm="http://schemas.openxmlformats.org/drawingml/2006/diagram" xmlns:a="http://schemas.openxmlformats.org/drawingml/2006/main" uniqueId="urn:microsoft.com/office/officeart/2005/8/quickstyle/simple1">
   <dgm:title val=""/>
   <dgm:desc val=""/>
@@ -4203,7 +7658,7 @@
           <a:p>
             <a:fld id="{A02ADE2F-7A50-4E39-B1E8-0440E0F16E17}" type="datetimeFigureOut">
               <a:rPr lang="en-US" smtClean="0"/>
-              <a:t>12/21/2023</a:t>
+              <a:t>12/22/2023</a:t>
             </a:fld>
             <a:endParaRPr lang="en-US" dirty="0"/>
           </a:p>
@@ -5322,7 +8777,7 @@
           <a:p>
             <a:fld id="{A02ADE2F-7A50-4E39-B1E8-0440E0F16E17}" type="datetimeFigureOut">
               <a:rPr lang="en-US" smtClean="0"/>
-              <a:t>12/21/2023</a:t>
+              <a:t>12/22/2023</a:t>
             </a:fld>
             <a:endParaRPr lang="en-US" dirty="0"/>
           </a:p>
@@ -6333,7 +9788,7 @@
           <a:p>
             <a:fld id="{A02ADE2F-7A50-4E39-B1E8-0440E0F16E17}" type="datetimeFigureOut">
               <a:rPr lang="en-US" smtClean="0"/>
-              <a:t>12/21/2023</a:t>
+              <a:t>12/22/2023</a:t>
             </a:fld>
             <a:endParaRPr lang="en-US" dirty="0"/>
           </a:p>
@@ -7503,7 +10958,7 @@
           <a:p>
             <a:fld id="{A02ADE2F-7A50-4E39-B1E8-0440E0F16E17}" type="datetimeFigureOut">
               <a:rPr lang="en-US" smtClean="0"/>
-              <a:t>12/21/2023</a:t>
+              <a:t>12/22/2023</a:t>
             </a:fld>
             <a:endParaRPr lang="en-US" dirty="0"/>
           </a:p>
@@ -8564,7 +12019,7 @@
           <a:p>
             <a:fld id="{A02ADE2F-7A50-4E39-B1E8-0440E0F16E17}" type="datetimeFigureOut">
               <a:rPr lang="en-US" smtClean="0"/>
-              <a:t>12/21/2023</a:t>
+              <a:t>12/22/2023</a:t>
             </a:fld>
             <a:endParaRPr lang="en-US" dirty="0"/>
           </a:p>
@@ -9210,7 +12665,7 @@
           <a:p>
             <a:fld id="{A02ADE2F-7A50-4E39-B1E8-0440E0F16E17}" type="datetimeFigureOut">
               <a:rPr lang="en-US" smtClean="0"/>
-              <a:t>12/21/2023</a:t>
+              <a:t>12/22/2023</a:t>
             </a:fld>
             <a:endParaRPr lang="en-US" dirty="0"/>
           </a:p>
@@ -10054,7 +13509,7 @@
           <a:p>
             <a:fld id="{A02ADE2F-7A50-4E39-B1E8-0440E0F16E17}" type="datetimeFigureOut">
               <a:rPr lang="en-US" smtClean="0"/>
-              <a:t>12/21/2023</a:t>
+              <a:t>12/22/2023</a:t>
             </a:fld>
             <a:endParaRPr lang="en-US" dirty="0"/>
           </a:p>
@@ -10229,7 +13684,7 @@
           <a:p>
             <a:fld id="{A02ADE2F-7A50-4E39-B1E8-0440E0F16E17}" type="datetimeFigureOut">
               <a:rPr lang="en-US" smtClean="0"/>
-              <a:t>12/21/2023</a:t>
+              <a:t>12/22/2023</a:t>
             </a:fld>
             <a:endParaRPr lang="en-US" dirty="0"/>
           </a:p>
@@ -11227,7 +14682,7 @@
           <a:p>
             <a:fld id="{A02ADE2F-7A50-4E39-B1E8-0440E0F16E17}" type="datetimeFigureOut">
               <a:rPr lang="en-US" smtClean="0"/>
-              <a:t>12/21/2023</a:t>
+              <a:t>12/22/2023</a:t>
             </a:fld>
             <a:endParaRPr lang="en-US" dirty="0"/>
           </a:p>
@@ -11433,7 +14888,7 @@
           <a:p>
             <a:fld id="{A02ADE2F-7A50-4E39-B1E8-0440E0F16E17}" type="datetimeFigureOut">
               <a:rPr lang="en-US" smtClean="0"/>
-              <a:t>12/21/2023</a:t>
+              <a:t>12/22/2023</a:t>
             </a:fld>
             <a:endParaRPr lang="en-US" dirty="0"/>
           </a:p>
@@ -12495,7 +15950,7 @@
           <a:p>
             <a:fld id="{A02ADE2F-7A50-4E39-B1E8-0440E0F16E17}" type="datetimeFigureOut">
               <a:rPr lang="en-US" smtClean="0"/>
-              <a:t>12/21/2023</a:t>
+              <a:t>12/22/2023</a:t>
             </a:fld>
             <a:endParaRPr lang="en-US" dirty="0"/>
           </a:p>
@@ -12767,7 +16222,7 @@
           <a:p>
             <a:fld id="{A02ADE2F-7A50-4E39-B1E8-0440E0F16E17}" type="datetimeFigureOut">
               <a:rPr lang="en-US" smtClean="0"/>
-              <a:t>12/21/2023</a:t>
+              <a:t>12/22/2023</a:t>
             </a:fld>
             <a:endParaRPr lang="en-US" dirty="0"/>
           </a:p>
@@ -13149,7 +16604,7 @@
           <a:p>
             <a:fld id="{A02ADE2F-7A50-4E39-B1E8-0440E0F16E17}" type="datetimeFigureOut">
               <a:rPr lang="en-US" smtClean="0"/>
-              <a:t>12/21/2023</a:t>
+              <a:t>12/22/2023</a:t>
             </a:fld>
             <a:endParaRPr lang="en-US" dirty="0"/>
           </a:p>
@@ -13267,7 +16722,7 @@
           <a:p>
             <a:fld id="{A02ADE2F-7A50-4E39-B1E8-0440E0F16E17}" type="datetimeFigureOut">
               <a:rPr lang="en-US" smtClean="0"/>
-              <a:t>12/21/2023</a:t>
+              <a:t>12/22/2023</a:t>
             </a:fld>
             <a:endParaRPr lang="en-US" dirty="0"/>
           </a:p>
@@ -13362,7 +16817,7 @@
           <a:p>
             <a:fld id="{A02ADE2F-7A50-4E39-B1E8-0440E0F16E17}" type="datetimeFigureOut">
               <a:rPr lang="en-US" smtClean="0"/>
-              <a:t>12/21/2023</a:t>
+              <a:t>12/22/2023</a:t>
             </a:fld>
             <a:endParaRPr lang="en-US" dirty="0"/>
           </a:p>
@@ -14471,7 +17926,7 @@
           <a:p>
             <a:fld id="{A02ADE2F-7A50-4E39-B1E8-0440E0F16E17}" type="datetimeFigureOut">
               <a:rPr lang="en-US" smtClean="0"/>
-              <a:t>12/21/2023</a:t>
+              <a:t>12/22/2023</a:t>
             </a:fld>
             <a:endParaRPr lang="en-US" dirty="0"/>
           </a:p>
@@ -15603,7 +19058,7 @@
           <a:p>
             <a:fld id="{A02ADE2F-7A50-4E39-B1E8-0440E0F16E17}" type="datetimeFigureOut">
               <a:rPr lang="en-US" smtClean="0"/>
-              <a:t>12/21/2023</a:t>
+              <a:t>12/22/2023</a:t>
             </a:fld>
             <a:endParaRPr lang="en-US" dirty="0"/>
           </a:p>
@@ -16631,7 +20086,7 @@
           <a:p>
             <a:fld id="{A02ADE2F-7A50-4E39-B1E8-0440E0F16E17}" type="datetimeFigureOut">
               <a:rPr lang="en-US" smtClean="0"/>
-              <a:t>12/21/2023</a:t>
+              <a:t>12/22/2023</a:t>
             </a:fld>
             <a:endParaRPr lang="en-US" dirty="0"/>
           </a:p>
@@ -17372,6 +20827,177 @@
 </p:sld>
 </file>
 
+<file path=ppt/slides/slide3.xml><?xml version="1.0" encoding="utf-8"?>
+<p:sld xmlns:a="http://schemas.openxmlformats.org/drawingml/2006/main" xmlns:r="http://schemas.openxmlformats.org/officeDocument/2006/relationships" xmlns:p="http://schemas.openxmlformats.org/presentationml/2006/main">
+  <p:cSld>
+    <p:bg>
+      <p:bgPr>
+        <a:solidFill>
+          <a:schemeClr val="tx1">
+            <a:alpha val="0"/>
+          </a:schemeClr>
+        </a:solidFill>
+        <a:effectLst/>
+      </p:bgPr>
+    </p:bg>
+    <p:spTree>
+      <p:nvGrpSpPr>
+        <p:cNvPr id="1" name=""/>
+        <p:cNvGrpSpPr/>
+        <p:nvPr/>
+      </p:nvGrpSpPr>
+      <p:grpSpPr>
+        <a:xfrm>
+          <a:off x="0" y="0"/>
+          <a:ext cx="0" cy="0"/>
+          <a:chOff x="0" y="0"/>
+          <a:chExt cx="0" cy="0"/>
+        </a:xfrm>
+      </p:grpSpPr>
+      <p:sp>
+        <p:nvSpPr>
+          <p:cNvPr id="8" name="TextBox 7">
+            <a:extLst>
+              <a:ext uri="{FF2B5EF4-FFF2-40B4-BE49-F238E27FC236}">
+                <a16:creationId xmlns:a16="http://schemas.microsoft.com/office/drawing/2014/main" id="{71E24CEB-D49C-0415-FCC6-B0D9EFEFD0F6}"/>
+              </a:ext>
+            </a:extLst>
+          </p:cNvPr>
+          <p:cNvSpPr txBox="1"/>
+          <p:nvPr/>
+        </p:nvSpPr>
+        <p:spPr>
+          <a:xfrm>
+            <a:off x="2796099" y="2644170"/>
+            <a:ext cx="7436113" cy="1569660"/>
+          </a:xfrm>
+          <a:prstGeom prst="rect">
+            <a:avLst/>
+          </a:prstGeom>
+          <a:noFill/>
+        </p:spPr>
+        <p:txBody>
+          <a:bodyPr wrap="square" rtlCol="0">
+            <a:spAutoFit/>
+          </a:bodyPr>
+          <a:lstStyle/>
+          <a:p>
+            <a:r>
+              <a:rPr lang="en-US" sz="9600" dirty="0">
+                <a:solidFill>
+                  <a:schemeClr val="bg1"/>
+                </a:solidFill>
+                <a:latin typeface="Walbaum Display" panose="02070503090703020303" pitchFamily="18" charset="0"/>
+              </a:rPr>
+              <a:t>Wikispeedia</a:t>
+            </a:r>
+          </a:p>
+        </p:txBody>
+      </p:sp>
+      <p:pic>
+        <p:nvPicPr>
+          <p:cNvPr id="11" name="Picture 10">
+            <a:extLst>
+              <a:ext uri="{FF2B5EF4-FFF2-40B4-BE49-F238E27FC236}">
+                <a16:creationId xmlns:a16="http://schemas.microsoft.com/office/drawing/2014/main" id="{FE010275-9B7F-9B98-EBFF-BEC87C2366C7}"/>
+              </a:ext>
+            </a:extLst>
+          </p:cNvPr>
+          <p:cNvPicPr>
+            <a:picLocks noChangeAspect="1"/>
+          </p:cNvPicPr>
+          <p:nvPr/>
+        </p:nvPicPr>
+        <p:blipFill>
+          <a:blip r:embed="rId2"/>
+          <a:stretch>
+            <a:fillRect/>
+          </a:stretch>
+        </p:blipFill>
+        <p:spPr>
+          <a:xfrm>
+            <a:off x="5160107" y="2932742"/>
+            <a:ext cx="228664" cy="223799"/>
+          </a:xfrm>
+          <a:prstGeom prst="rect">
+            <a:avLst/>
+          </a:prstGeom>
+        </p:spPr>
+      </p:pic>
+      <p:graphicFrame>
+        <p:nvGraphicFramePr>
+          <p:cNvPr id="7" name="Diagram 6">
+            <a:extLst>
+              <a:ext uri="{FF2B5EF4-FFF2-40B4-BE49-F238E27FC236}">
+                <a16:creationId xmlns:a16="http://schemas.microsoft.com/office/drawing/2014/main" id="{7536DB70-314C-DF5C-29F7-BC30BF790C65}"/>
+              </a:ext>
+            </a:extLst>
+          </p:cNvPr>
+          <p:cNvGraphicFramePr/>
+          <p:nvPr/>
+        </p:nvGraphicFramePr>
+        <p:xfrm>
+          <a:off x="4659569" y="2190362"/>
+          <a:ext cx="1182012" cy="1238638"/>
+        </p:xfrm>
+        <a:graphic>
+          <a:graphicData uri="http://schemas.openxmlformats.org/drawingml/2006/diagram">
+            <dgm:relIds xmlns:dgm="http://schemas.openxmlformats.org/drawingml/2006/diagram" xmlns:r="http://schemas.openxmlformats.org/officeDocument/2006/relationships" r:dm="rId3" r:lo="rId4" r:qs="rId5" r:cs="rId6"/>
+          </a:graphicData>
+        </a:graphic>
+      </p:graphicFrame>
+      <p:sp>
+        <p:nvSpPr>
+          <p:cNvPr id="12" name="TextBox 11">
+            <a:extLst>
+              <a:ext uri="{FF2B5EF4-FFF2-40B4-BE49-F238E27FC236}">
+                <a16:creationId xmlns:a16="http://schemas.microsoft.com/office/drawing/2014/main" id="{8F7FA2B2-2BBA-BEA5-8F65-303B16A87284}"/>
+              </a:ext>
+            </a:extLst>
+          </p:cNvPr>
+          <p:cNvSpPr txBox="1"/>
+          <p:nvPr/>
+        </p:nvSpPr>
+        <p:spPr>
+          <a:xfrm>
+            <a:off x="3537947" y="4213830"/>
+            <a:ext cx="5116106" cy="769441"/>
+          </a:xfrm>
+          <a:prstGeom prst="rect">
+            <a:avLst/>
+          </a:prstGeom>
+          <a:noFill/>
+        </p:spPr>
+        <p:txBody>
+          <a:bodyPr wrap="square" rtlCol="0">
+            <a:spAutoFit/>
+          </a:bodyPr>
+          <a:lstStyle/>
+          <a:p>
+            <a:r>
+              <a:rPr lang="en-US" sz="4400" dirty="0">
+                <a:solidFill>
+                  <a:schemeClr val="bg1"/>
+                </a:solidFill>
+              </a:rPr>
+              <a:t>A clustering story</a:t>
+            </a:r>
+          </a:p>
+        </p:txBody>
+      </p:sp>
+    </p:spTree>
+    <p:extLst>
+      <p:ext uri="{BB962C8B-B14F-4D97-AF65-F5344CB8AC3E}">
+        <p14:creationId xmlns:p14="http://schemas.microsoft.com/office/powerpoint/2010/main" val="1404038732"/>
+      </p:ext>
+    </p:extLst>
+  </p:cSld>
+  <p:clrMapOvr>
+    <a:masterClrMapping/>
+  </p:clrMapOvr>
+</p:sld>
+</file>
+
 <file path=ppt/theme/theme1.xml><?xml version="1.0" encoding="utf-8"?>
 <a:theme xmlns:a="http://schemas.openxmlformats.org/drawingml/2006/main" name="Ion Boardroom">
   <a:themeElements>

</xml_diff>